<commit_message>
Update Powerpoint, remove old folder
</commit_message>
<xml_diff>
--- a/Javascript.pptx
+++ b/Javascript.pptx
@@ -40,11 +40,11 @@
     <p:sldId id="281" r:id="rId34"/>
     <p:sldId id="289" r:id="rId35"/>
     <p:sldId id="290" r:id="rId36"/>
-    <p:sldId id="295" r:id="rId37"/>
-    <p:sldId id="291" r:id="rId38"/>
-    <p:sldId id="292" r:id="rId39"/>
-    <p:sldId id="294" r:id="rId40"/>
-    <p:sldId id="293" r:id="rId41"/>
+    <p:sldId id="291" r:id="rId37"/>
+    <p:sldId id="292" r:id="rId38"/>
+    <p:sldId id="299" r:id="rId39"/>
+    <p:sldId id="293" r:id="rId40"/>
+    <p:sldId id="295" r:id="rId41"/>
   </p:sldIdLst>
   <p:sldSz cx="9144000" cy="6858000" type="screen4x3"/>
   <p:notesSz cx="6858000" cy="9144000"/>
@@ -154,12 +154,15 @@
 <file path=ppt/revisionInfo.xml><?xml version="1.0" encoding="utf-8"?>
 <p1510:revInfo xmlns:a="http://schemas.openxmlformats.org/drawingml/2006/main" xmlns:r="http://schemas.openxmlformats.org/officeDocument/2006/relationships" xmlns:p1510="http://schemas.microsoft.com/office/powerpoint/2015/10/main">
   <p1510:revLst>
+    <p1510:client id="{36D0BE91-E8E9-7A67-4D45-35D6594435A8}" v="552" dt="2019-11-12T12:10:34.725"/>
     <p1510:client id="{38B46382-DAC1-EC02-9741-7C1E2C1EE79E}" v="1" dt="2019-11-10T20:32:54.948"/>
     <p1510:client id="{632A1651-6036-33FD-C8E2-F95E4F72265A}" v="2251" dt="2019-11-11T22:23:38.050"/>
     <p1510:client id="{6B517C38-4A99-C407-302D-7F28E1679330}" v="1" dt="2019-11-10T23:24:49.594"/>
     <p1510:client id="{9707EE11-FCA1-9A63-8B12-714FF43E195A}" v="1367" dt="2019-11-11T23:05:14.130"/>
     <p1510:client id="{A185AFBD-6D70-9B21-C6E4-B8197EDBAA04}" v="228" dt="2019-11-11T21:17:59.840"/>
     <p1510:client id="{A1E48580-2538-4842-A822-E2C906783EEC}" v="300" dt="2019-11-12T00:22:52.784"/>
+    <p1510:client id="{BDC9E7D7-BE52-EBB8-B1DF-4380543D8069}" v="259" dt="2019-11-12T11:51:32.029"/>
+    <p1510:client id="{C28D8D99-F6B3-6415-4723-3C5E5FD8FE6B}" v="38" dt="2019-11-12T11:13:13.623"/>
   </p1510:revLst>
 </p1510:revInfo>
 </file>
@@ -223,7 +226,7 @@
           </a:lstStyle>
           <a:p>
             <a:r>
-              <a:rPr lang="en-US" dirty="0"/>
+              <a:rPr lang="en-US"/>
               <a:t>Click to edit Master title style</a:t>
             </a:r>
           </a:p>
@@ -341,7 +344,7 @@
           </a:lstStyle>
           <a:p>
             <a:r>
-              <a:rPr lang="en-US" dirty="0"/>
+              <a:rPr lang="en-US"/>
               <a:t>Click to edit Master subtitle style</a:t>
             </a:r>
           </a:p>
@@ -365,9 +368,9 @@
             <a:fld id="{B61BEF0D-F0BB-DE4B-95CE-6DB70DBA9567}" type="datetimeFigureOut">
               <a:rPr lang="en-US" dirty="0"/>
               <a:pPr/>
-              <a:t>11/11/2019</a:t>
+              <a:t>11/12/2019</a:t>
             </a:fld>
-            <a:endParaRPr lang="en-US" dirty="0"/>
+            <a:endParaRPr lang="en-US"/>
           </a:p>
         </p:txBody>
       </p:sp>
@@ -386,7 +389,7 @@
           <a:bodyPr/>
           <a:lstStyle/>
           <a:p>
-            <a:endParaRPr lang="en-US" dirty="0"/>
+            <a:endParaRPr lang="en-US"/>
           </a:p>
         </p:txBody>
       </p:sp>
@@ -410,7 +413,7 @@
               <a:pPr/>
               <a:t>‹#›</a:t>
             </a:fld>
-            <a:endParaRPr lang="en-US" dirty="0"/>
+            <a:endParaRPr lang="en-US"/>
           </a:p>
         </p:txBody>
       </p:sp>
@@ -471,7 +474,7 @@
           </a:lstStyle>
           <a:p>
             <a:r>
-              <a:rPr lang="en-US" dirty="0"/>
+              <a:rPr lang="en-US"/>
               <a:t>Click to edit Master title style</a:t>
             </a:r>
           </a:p>
@@ -564,7 +567,7 @@
             </a:lvl9pPr>
           </a:lstStyle>
           <a:p>
-            <a:endParaRPr lang="en-US" dirty="0"/>
+            <a:endParaRPr lang="en-US"/>
           </a:p>
         </p:txBody>
       </p:sp>
@@ -629,7 +632,7 @@
           <a:p>
             <a:pPr lvl="0"/>
             <a:r>
-              <a:rPr lang="en-US" dirty="0"/>
+              <a:rPr lang="en-US"/>
               <a:t>Click to edit Master text styles</a:t>
             </a:r>
           </a:p>
@@ -653,9 +656,9 @@
             <a:fld id="{B61BEF0D-F0BB-DE4B-95CE-6DB70DBA9567}" type="datetimeFigureOut">
               <a:rPr lang="en-US" dirty="0"/>
               <a:pPr/>
-              <a:t>11/11/2019</a:t>
+              <a:t>11/12/2019</a:t>
             </a:fld>
-            <a:endParaRPr lang="en-US" dirty="0"/>
+            <a:endParaRPr lang="en-US"/>
           </a:p>
         </p:txBody>
       </p:sp>
@@ -679,7 +682,7 @@
           <a:bodyPr/>
           <a:lstStyle/>
           <a:p>
-            <a:endParaRPr lang="en-US" dirty="0"/>
+            <a:endParaRPr lang="en-US"/>
           </a:p>
         </p:txBody>
       </p:sp>
@@ -703,7 +706,7 @@
               <a:pPr/>
               <a:t>‹#›</a:t>
             </a:fld>
-            <a:endParaRPr lang="en-US" dirty="0"/>
+            <a:endParaRPr lang="en-US"/>
           </a:p>
         </p:txBody>
       </p:sp>
@@ -764,7 +767,7 @@
           </a:lstStyle>
           <a:p>
             <a:r>
-              <a:rPr lang="en-US" dirty="0"/>
+              <a:rPr lang="en-US"/>
               <a:t>Click to edit Master title style</a:t>
             </a:r>
           </a:p>
@@ -883,7 +886,7 @@
           <a:p>
             <a:pPr lvl="0"/>
             <a:r>
-              <a:rPr lang="en-US" dirty="0"/>
+              <a:rPr lang="en-US"/>
               <a:t>Click to edit Master text styles</a:t>
             </a:r>
           </a:p>
@@ -907,9 +910,9 @@
             <a:fld id="{B61BEF0D-F0BB-DE4B-95CE-6DB70DBA9567}" type="datetimeFigureOut">
               <a:rPr lang="en-US" dirty="0"/>
               <a:pPr/>
-              <a:t>11/11/2019</a:t>
+              <a:t>11/12/2019</a:t>
             </a:fld>
-            <a:endParaRPr lang="en-US" dirty="0"/>
+            <a:endParaRPr lang="en-US"/>
           </a:p>
         </p:txBody>
       </p:sp>
@@ -928,7 +931,7 @@
           <a:bodyPr/>
           <a:lstStyle/>
           <a:p>
-            <a:endParaRPr lang="en-US" dirty="0"/>
+            <a:endParaRPr lang="en-US"/>
           </a:p>
         </p:txBody>
       </p:sp>
@@ -952,7 +955,7 @@
               <a:pPr/>
               <a:t>‹#›</a:t>
             </a:fld>
-            <a:endParaRPr lang="en-US" dirty="0"/>
+            <a:endParaRPr lang="en-US"/>
           </a:p>
         </p:txBody>
       </p:sp>
@@ -1091,7 +1094,7 @@
           <a:p>
             <a:pPr lvl="0"/>
             <a:r>
-              <a:rPr lang="en-US" sz="8000" dirty="0">
+              <a:rPr lang="en-US" sz="8000">
                 <a:solidFill>
                   <a:schemeClr val="accent1"/>
                 </a:solidFill>
@@ -1206,7 +1209,7 @@
           <a:p>
             <a:pPr lvl="0" algn="r"/>
             <a:r>
-              <a:rPr lang="en-US" sz="8000" dirty="0">
+              <a:rPr lang="en-US" sz="8000">
                 <a:solidFill>
                   <a:schemeClr val="accent1"/>
                 </a:solidFill>
@@ -1247,7 +1250,7 @@
           </a:lstStyle>
           <a:p>
             <a:r>
-              <a:rPr lang="en-US" dirty="0"/>
+              <a:rPr lang="en-US"/>
               <a:t>Click to edit Master title style</a:t>
             </a:r>
           </a:p>
@@ -1303,7 +1306,7 @@
           <a:p>
             <a:pPr lvl="0"/>
             <a:r>
-              <a:rPr lang="en-US" dirty="0"/>
+              <a:rPr lang="en-US"/>
               <a:t>Click to edit Master text styles</a:t>
             </a:r>
           </a:p>
@@ -1422,7 +1425,7 @@
           <a:p>
             <a:pPr lvl="0"/>
             <a:r>
-              <a:rPr lang="en-US" dirty="0"/>
+              <a:rPr lang="en-US"/>
               <a:t>Click to edit Master text styles</a:t>
             </a:r>
           </a:p>
@@ -1446,9 +1449,9 @@
             <a:fld id="{B61BEF0D-F0BB-DE4B-95CE-6DB70DBA9567}" type="datetimeFigureOut">
               <a:rPr lang="en-US" dirty="0"/>
               <a:pPr/>
-              <a:t>11/11/2019</a:t>
+              <a:t>11/12/2019</a:t>
             </a:fld>
-            <a:endParaRPr lang="en-US" dirty="0"/>
+            <a:endParaRPr lang="en-US"/>
           </a:p>
         </p:txBody>
       </p:sp>
@@ -1467,7 +1470,7 @@
           <a:bodyPr/>
           <a:lstStyle/>
           <a:p>
-            <a:endParaRPr lang="en-US" dirty="0"/>
+            <a:endParaRPr lang="en-US"/>
           </a:p>
         </p:txBody>
       </p:sp>
@@ -1491,7 +1494,7 @@
               <a:pPr/>
               <a:t>‹#›</a:t>
             </a:fld>
-            <a:endParaRPr lang="en-US" dirty="0"/>
+            <a:endParaRPr lang="en-US"/>
           </a:p>
         </p:txBody>
       </p:sp>
@@ -1552,7 +1555,7 @@
           </a:lstStyle>
           <a:p>
             <a:r>
-              <a:rPr lang="en-US" dirty="0"/>
+              <a:rPr lang="en-US"/>
               <a:t>Click to edit Master title style</a:t>
             </a:r>
           </a:p>
@@ -1671,7 +1674,7 @@
           <a:p>
             <a:pPr lvl="0"/>
             <a:r>
-              <a:rPr lang="en-US" dirty="0"/>
+              <a:rPr lang="en-US"/>
               <a:t>Click to edit Master text styles</a:t>
             </a:r>
           </a:p>
@@ -1695,9 +1698,9 @@
             <a:fld id="{B61BEF0D-F0BB-DE4B-95CE-6DB70DBA9567}" type="datetimeFigureOut">
               <a:rPr lang="en-US" dirty="0"/>
               <a:pPr/>
-              <a:t>11/11/2019</a:t>
+              <a:t>11/12/2019</a:t>
             </a:fld>
-            <a:endParaRPr lang="en-US" dirty="0"/>
+            <a:endParaRPr lang="en-US"/>
           </a:p>
         </p:txBody>
       </p:sp>
@@ -1716,7 +1719,7 @@
           <a:bodyPr/>
           <a:lstStyle/>
           <a:p>
-            <a:endParaRPr lang="en-US" dirty="0"/>
+            <a:endParaRPr lang="en-US"/>
           </a:p>
         </p:txBody>
       </p:sp>
@@ -1740,7 +1743,7 @@
               <a:pPr/>
               <a:t>‹#›</a:t>
             </a:fld>
-            <a:endParaRPr lang="en-US" dirty="0"/>
+            <a:endParaRPr lang="en-US"/>
           </a:p>
         </p:txBody>
       </p:sp>
@@ -1879,7 +1882,7 @@
           <a:p>
             <a:pPr lvl="0"/>
             <a:r>
-              <a:rPr lang="en-US" sz="8000" dirty="0">
+              <a:rPr lang="en-US" sz="8000">
                 <a:solidFill>
                   <a:schemeClr val="accent1"/>
                 </a:solidFill>
@@ -1994,7 +1997,7 @@
           <a:p>
             <a:pPr lvl="0" algn="r"/>
             <a:r>
-              <a:rPr lang="en-US" sz="8000" dirty="0">
+              <a:rPr lang="en-US" sz="8000">
                 <a:solidFill>
                   <a:schemeClr val="accent1"/>
                 </a:solidFill>
@@ -2035,7 +2038,7 @@
           </a:lstStyle>
           <a:p>
             <a:r>
-              <a:rPr lang="en-US" dirty="0"/>
+              <a:rPr lang="en-US"/>
               <a:t>Click to edit Master title style</a:t>
             </a:r>
           </a:p>
@@ -2096,7 +2099,7 @@
               <a:buNone/>
             </a:pPr>
             <a:r>
-              <a:rPr lang="en-US" dirty="0"/>
+              <a:rPr lang="en-US"/>
               <a:t>Click to edit Master text styles</a:t>
             </a:r>
           </a:p>
@@ -2215,7 +2218,7 @@
           <a:p>
             <a:pPr lvl="0"/>
             <a:r>
-              <a:rPr lang="en-US" dirty="0"/>
+              <a:rPr lang="en-US"/>
               <a:t>Click to edit Master text styles</a:t>
             </a:r>
           </a:p>
@@ -2239,9 +2242,9 @@
             <a:fld id="{B61BEF0D-F0BB-DE4B-95CE-6DB70DBA9567}" type="datetimeFigureOut">
               <a:rPr lang="en-US" dirty="0"/>
               <a:pPr/>
-              <a:t>11/11/2019</a:t>
+              <a:t>11/12/2019</a:t>
             </a:fld>
-            <a:endParaRPr lang="en-US" dirty="0"/>
+            <a:endParaRPr lang="en-US"/>
           </a:p>
         </p:txBody>
       </p:sp>
@@ -2260,7 +2263,7 @@
           <a:bodyPr/>
           <a:lstStyle/>
           <a:p>
-            <a:endParaRPr lang="en-US" dirty="0"/>
+            <a:endParaRPr lang="en-US"/>
           </a:p>
         </p:txBody>
       </p:sp>
@@ -2284,7 +2287,7 @@
               <a:pPr/>
               <a:t>‹#›</a:t>
             </a:fld>
-            <a:endParaRPr lang="en-US" dirty="0"/>
+            <a:endParaRPr lang="en-US"/>
           </a:p>
         </p:txBody>
       </p:sp>
@@ -2346,7 +2349,7 @@
           <a:p>
             <a:pPr marL="0" lvl="0"/>
             <a:r>
-              <a:rPr lang="en-US" dirty="0"/>
+              <a:rPr lang="en-US"/>
               <a:t>Click to edit Master title style</a:t>
             </a:r>
           </a:p>
@@ -2407,7 +2410,7 @@
               <a:buNone/>
             </a:pPr>
             <a:r>
-              <a:rPr lang="en-US" dirty="0"/>
+              <a:rPr lang="en-US"/>
               <a:t>Click to edit Master text styles</a:t>
             </a:r>
           </a:p>
@@ -2526,7 +2529,7 @@
           <a:p>
             <a:pPr lvl="0"/>
             <a:r>
-              <a:rPr lang="en-US" dirty="0"/>
+              <a:rPr lang="en-US"/>
               <a:t>Click to edit Master text styles</a:t>
             </a:r>
           </a:p>
@@ -2550,9 +2553,9 @@
             <a:fld id="{B61BEF0D-F0BB-DE4B-95CE-6DB70DBA9567}" type="datetimeFigureOut">
               <a:rPr lang="en-US" dirty="0"/>
               <a:pPr/>
-              <a:t>11/11/2019</a:t>
+              <a:t>11/12/2019</a:t>
             </a:fld>
-            <a:endParaRPr lang="en-US" dirty="0"/>
+            <a:endParaRPr lang="en-US"/>
           </a:p>
         </p:txBody>
       </p:sp>
@@ -2571,7 +2574,7 @@
           <a:bodyPr/>
           <a:lstStyle/>
           <a:p>
-            <a:endParaRPr lang="en-US" dirty="0"/>
+            <a:endParaRPr lang="en-US"/>
           </a:p>
         </p:txBody>
       </p:sp>
@@ -2595,7 +2598,7 @@
               <a:pPr/>
               <a:t>‹#›</a:t>
             </a:fld>
-            <a:endParaRPr lang="en-US" dirty="0"/>
+            <a:endParaRPr lang="en-US"/>
           </a:p>
         </p:txBody>
       </p:sp>
@@ -2650,7 +2653,7 @@
           <a:lstStyle/>
           <a:p>
             <a:r>
-              <a:rPr lang="en-US" dirty="0"/>
+              <a:rPr lang="en-US"/>
               <a:t>Click to edit Master title style</a:t>
             </a:r>
           </a:p>
@@ -2673,35 +2676,35 @@
           <a:p>
             <a:pPr lvl="0"/>
             <a:r>
-              <a:rPr lang="en-US" dirty="0"/>
+              <a:rPr lang="en-US"/>
               <a:t>Click to edit Master text styles</a:t>
             </a:r>
           </a:p>
           <a:p>
             <a:pPr lvl="1"/>
             <a:r>
-              <a:rPr lang="en-US" dirty="0"/>
+              <a:rPr lang="en-US"/>
               <a:t>Second level</a:t>
             </a:r>
           </a:p>
           <a:p>
             <a:pPr lvl="2"/>
             <a:r>
-              <a:rPr lang="en-US" dirty="0"/>
+              <a:rPr lang="en-US"/>
               <a:t>Third level</a:t>
             </a:r>
           </a:p>
           <a:p>
             <a:pPr lvl="3"/>
             <a:r>
-              <a:rPr lang="en-US" dirty="0"/>
+              <a:rPr lang="en-US"/>
               <a:t>Fourth level</a:t>
             </a:r>
           </a:p>
           <a:p>
             <a:pPr lvl="4"/>
             <a:r>
-              <a:rPr lang="en-US" dirty="0"/>
+              <a:rPr lang="en-US"/>
               <a:t>Fifth level</a:t>
             </a:r>
           </a:p>
@@ -2725,9 +2728,9 @@
             <a:fld id="{B61BEF0D-F0BB-DE4B-95CE-6DB70DBA9567}" type="datetimeFigureOut">
               <a:rPr lang="en-US" dirty="0"/>
               <a:pPr/>
-              <a:t>11/11/2019</a:t>
+              <a:t>11/12/2019</a:t>
             </a:fld>
-            <a:endParaRPr lang="en-US" dirty="0"/>
+            <a:endParaRPr lang="en-US"/>
           </a:p>
         </p:txBody>
       </p:sp>
@@ -2746,7 +2749,7 @@
           <a:bodyPr/>
           <a:lstStyle/>
           <a:p>
-            <a:endParaRPr lang="en-US" dirty="0"/>
+            <a:endParaRPr lang="en-US"/>
           </a:p>
         </p:txBody>
       </p:sp>
@@ -2770,7 +2773,7 @@
               <a:pPr/>
               <a:t>‹#›</a:t>
             </a:fld>
-            <a:endParaRPr lang="en-US" dirty="0"/>
+            <a:endParaRPr lang="en-US"/>
           </a:p>
         </p:txBody>
       </p:sp>
@@ -2825,7 +2828,7 @@
           <a:lstStyle/>
           <a:p>
             <a:r>
-              <a:rPr lang="en-US" dirty="0"/>
+              <a:rPr lang="en-US"/>
               <a:t>Click to edit Master title style</a:t>
             </a:r>
           </a:p>
@@ -2853,35 +2856,35 @@
           <a:p>
             <a:pPr lvl="0"/>
             <a:r>
-              <a:rPr lang="en-US" dirty="0"/>
+              <a:rPr lang="en-US"/>
               <a:t>Click to edit Master text styles</a:t>
             </a:r>
           </a:p>
           <a:p>
             <a:pPr lvl="1"/>
             <a:r>
-              <a:rPr lang="en-US" dirty="0"/>
+              <a:rPr lang="en-US"/>
               <a:t>Second level</a:t>
             </a:r>
           </a:p>
           <a:p>
             <a:pPr lvl="2"/>
             <a:r>
-              <a:rPr lang="en-US" dirty="0"/>
+              <a:rPr lang="en-US"/>
               <a:t>Third level</a:t>
             </a:r>
           </a:p>
           <a:p>
             <a:pPr lvl="3"/>
             <a:r>
-              <a:rPr lang="en-US" dirty="0"/>
+              <a:rPr lang="en-US"/>
               <a:t>Fourth level</a:t>
             </a:r>
           </a:p>
           <a:p>
             <a:pPr lvl="4"/>
             <a:r>
-              <a:rPr lang="en-US" dirty="0"/>
+              <a:rPr lang="en-US"/>
               <a:t>Fifth level</a:t>
             </a:r>
           </a:p>
@@ -2905,9 +2908,9 @@
             <a:fld id="{B61BEF0D-F0BB-DE4B-95CE-6DB70DBA9567}" type="datetimeFigureOut">
               <a:rPr lang="en-US" dirty="0"/>
               <a:pPr/>
-              <a:t>11/11/2019</a:t>
+              <a:t>11/12/2019</a:t>
             </a:fld>
-            <a:endParaRPr lang="en-US" dirty="0"/>
+            <a:endParaRPr lang="en-US"/>
           </a:p>
         </p:txBody>
       </p:sp>
@@ -2926,7 +2929,7 @@
           <a:bodyPr/>
           <a:lstStyle/>
           <a:p>
-            <a:endParaRPr lang="en-US" dirty="0"/>
+            <a:endParaRPr lang="en-US"/>
           </a:p>
         </p:txBody>
       </p:sp>
@@ -2950,7 +2953,7 @@
               <a:pPr/>
               <a:t>‹#›</a:t>
             </a:fld>
-            <a:endParaRPr lang="en-US" dirty="0"/>
+            <a:endParaRPr lang="en-US"/>
           </a:p>
         </p:txBody>
       </p:sp>
@@ -3000,7 +3003,7 @@
           <a:lstStyle/>
           <a:p>
             <a:r>
-              <a:rPr lang="en-US" dirty="0"/>
+              <a:rPr lang="en-US"/>
               <a:t>Click to edit Master title style</a:t>
             </a:r>
           </a:p>
@@ -3023,35 +3026,35 @@
           <a:p>
             <a:pPr lvl="0"/>
             <a:r>
-              <a:rPr lang="en-US" dirty="0"/>
+              <a:rPr lang="en-US"/>
               <a:t>Click to edit Master text styles</a:t>
             </a:r>
           </a:p>
           <a:p>
             <a:pPr lvl="1"/>
             <a:r>
-              <a:rPr lang="en-US" dirty="0"/>
+              <a:rPr lang="en-US"/>
               <a:t>Second level</a:t>
             </a:r>
           </a:p>
           <a:p>
             <a:pPr lvl="2"/>
             <a:r>
-              <a:rPr lang="en-US" dirty="0"/>
+              <a:rPr lang="en-US"/>
               <a:t>Third level</a:t>
             </a:r>
           </a:p>
           <a:p>
             <a:pPr lvl="3"/>
             <a:r>
-              <a:rPr lang="en-US" dirty="0"/>
+              <a:rPr lang="en-US"/>
               <a:t>Fourth level</a:t>
             </a:r>
           </a:p>
           <a:p>
             <a:pPr lvl="4"/>
             <a:r>
-              <a:rPr lang="en-US" dirty="0"/>
+              <a:rPr lang="en-US"/>
               <a:t>Fifth level</a:t>
             </a:r>
           </a:p>
@@ -3075,9 +3078,9 @@
             <a:fld id="{B61BEF0D-F0BB-DE4B-95CE-6DB70DBA9567}" type="datetimeFigureOut">
               <a:rPr lang="en-US" dirty="0"/>
               <a:pPr/>
-              <a:t>11/11/2019</a:t>
+              <a:t>11/12/2019</a:t>
             </a:fld>
-            <a:endParaRPr lang="en-US" dirty="0"/>
+            <a:endParaRPr lang="en-US"/>
           </a:p>
         </p:txBody>
       </p:sp>
@@ -3096,7 +3099,7 @@
           <a:bodyPr/>
           <a:lstStyle/>
           <a:p>
-            <a:endParaRPr lang="en-US" dirty="0"/>
+            <a:endParaRPr lang="en-US"/>
           </a:p>
         </p:txBody>
       </p:sp>
@@ -3120,7 +3123,7 @@
               <a:pPr/>
               <a:t>‹#›</a:t>
             </a:fld>
-            <a:endParaRPr lang="en-US" dirty="0"/>
+            <a:endParaRPr lang="en-US"/>
           </a:p>
         </p:txBody>
       </p:sp>
@@ -3181,7 +3184,7 @@
           </a:lstStyle>
           <a:p>
             <a:r>
-              <a:rPr lang="en-US" dirty="0"/>
+              <a:rPr lang="en-US"/>
               <a:t>Click to edit Master title style</a:t>
             </a:r>
           </a:p>
@@ -3300,7 +3303,7 @@
           <a:p>
             <a:pPr lvl="0"/>
             <a:r>
-              <a:rPr lang="en-US" dirty="0"/>
+              <a:rPr lang="en-US"/>
               <a:t>Click to edit Master text styles</a:t>
             </a:r>
           </a:p>
@@ -3324,9 +3327,9 @@
             <a:fld id="{B61BEF0D-F0BB-DE4B-95CE-6DB70DBA9567}" type="datetimeFigureOut">
               <a:rPr lang="en-US" dirty="0"/>
               <a:pPr/>
-              <a:t>11/11/2019</a:t>
+              <a:t>11/12/2019</a:t>
             </a:fld>
-            <a:endParaRPr lang="en-US" dirty="0"/>
+            <a:endParaRPr lang="en-US"/>
           </a:p>
         </p:txBody>
       </p:sp>
@@ -3345,7 +3348,7 @@
           <a:bodyPr/>
           <a:lstStyle/>
           <a:p>
-            <a:endParaRPr lang="en-US" dirty="0"/>
+            <a:endParaRPr lang="en-US"/>
           </a:p>
         </p:txBody>
       </p:sp>
@@ -3369,7 +3372,7 @@
               <a:pPr/>
               <a:t>‹#›</a:t>
             </a:fld>
-            <a:endParaRPr lang="en-US" dirty="0"/>
+            <a:endParaRPr lang="en-US"/>
           </a:p>
         </p:txBody>
       </p:sp>
@@ -3419,7 +3422,7 @@
           <a:lstStyle/>
           <a:p>
             <a:r>
-              <a:rPr lang="en-US" dirty="0"/>
+              <a:rPr lang="en-US"/>
               <a:t>Click to edit Master title style</a:t>
             </a:r>
           </a:p>
@@ -3477,35 +3480,35 @@
           <a:p>
             <a:pPr lvl="0"/>
             <a:r>
-              <a:rPr lang="en-US" dirty="0"/>
+              <a:rPr lang="en-US"/>
               <a:t>Click to edit Master text styles</a:t>
             </a:r>
           </a:p>
           <a:p>
             <a:pPr lvl="1"/>
             <a:r>
-              <a:rPr lang="en-US" dirty="0"/>
+              <a:rPr lang="en-US"/>
               <a:t>Second level</a:t>
             </a:r>
           </a:p>
           <a:p>
             <a:pPr lvl="2"/>
             <a:r>
-              <a:rPr lang="en-US" dirty="0"/>
+              <a:rPr lang="en-US"/>
               <a:t>Third level</a:t>
             </a:r>
           </a:p>
           <a:p>
             <a:pPr lvl="3"/>
             <a:r>
-              <a:rPr lang="en-US" dirty="0"/>
+              <a:rPr lang="en-US"/>
               <a:t>Fourth level</a:t>
             </a:r>
           </a:p>
           <a:p>
             <a:pPr lvl="4"/>
             <a:r>
-              <a:rPr lang="en-US" dirty="0"/>
+              <a:rPr lang="en-US"/>
               <a:t>Fifth level</a:t>
             </a:r>
           </a:p>
@@ -3563,35 +3566,35 @@
           <a:p>
             <a:pPr lvl="0"/>
             <a:r>
-              <a:rPr lang="en-US" dirty="0"/>
+              <a:rPr lang="en-US"/>
               <a:t>Click to edit Master text styles</a:t>
             </a:r>
           </a:p>
           <a:p>
             <a:pPr lvl="1"/>
             <a:r>
-              <a:rPr lang="en-US" dirty="0"/>
+              <a:rPr lang="en-US"/>
               <a:t>Second level</a:t>
             </a:r>
           </a:p>
           <a:p>
             <a:pPr lvl="2"/>
             <a:r>
-              <a:rPr lang="en-US" dirty="0"/>
+              <a:rPr lang="en-US"/>
               <a:t>Third level</a:t>
             </a:r>
           </a:p>
           <a:p>
             <a:pPr lvl="3"/>
             <a:r>
-              <a:rPr lang="en-US" dirty="0"/>
+              <a:rPr lang="en-US"/>
               <a:t>Fourth level</a:t>
             </a:r>
           </a:p>
           <a:p>
             <a:pPr lvl="4"/>
             <a:r>
-              <a:rPr lang="en-US" dirty="0"/>
+              <a:rPr lang="en-US"/>
               <a:t>Fifth level</a:t>
             </a:r>
           </a:p>
@@ -3615,9 +3618,9 @@
             <a:fld id="{B61BEF0D-F0BB-DE4B-95CE-6DB70DBA9567}" type="datetimeFigureOut">
               <a:rPr lang="en-US" dirty="0"/>
               <a:pPr/>
-              <a:t>11/11/2019</a:t>
+              <a:t>11/12/2019</a:t>
             </a:fld>
-            <a:endParaRPr lang="en-US" dirty="0"/>
+            <a:endParaRPr lang="en-US"/>
           </a:p>
         </p:txBody>
       </p:sp>
@@ -3636,7 +3639,7 @@
           <a:bodyPr/>
           <a:lstStyle/>
           <a:p>
-            <a:endParaRPr lang="en-US" dirty="0"/>
+            <a:endParaRPr lang="en-US"/>
           </a:p>
         </p:txBody>
       </p:sp>
@@ -3660,7 +3663,7 @@
               <a:pPr/>
               <a:t>‹#›</a:t>
             </a:fld>
-            <a:endParaRPr lang="en-US" dirty="0"/>
+            <a:endParaRPr lang="en-US"/>
           </a:p>
         </p:txBody>
       </p:sp>
@@ -3714,7 +3717,7 @@
           </a:lstStyle>
           <a:p>
             <a:r>
-              <a:rPr lang="en-US" dirty="0"/>
+              <a:rPr lang="en-US"/>
               <a:t>Click to edit Master title style</a:t>
             </a:r>
           </a:p>
@@ -3781,7 +3784,7 @@
           <a:p>
             <a:pPr lvl="0"/>
             <a:r>
-              <a:rPr lang="en-US" dirty="0"/>
+              <a:rPr lang="en-US"/>
               <a:t>Click to edit Master text styles</a:t>
             </a:r>
           </a:p>
@@ -3839,35 +3842,35 @@
           <a:p>
             <a:pPr lvl="0"/>
             <a:r>
-              <a:rPr lang="en-US" dirty="0"/>
+              <a:rPr lang="en-US"/>
               <a:t>Click to edit Master text styles</a:t>
             </a:r>
           </a:p>
           <a:p>
             <a:pPr lvl="1"/>
             <a:r>
-              <a:rPr lang="en-US" dirty="0"/>
+              <a:rPr lang="en-US"/>
               <a:t>Second level</a:t>
             </a:r>
           </a:p>
           <a:p>
             <a:pPr lvl="2"/>
             <a:r>
-              <a:rPr lang="en-US" dirty="0"/>
+              <a:rPr lang="en-US"/>
               <a:t>Third level</a:t>
             </a:r>
           </a:p>
           <a:p>
             <a:pPr lvl="3"/>
             <a:r>
-              <a:rPr lang="en-US" dirty="0"/>
+              <a:rPr lang="en-US"/>
               <a:t>Fourth level</a:t>
             </a:r>
           </a:p>
           <a:p>
             <a:pPr lvl="4"/>
             <a:r>
-              <a:rPr lang="en-US" dirty="0"/>
+              <a:rPr lang="en-US"/>
               <a:t>Fifth level</a:t>
             </a:r>
           </a:p>
@@ -3934,7 +3937,7 @@
           <a:p>
             <a:pPr lvl="0"/>
             <a:r>
-              <a:rPr lang="en-US" dirty="0"/>
+              <a:rPr lang="en-US"/>
               <a:t>Click to edit Master text styles</a:t>
             </a:r>
           </a:p>
@@ -3992,35 +3995,35 @@
           <a:p>
             <a:pPr lvl="0"/>
             <a:r>
-              <a:rPr lang="en-US" dirty="0"/>
+              <a:rPr lang="en-US"/>
               <a:t>Click to edit Master text styles</a:t>
             </a:r>
           </a:p>
           <a:p>
             <a:pPr lvl="1"/>
             <a:r>
-              <a:rPr lang="en-US" dirty="0"/>
+              <a:rPr lang="en-US"/>
               <a:t>Second level</a:t>
             </a:r>
           </a:p>
           <a:p>
             <a:pPr lvl="2"/>
             <a:r>
-              <a:rPr lang="en-US" dirty="0"/>
+              <a:rPr lang="en-US"/>
               <a:t>Third level</a:t>
             </a:r>
           </a:p>
           <a:p>
             <a:pPr lvl="3"/>
             <a:r>
-              <a:rPr lang="en-US" dirty="0"/>
+              <a:rPr lang="en-US"/>
               <a:t>Fourth level</a:t>
             </a:r>
           </a:p>
           <a:p>
             <a:pPr lvl="4"/>
             <a:r>
-              <a:rPr lang="en-US" dirty="0"/>
+              <a:rPr lang="en-US"/>
               <a:t>Fifth level</a:t>
             </a:r>
           </a:p>
@@ -4044,9 +4047,9 @@
             <a:fld id="{B61BEF0D-F0BB-DE4B-95CE-6DB70DBA9567}" type="datetimeFigureOut">
               <a:rPr lang="en-US" dirty="0"/>
               <a:pPr/>
-              <a:t>11/11/2019</a:t>
+              <a:t>11/12/2019</a:t>
             </a:fld>
-            <a:endParaRPr lang="en-US" dirty="0"/>
+            <a:endParaRPr lang="en-US"/>
           </a:p>
         </p:txBody>
       </p:sp>
@@ -4065,7 +4068,7 @@
           <a:bodyPr/>
           <a:lstStyle/>
           <a:p>
-            <a:endParaRPr lang="en-US" dirty="0"/>
+            <a:endParaRPr lang="en-US"/>
           </a:p>
         </p:txBody>
       </p:sp>
@@ -4089,7 +4092,7 @@
               <a:pPr/>
               <a:t>‹#›</a:t>
             </a:fld>
-            <a:endParaRPr lang="en-US" dirty="0"/>
+            <a:endParaRPr lang="en-US"/>
           </a:p>
         </p:txBody>
       </p:sp>
@@ -4145,7 +4148,7 @@
           </a:lstStyle>
           <a:p>
             <a:r>
-              <a:rPr lang="en-US" dirty="0"/>
+              <a:rPr lang="en-US"/>
               <a:t>Click to edit Master title style</a:t>
             </a:r>
           </a:p>
@@ -4169,9 +4172,9 @@
             <a:fld id="{B61BEF0D-F0BB-DE4B-95CE-6DB70DBA9567}" type="datetimeFigureOut">
               <a:rPr lang="en-US" dirty="0"/>
               <a:pPr/>
-              <a:t>11/11/2019</a:t>
+              <a:t>11/12/2019</a:t>
             </a:fld>
-            <a:endParaRPr lang="en-US" dirty="0"/>
+            <a:endParaRPr lang="en-US"/>
           </a:p>
         </p:txBody>
       </p:sp>
@@ -4190,7 +4193,7 @@
           <a:bodyPr/>
           <a:lstStyle/>
           <a:p>
-            <a:endParaRPr lang="en-US" dirty="0"/>
+            <a:endParaRPr lang="en-US"/>
           </a:p>
         </p:txBody>
       </p:sp>
@@ -4214,7 +4217,7 @@
               <a:pPr/>
               <a:t>‹#›</a:t>
             </a:fld>
-            <a:endParaRPr lang="en-US" dirty="0"/>
+            <a:endParaRPr lang="en-US"/>
           </a:p>
         </p:txBody>
       </p:sp>
@@ -4266,9 +4269,9 @@
             <a:fld id="{B61BEF0D-F0BB-DE4B-95CE-6DB70DBA9567}" type="datetimeFigureOut">
               <a:rPr lang="en-US" dirty="0"/>
               <a:pPr/>
-              <a:t>11/11/2019</a:t>
+              <a:t>11/12/2019</a:t>
             </a:fld>
-            <a:endParaRPr lang="en-US" dirty="0"/>
+            <a:endParaRPr lang="en-US"/>
           </a:p>
         </p:txBody>
       </p:sp>
@@ -4287,7 +4290,7 @@
           <a:bodyPr/>
           <a:lstStyle/>
           <a:p>
-            <a:endParaRPr lang="en-US" dirty="0"/>
+            <a:endParaRPr lang="en-US"/>
           </a:p>
         </p:txBody>
       </p:sp>
@@ -4311,7 +4314,7 @@
               <a:pPr/>
               <a:t>‹#›</a:t>
             </a:fld>
-            <a:endParaRPr lang="en-US" dirty="0"/>
+            <a:endParaRPr lang="en-US"/>
           </a:p>
         </p:txBody>
       </p:sp>
@@ -4372,7 +4375,7 @@
           </a:lstStyle>
           <a:p>
             <a:r>
-              <a:rPr lang="en-US" dirty="0"/>
+              <a:rPr lang="en-US"/>
               <a:t>Click to edit Master title style</a:t>
             </a:r>
           </a:p>
@@ -4430,35 +4433,35 @@
           <a:p>
             <a:pPr lvl="0"/>
             <a:r>
-              <a:rPr lang="en-US" dirty="0"/>
+              <a:rPr lang="en-US"/>
               <a:t>Click to edit Master text styles</a:t>
             </a:r>
           </a:p>
           <a:p>
             <a:pPr lvl="1"/>
             <a:r>
-              <a:rPr lang="en-US" dirty="0"/>
+              <a:rPr lang="en-US"/>
               <a:t>Second level</a:t>
             </a:r>
           </a:p>
           <a:p>
             <a:pPr lvl="2"/>
             <a:r>
-              <a:rPr lang="en-US" dirty="0"/>
+              <a:rPr lang="en-US"/>
               <a:t>Third level</a:t>
             </a:r>
           </a:p>
           <a:p>
             <a:pPr lvl="3"/>
             <a:r>
-              <a:rPr lang="en-US" dirty="0"/>
+              <a:rPr lang="en-US"/>
               <a:t>Fourth level</a:t>
             </a:r>
           </a:p>
           <a:p>
             <a:pPr lvl="4"/>
             <a:r>
-              <a:rPr lang="en-US" dirty="0"/>
+              <a:rPr lang="en-US"/>
               <a:t>Fifth level</a:t>
             </a:r>
           </a:p>
@@ -4525,7 +4528,7 @@
           <a:p>
             <a:pPr lvl="0"/>
             <a:r>
-              <a:rPr lang="en-US" dirty="0"/>
+              <a:rPr lang="en-US"/>
               <a:t>Click to edit Master text styles</a:t>
             </a:r>
           </a:p>
@@ -4549,9 +4552,9 @@
             <a:fld id="{B61BEF0D-F0BB-DE4B-95CE-6DB70DBA9567}" type="datetimeFigureOut">
               <a:rPr lang="en-US" dirty="0"/>
               <a:pPr/>
-              <a:t>11/11/2019</a:t>
+              <a:t>11/12/2019</a:t>
             </a:fld>
-            <a:endParaRPr lang="en-US" dirty="0"/>
+            <a:endParaRPr lang="en-US"/>
           </a:p>
         </p:txBody>
       </p:sp>
@@ -4570,7 +4573,7 @@
           <a:bodyPr/>
           <a:lstStyle/>
           <a:p>
-            <a:endParaRPr lang="en-US" dirty="0"/>
+            <a:endParaRPr lang="en-US"/>
           </a:p>
         </p:txBody>
       </p:sp>
@@ -4594,7 +4597,7 @@
               <a:pPr/>
               <a:t>‹#›</a:t>
             </a:fld>
-            <a:endParaRPr lang="en-US" dirty="0"/>
+            <a:endParaRPr lang="en-US"/>
           </a:p>
         </p:txBody>
       </p:sp>
@@ -4655,7 +4658,7 @@
           </a:lstStyle>
           <a:p>
             <a:r>
-              <a:rPr lang="en-US" dirty="0"/>
+              <a:rPr lang="en-US"/>
               <a:t>Click to edit Master title style</a:t>
             </a:r>
           </a:p>
@@ -4743,7 +4746,7 @@
             </a:lvl9pPr>
           </a:lstStyle>
           <a:p>
-            <a:endParaRPr lang="en-US" dirty="0"/>
+            <a:endParaRPr lang="en-US"/>
           </a:p>
         </p:txBody>
       </p:sp>
@@ -4808,7 +4811,7 @@
           <a:p>
             <a:pPr lvl="0"/>
             <a:r>
-              <a:rPr lang="en-US" dirty="0"/>
+              <a:rPr lang="en-US"/>
               <a:t>Click to edit Master text styles</a:t>
             </a:r>
           </a:p>
@@ -4837,9 +4840,9 @@
             <a:fld id="{B61BEF0D-F0BB-DE4B-95CE-6DB70DBA9567}" type="datetimeFigureOut">
               <a:rPr lang="en-US" dirty="0"/>
               <a:pPr/>
-              <a:t>11/11/2019</a:t>
+              <a:t>11/12/2019</a:t>
             </a:fld>
-            <a:endParaRPr lang="en-US" dirty="0"/>
+            <a:endParaRPr lang="en-US"/>
           </a:p>
         </p:txBody>
       </p:sp>
@@ -4863,7 +4866,7 @@
           <a:bodyPr/>
           <a:lstStyle/>
           <a:p>
-            <a:endParaRPr lang="en-US" dirty="0"/>
+            <a:endParaRPr lang="en-US"/>
           </a:p>
         </p:txBody>
       </p:sp>
@@ -4892,7 +4895,7 @@
               <a:pPr/>
               <a:t>‹#›</a:t>
             </a:fld>
-            <a:endParaRPr lang="en-US" dirty="0"/>
+            <a:endParaRPr lang="en-US"/>
           </a:p>
         </p:txBody>
       </p:sp>
@@ -4957,7 +4960,7 @@
           <a:lstStyle/>
           <a:p>
             <a:r>
-              <a:rPr lang="en-US" dirty="0"/>
+              <a:rPr lang="en-US"/>
               <a:t>Click to edit Master title style</a:t>
             </a:r>
           </a:p>
@@ -4990,63 +4993,63 @@
           <a:p>
             <a:pPr lvl="0"/>
             <a:r>
-              <a:rPr lang="en-US" dirty="0"/>
+              <a:rPr lang="en-US"/>
               <a:t>Click to edit Master text styles</a:t>
             </a:r>
           </a:p>
           <a:p>
             <a:pPr lvl="1"/>
             <a:r>
-              <a:rPr lang="en-US" dirty="0"/>
+              <a:rPr lang="en-US"/>
               <a:t>Second level</a:t>
             </a:r>
           </a:p>
           <a:p>
             <a:pPr lvl="2"/>
             <a:r>
-              <a:rPr lang="en-US" dirty="0"/>
+              <a:rPr lang="en-US"/>
               <a:t>Third level</a:t>
             </a:r>
           </a:p>
           <a:p>
             <a:pPr lvl="3"/>
             <a:r>
-              <a:rPr lang="en-US" dirty="0"/>
+              <a:rPr lang="en-US"/>
               <a:t>Fourth level</a:t>
             </a:r>
           </a:p>
           <a:p>
             <a:pPr lvl="4"/>
             <a:r>
-              <a:rPr lang="en-US" dirty="0"/>
+              <a:rPr lang="en-US"/>
               <a:t>Fifth level</a:t>
             </a:r>
           </a:p>
           <a:p>
             <a:pPr lvl="5"/>
             <a:r>
-              <a:rPr lang="en-US" dirty="0"/>
+              <a:rPr lang="en-US"/>
               <a:t>Six</a:t>
             </a:r>
           </a:p>
           <a:p>
             <a:pPr lvl="6"/>
             <a:r>
-              <a:rPr lang="en-US" dirty="0"/>
+              <a:rPr lang="en-US"/>
               <a:t>Seven</a:t>
             </a:r>
           </a:p>
           <a:p>
             <a:pPr lvl="7"/>
             <a:r>
-              <a:rPr lang="en-US" dirty="0"/>
+              <a:rPr lang="en-US"/>
               <a:t>Eight</a:t>
             </a:r>
           </a:p>
           <a:p>
             <a:pPr lvl="8"/>
             <a:r>
-              <a:rPr lang="en-US" dirty="0"/>
+              <a:rPr lang="en-US"/>
               <a:t>nine</a:t>
             </a:r>
           </a:p>
@@ -5096,9 +5099,9 @@
             <a:fld id="{B61BEF0D-F0BB-DE4B-95CE-6DB70DBA9567}" type="datetimeFigureOut">
               <a:rPr lang="en-US" dirty="0"/>
               <a:pPr/>
-              <a:t>11/11/2019</a:t>
+              <a:t>11/12/2019</a:t>
             </a:fld>
-            <a:endParaRPr lang="en-US" dirty="0"/>
+            <a:endParaRPr lang="en-US"/>
           </a:p>
         </p:txBody>
       </p:sp>
@@ -5143,7 +5146,7 @@
             </a:lvl1pPr>
           </a:lstStyle>
           <a:p>
-            <a:endParaRPr lang="en-US" dirty="0"/>
+            <a:endParaRPr lang="en-US"/>
           </a:p>
         </p:txBody>
       </p:sp>
@@ -5193,7 +5196,7 @@
               <a:pPr/>
               <a:t>‹#›</a:t>
             </a:fld>
-            <a:endParaRPr lang="en-US" dirty="0"/>
+            <a:endParaRPr lang="en-US"/>
           </a:p>
         </p:txBody>
       </p:sp>
@@ -5819,10 +5822,10 @@
           <a:p>
             <a:pPr algn="ctr"/>
             <a:r>
-              <a:rPr lang="en-US" sz="7200" dirty="0"/>
+              <a:rPr lang="en-US" sz="7200"/>
               <a:t>JavaScript</a:t>
             </a:r>
-            <a:endParaRPr lang="en-US" sz="7200" dirty="0">
+            <a:endParaRPr lang="en-US" sz="7200">
               <a:effectLst>
                 <a:glow rad="38100">
                   <a:prstClr val="black">
@@ -5869,10 +5872,10 @@
               </a:spcAft>
             </a:pPr>
             <a:r>
-              <a:rPr lang="en-US" sz="2800" dirty="0"/>
+              <a:rPr lang="en-US" sz="2800"/>
               <a:t>Fundamentals</a:t>
             </a:r>
-            <a:endParaRPr lang="en-US" sz="2800" dirty="0">
+            <a:endParaRPr lang="en-US" sz="2800">
               <a:effectLst>
                 <a:glow rad="38100">
                   <a:prstClr val="black">
@@ -5925,7 +5928,7 @@
             <a:pPr algn="ctr"/>
             <a:r>
               <a:rPr lang="en-US" sz="2400" dirty="0"/>
-              <a:t>We'll be using Visual Studio and Chrome on Windows today.</a:t>
+              <a:t>We'll be using Windows today.</a:t>
             </a:r>
           </a:p>
         </p:txBody>
@@ -5990,7 +5993,7 @@
           <a:p>
             <a:pPr algn="ctr"/>
             <a:r>
-              <a:rPr lang="en-US" sz="3200" b="1" dirty="0"/>
+              <a:rPr lang="en-US" sz="3200" b="1"/>
               <a:t>Language Basics</a:t>
             </a:r>
             <a:endParaRPr lang="en-US" sz="3200">
@@ -6369,13 +6372,13 @@
               <a:buChar char="•"/>
             </a:pPr>
             <a:r>
-              <a:rPr lang="en-US" sz="2800" dirty="0">
+              <a:rPr lang="en-US" sz="2800">
                 <a:ea typeface="+mn-lt"/>
                 <a:cs typeface="+mn-lt"/>
               </a:rPr>
               <a:t>Follows most Java expression syntax, naming conventions and basic control-flow constructs</a:t>
             </a:r>
-            <a:endParaRPr lang="en-US" sz="2800" dirty="0"/>
+            <a:endParaRPr lang="en-US" sz="2800"/>
           </a:p>
         </p:txBody>
       </p:sp>
@@ -6415,13 +6418,13 @@
               <a:buChar char="•"/>
             </a:pPr>
             <a:r>
-              <a:rPr lang="en-US" sz="2800" dirty="0">
+              <a:rPr lang="en-US" sz="2800">
                 <a:ea typeface="+mn-lt"/>
                 <a:cs typeface="+mn-lt"/>
               </a:rPr>
               <a:t>JavaScript is dynamically typed, lacks Java's static types and strong type checking</a:t>
             </a:r>
-            <a:endParaRPr lang="en-US" sz="2800" dirty="0"/>
+            <a:endParaRPr lang="en-US" sz="2800"/>
           </a:p>
         </p:txBody>
       </p:sp>
@@ -6625,10 +6628,10 @@
           <a:p>
             <a:pPr algn="ctr"/>
             <a:r>
-              <a:rPr lang="en-US" sz="3200" b="1" dirty="0"/>
+              <a:rPr lang="en-US" sz="3200" b="1"/>
               <a:t>Hello JS: The developer console</a:t>
             </a:r>
-            <a:endParaRPr lang="en-US" sz="3200" dirty="0">
+            <a:endParaRPr lang="en-US" sz="3200">
               <a:effectLst>
                 <a:glow rad="38100">
                   <a:prstClr val="black">
@@ -6683,13 +6686,13 @@
               <a:buChar char="•"/>
             </a:pPr>
             <a:r>
-              <a:rPr lang="en-US" sz="2800" dirty="0">
+              <a:rPr lang="en-US" sz="2800">
                 <a:ea typeface="+mn-lt"/>
                 <a:cs typeface="+mn-lt"/>
               </a:rPr>
               <a:t>Open Google Chrome and press F12</a:t>
             </a:r>
-            <a:endParaRPr lang="en-US" sz="2800" dirty="0"/>
+            <a:endParaRPr lang="en-US" sz="2800"/>
           </a:p>
         </p:txBody>
       </p:sp>
@@ -6759,13 +6762,13 @@
               <a:buChar char="•"/>
             </a:pPr>
             <a:r>
-              <a:rPr lang="en-US" sz="2800" dirty="0">
+              <a:rPr lang="en-US" sz="2800">
                 <a:ea typeface="+mn-lt"/>
                 <a:cs typeface="+mn-lt"/>
               </a:rPr>
               <a:t>Click on the Console tab</a:t>
             </a:r>
-            <a:endParaRPr lang="en-US" sz="2800" dirty="0"/>
+            <a:endParaRPr lang="en-US" sz="2800"/>
           </a:p>
         </p:txBody>
       </p:sp>
@@ -6805,7 +6808,7 @@
               <a:buChar char="•"/>
             </a:pPr>
             <a:r>
-              <a:rPr lang="en-US" sz="2800" dirty="0">
+              <a:rPr lang="en-US" sz="2800">
                 <a:ea typeface="+mn-lt"/>
                 <a:cs typeface="+mn-lt"/>
               </a:rPr>
@@ -6814,11 +6817,11 @@
           </a:p>
           <a:p>
             <a:r>
-              <a:rPr lang="en-US" sz="2800" dirty="0"/>
+              <a:rPr lang="en-US" sz="2800"/>
               <a:t>   </a:t>
             </a:r>
             <a:r>
-              <a:rPr lang="en-US" sz="2800" dirty="0">
+              <a:rPr lang="en-US" sz="2800">
                 <a:latin typeface="Consolas"/>
               </a:rPr>
               <a:t>Console.log("Hello, JS!")</a:t>
@@ -7217,10 +7220,10 @@
           <a:p>
             <a:pPr algn="ctr"/>
             <a:r>
-              <a:rPr lang="en-US" sz="3200" b="1" dirty="0"/>
+              <a:rPr lang="en-US" sz="3200" b="1"/>
               <a:t>Hello JS: The developer console</a:t>
             </a:r>
-            <a:endParaRPr lang="en-US" sz="3200" dirty="0">
+            <a:endParaRPr lang="en-US" sz="3200">
               <a:effectLst>
                 <a:glow rad="38100">
                   <a:prstClr val="black">
@@ -7275,18 +7278,11 @@
               <a:buChar char="•"/>
             </a:pPr>
             <a:r>
-              <a:rPr lang="en-US" sz="2800" dirty="0">
-                <a:ea typeface="+mn-lt"/>
-                <a:cs typeface="+mn-lt"/>
-              </a:rPr>
-              <a:t>The developer console will allow us to </a:t>
-            </a:r>
-            <a:r>
               <a:rPr lang="en-US" sz="2800">
                 <a:ea typeface="+mn-lt"/>
                 <a:cs typeface="+mn-lt"/>
               </a:rPr>
-              <a:t>debug our JavaScript</a:t>
+              <a:t>The developer console will allow us to debug our JavaScript</a:t>
             </a:r>
             <a:endParaRPr lang="en-US" sz="2800"/>
           </a:p>
@@ -7306,7 +7302,7 @@
         </p:nvSpPr>
         <p:spPr>
           <a:xfrm>
-            <a:off x="655677" y="3733428"/>
+            <a:off x="628783" y="3760322"/>
             <a:ext cx="7884204" cy="954107"/>
           </a:xfrm>
           <a:prstGeom prst="rect">
@@ -7328,12 +7324,8 @@
               <a:buChar char="•"/>
             </a:pPr>
             <a:r>
-              <a:rPr lang="en-US" sz="2800" dirty="0"/>
-              <a:t>We can also run arbitrary JavaScript in </a:t>
-            </a:r>
-            <a:r>
               <a:rPr lang="en-US" sz="2800"/>
-              <a:t>Chrome's interpreter</a:t>
+              <a:t>We can also run arbitrary JavaScript in Chrome's interpreter</a:t>
             </a:r>
             <a:endParaRPr lang="en-US"/>
           </a:p>
@@ -7488,7 +7480,7 @@
           <a:p>
             <a:pPr algn="l"/>
             <a:r>
-              <a:rPr lang="en-US" dirty="0">
+              <a:rPr lang="en-US">
                 <a:ea typeface="+mn-lt"/>
                 <a:cs typeface="+mn-lt"/>
                 <a:hlinkClick r:id="rId3"/>
@@ -8125,7 +8117,7 @@
           <a:lstStyle/>
           <a:p>
             <a:r>
-              <a:rPr lang="en-US" sz="2800" dirty="0"/>
+              <a:rPr lang="en-US" sz="2800"/>
               <a:t>The JavaScript is contained in the string assigned to the 'onclick' attribute of the button element:</a:t>
             </a:r>
           </a:p>
@@ -8135,19 +8127,19 @@
             </a:endParaRPr>
           </a:p>
           <a:p>
-            <a:endParaRPr lang="en-US" sz="3200" dirty="0">
+            <a:endParaRPr lang="en-US" sz="3200">
               <a:latin typeface="Century Gothic"/>
             </a:endParaRPr>
           </a:p>
           <a:p>
             <a:r>
-              <a:rPr lang="en-US" sz="2800" dirty="0">
+              <a:rPr lang="en-US" sz="2800">
                 <a:latin typeface="Consolas"/>
               </a:rPr>
               <a:t>"</a:t>
             </a:r>
             <a:r>
-              <a:rPr lang="en-US" sz="2800" dirty="0" err="1">
+              <a:rPr lang="en-US" sz="2800" err="1">
                 <a:latin typeface="Consolas"/>
                 <a:ea typeface="+mn-lt"/>
                 <a:cs typeface="+mn-lt"/>
@@ -8155,7 +8147,7 @@
               <a:t>document.getElementById</a:t>
             </a:r>
             <a:r>
-              <a:rPr lang="en-US" sz="2800" dirty="0">
+              <a:rPr lang="en-US" sz="2800">
                 <a:latin typeface="Consolas"/>
                 <a:ea typeface="+mn-lt"/>
                 <a:cs typeface="+mn-lt"/>
@@ -8163,7 +8155,7 @@
               <a:t>('demo').</a:t>
             </a:r>
             <a:r>
-              <a:rPr lang="en-US" sz="2800" dirty="0" err="1">
+              <a:rPr lang="en-US" sz="2800" err="1">
                 <a:latin typeface="Consolas"/>
                 <a:ea typeface="+mn-lt"/>
                 <a:cs typeface="+mn-lt"/>
@@ -8171,7 +8163,7 @@
               <a:t>innerHTML</a:t>
             </a:r>
             <a:r>
-              <a:rPr lang="en-US" sz="2800" dirty="0">
+              <a:rPr lang="en-US" sz="2800">
                 <a:latin typeface="Consolas"/>
                 <a:ea typeface="+mn-lt"/>
                 <a:cs typeface="+mn-lt"/>
@@ -8185,7 +8177,7 @@
             </a:endParaRPr>
           </a:p>
           <a:p>
-            <a:endParaRPr lang="en-US" sz="2800" dirty="0"/>
+            <a:endParaRPr lang="en-US" sz="2800"/>
           </a:p>
         </p:txBody>
       </p:sp>
@@ -8222,10 +8214,9 @@
           <a:p>
             <a:pPr algn="ctr"/>
             <a:r>
-              <a:rPr lang="en-US" sz="2800" dirty="0"/>
+              <a:rPr lang="en-US" sz="2800"/>
               <a:t>When the button is clicked, a click event triggers and the JavaScript runs.</a:t>
             </a:r>
-            <a:endParaRPr lang="en-US" sz="2800"/>
           </a:p>
         </p:txBody>
       </p:sp>
@@ -8432,7 +8423,7 @@
           <a:lstStyle/>
           <a:p>
             <a:r>
-              <a:rPr lang="en-US" sz="2800" b="1" dirty="0" err="1">
+              <a:rPr lang="en-US" sz="2800" b="1" err="1">
                 <a:latin typeface="Consolas"/>
                 <a:ea typeface="+mn-lt"/>
                 <a:cs typeface="+mn-lt"/>
@@ -8440,7 +8431,7 @@
               <a:t>document.getElementById</a:t>
             </a:r>
             <a:r>
-              <a:rPr lang="en-US" sz="2800" b="1" dirty="0">
+              <a:rPr lang="en-US" sz="2800" b="1">
                 <a:latin typeface="Consolas"/>
                 <a:ea typeface="+mn-lt"/>
                 <a:cs typeface="+mn-lt"/>
@@ -8448,7 +8439,7 @@
               <a:t>('demo').</a:t>
             </a:r>
             <a:r>
-              <a:rPr lang="en-US" sz="2800" b="1" dirty="0" err="1">
+              <a:rPr lang="en-US" sz="2800" b="1" err="1">
                 <a:latin typeface="Consolas"/>
                 <a:ea typeface="+mn-lt"/>
                 <a:cs typeface="+mn-lt"/>
@@ -8456,23 +8447,23 @@
               <a:t>innerHTML</a:t>
             </a:r>
             <a:r>
-              <a:rPr lang="en-US" sz="2800" b="1" dirty="0">
+              <a:rPr lang="en-US" sz="2800" b="1">
                 <a:latin typeface="Consolas"/>
                 <a:ea typeface="+mn-lt"/>
                 <a:cs typeface="+mn-lt"/>
               </a:rPr>
               <a:t> = Date()</a:t>
             </a:r>
-            <a:endParaRPr lang="en-US" dirty="0"/>
-          </a:p>
-          <a:p>
-            <a:endParaRPr lang="en-US" sz="2800" b="1" dirty="0">
+            <a:endParaRPr lang="en-US"/>
+          </a:p>
+          <a:p>
+            <a:endParaRPr lang="en-US" sz="2800" b="1">
               <a:latin typeface="Consolas"/>
             </a:endParaRPr>
           </a:p>
           <a:p>
             <a:r>
-              <a:rPr lang="en-US" sz="2800" dirty="0">
+              <a:rPr lang="en-US" sz="2800">
                 <a:ea typeface="+mn-lt"/>
                 <a:cs typeface="+mn-lt"/>
               </a:rPr>
@@ -8513,7 +8504,7 @@
           <a:lstStyle/>
           <a:p>
             <a:r>
-              <a:rPr lang="en-US" sz="2400" b="1" dirty="0">
+              <a:rPr lang="en-US" sz="2400" b="1">
                 <a:latin typeface="Consolas"/>
               </a:rPr>
               <a:t>document</a:t>
@@ -8529,7 +8520,7 @@
               <a:buChar char="•"/>
             </a:pPr>
             <a:r>
-              <a:rPr lang="en-US" sz="2400" dirty="0">
+              <a:rPr lang="en-US" sz="2400">
                 <a:latin typeface="Consolas"/>
               </a:rPr>
               <a:t>an object representing the HTML document being displayed</a:t>
@@ -8545,12 +8536,12 @@
               <a:buChar char="•"/>
             </a:pPr>
             <a:r>
-              <a:rPr lang="en-US" sz="2400" dirty="0">
+              <a:rPr lang="en-US" sz="2400">
                 <a:latin typeface="Consolas"/>
               </a:rPr>
               <a:t>Part of the DOM (document object model), a hierarchy of objects comprising a Web document.</a:t>
             </a:r>
-            <a:endParaRPr lang="en-US" sz="2000" dirty="0"/>
+            <a:endParaRPr lang="en-US" sz="2000"/>
           </a:p>
         </p:txBody>
       </p:sp>
@@ -8750,10 +8741,10 @@
           <a:p>
             <a:pPr algn="ctr"/>
             <a:r>
-              <a:rPr lang="en-US" sz="3200" b="1" dirty="0"/>
+              <a:rPr lang="en-US" sz="3200" b="1"/>
               <a:t>History</a:t>
             </a:r>
-            <a:endParaRPr lang="en-US" sz="3200" b="1" dirty="0">
+            <a:endParaRPr lang="en-US" sz="3200" b="1">
               <a:effectLst>
                 <a:glow rad="38100">
                   <a:prstClr val="black">
@@ -8869,7 +8860,7 @@
               <a:buChar char="•"/>
             </a:pPr>
             <a:r>
-              <a:rPr lang="en-US" sz="2800" dirty="0">
+              <a:rPr lang="en-US" sz="2800">
                 <a:ea typeface="+mn-lt"/>
                 <a:cs typeface="+mn-lt"/>
               </a:rPr>
@@ -8915,7 +8906,7 @@
               <a:buChar char="•"/>
             </a:pPr>
             <a:r>
-              <a:rPr lang="en-US" sz="2800" dirty="0">
+              <a:rPr lang="en-US" sz="2800">
                 <a:ea typeface="+mn-lt"/>
                 <a:cs typeface="+mn-lt"/>
               </a:rPr>
@@ -8961,13 +8952,13 @@
               <a:buChar char="•"/>
             </a:pPr>
             <a:r>
-              <a:rPr lang="en-US" sz="2800" dirty="0">
+              <a:rPr lang="en-US" sz="2800">
                 <a:ea typeface="+mn-lt"/>
                 <a:cs typeface="+mn-lt"/>
               </a:rPr>
               <a:t>Original purpose was to bring dynamic content to the Web.</a:t>
             </a:r>
-            <a:endParaRPr lang="en-US" sz="2800" dirty="0"/>
+            <a:endParaRPr lang="en-US" sz="2800"/>
           </a:p>
         </p:txBody>
       </p:sp>
@@ -9228,13 +9219,13 @@
           <a:lstStyle/>
           <a:p>
             <a:r>
-              <a:rPr lang="en-US" sz="2400" b="1" dirty="0" err="1">
+              <a:rPr lang="en-US" sz="2400" b="1" err="1">
                 <a:latin typeface="Consolas"/>
               </a:rPr>
               <a:t>getElementById</a:t>
             </a:r>
             <a:r>
-              <a:rPr lang="en-US" sz="2400" b="1" dirty="0">
+              <a:rPr lang="en-US" sz="2400" b="1">
                 <a:latin typeface="Consolas"/>
               </a:rPr>
               <a:t>('demo') </a:t>
@@ -9249,7 +9240,7 @@
               <a:buChar char="•"/>
             </a:pPr>
             <a:r>
-              <a:rPr lang="en-US" sz="2400" dirty="0">
+              <a:rPr lang="en-US" sz="2400">
                 <a:latin typeface="Consolas"/>
               </a:rPr>
               <a:t>will return an object representing the paragraph element</a:t>
@@ -9265,7 +9256,7 @@
               <a:buChar char="•"/>
             </a:pPr>
             <a:r>
-              <a:rPr lang="en-US" sz="2400" dirty="0">
+              <a:rPr lang="en-US" sz="2400">
                 <a:ea typeface="+mn-lt"/>
                 <a:cs typeface="+mn-lt"/>
               </a:rPr>
@@ -9306,20 +9297,20 @@
           <a:lstStyle/>
           <a:p>
             <a:r>
-              <a:rPr lang="en-US" sz="2400" b="1" dirty="0" err="1">
+              <a:rPr lang="en-US" sz="2400" b="1" err="1">
                 <a:ea typeface="+mn-lt"/>
                 <a:cs typeface="+mn-lt"/>
               </a:rPr>
               <a:t>innerHTML</a:t>
             </a:r>
             <a:r>
-              <a:rPr lang="en-US" sz="2400" b="1" dirty="0">
+              <a:rPr lang="en-US" sz="2400" b="1">
                 <a:ea typeface="+mn-lt"/>
                 <a:cs typeface="+mn-lt"/>
               </a:rPr>
               <a:t> </a:t>
             </a:r>
-            <a:endParaRPr lang="en-US" sz="2400" dirty="0">
+            <a:endParaRPr lang="en-US" sz="2400">
               <a:ea typeface="+mn-lt"/>
               <a:cs typeface="+mn-lt"/>
             </a:endParaRPr>
@@ -9330,7 +9321,7 @@
               <a:buChar char="•"/>
             </a:pPr>
             <a:r>
-              <a:rPr lang="en-US" sz="2400" dirty="0">
+              <a:rPr lang="en-US" sz="2400">
                 <a:ea typeface="+mn-lt"/>
                 <a:cs typeface="+mn-lt"/>
               </a:rPr>
@@ -9343,21 +9334,21 @@
               <a:buChar char="•"/>
             </a:pPr>
             <a:r>
-              <a:rPr lang="en-US" sz="2400" dirty="0">
+              <a:rPr lang="en-US" sz="2400">
                 <a:ea typeface="+mn-lt"/>
                 <a:cs typeface="+mn-lt"/>
               </a:rPr>
               <a:t>&lt;p&gt;</a:t>
             </a:r>
             <a:r>
-              <a:rPr lang="en-US" sz="2400" dirty="0" err="1">
+              <a:rPr lang="en-US" sz="2400" err="1">
                 <a:ea typeface="+mn-lt"/>
                 <a:cs typeface="+mn-lt"/>
               </a:rPr>
               <a:t>innerHTML</a:t>
             </a:r>
             <a:r>
-              <a:rPr lang="en-US" sz="2400" dirty="0">
+              <a:rPr lang="en-US" sz="2400">
                 <a:ea typeface="+mn-lt"/>
                 <a:cs typeface="+mn-lt"/>
               </a:rPr>
@@ -9398,13 +9389,13 @@
           <a:lstStyle/>
           <a:p>
             <a:r>
-              <a:rPr lang="en-US" sz="2400" b="1" dirty="0">
+              <a:rPr lang="en-US" sz="2400" b="1">
                 <a:ea typeface="+mn-lt"/>
                 <a:cs typeface="+mn-lt"/>
               </a:rPr>
               <a:t>Date()</a:t>
             </a:r>
-            <a:endParaRPr lang="en-US" sz="2400" dirty="0">
+            <a:endParaRPr lang="en-US" sz="2400">
               <a:ea typeface="+mn-lt"/>
               <a:cs typeface="+mn-lt"/>
             </a:endParaRPr>
@@ -9415,26 +9406,26 @@
               <a:buChar char="•"/>
             </a:pPr>
             <a:r>
-              <a:rPr lang="en-US" sz="2400" dirty="0">
+              <a:rPr lang="en-US" sz="2400">
                 <a:ea typeface="+mn-lt"/>
                 <a:cs typeface="+mn-lt"/>
               </a:rPr>
               <a:t>Creates JavaScript </a:t>
             </a:r>
             <a:r>
-              <a:rPr lang="en-US" sz="2400" b="1" dirty="0">
+              <a:rPr lang="en-US" sz="2400" b="1">
                 <a:latin typeface="Consolas"/>
               </a:rPr>
               <a:t>Date</a:t>
             </a:r>
             <a:r>
-              <a:rPr lang="en-US" sz="2400" dirty="0">
+              <a:rPr lang="en-US" sz="2400">
                 <a:ea typeface="+mn-lt"/>
                 <a:cs typeface="+mn-lt"/>
               </a:rPr>
               <a:t> instance that represents a single moment in time in a platform-independent format</a:t>
             </a:r>
-            <a:endParaRPr lang="en-US" sz="2400" dirty="0"/>
+            <a:endParaRPr lang="en-US" sz="2400"/>
           </a:p>
         </p:txBody>
       </p:sp>
@@ -9695,14 +9686,14 @@
           <a:lstStyle/>
           <a:p>
             <a:r>
-              <a:rPr lang="en-US" sz="2800" b="1" u="sng" dirty="0">
+              <a:rPr lang="en-US" sz="2800" b="1" u="sng">
                 <a:latin typeface="Century Gothic"/>
                 <a:ea typeface="+mn-lt"/>
                 <a:cs typeface="+mn-lt"/>
               </a:rPr>
               <a:t>Putting it all together:</a:t>
             </a:r>
-            <a:endParaRPr lang="en-US" sz="2800" b="1" u="sng" dirty="0"/>
+            <a:endParaRPr lang="en-US" sz="2800" b="1" u="sng"/>
           </a:p>
           <a:p>
             <a:endParaRPr lang="en-US" sz="2800">
@@ -9712,25 +9703,25 @@
           </a:p>
           <a:p>
             <a:r>
-              <a:rPr lang="en-US" sz="2800" b="1" dirty="0" err="1">
+              <a:rPr lang="en-US" sz="2800" b="1" err="1">
                 <a:latin typeface="Consolas"/>
               </a:rPr>
               <a:t>document.getElementById</a:t>
             </a:r>
             <a:r>
-              <a:rPr lang="en-US" sz="2800" b="1" dirty="0">
+              <a:rPr lang="en-US" sz="2800" b="1">
                 <a:latin typeface="Consolas"/>
               </a:rPr>
               <a:t>('demo').</a:t>
             </a:r>
             <a:r>
-              <a:rPr lang="en-US" sz="2800" b="1" dirty="0" err="1">
+              <a:rPr lang="en-US" sz="2800" b="1" err="1">
                 <a:latin typeface="Consolas"/>
               </a:rPr>
               <a:t>innerHTML</a:t>
             </a:r>
             <a:r>
-              <a:rPr lang="en-US" sz="2800" b="1" dirty="0">
+              <a:rPr lang="en-US" sz="2800" b="1">
                 <a:latin typeface="Consolas"/>
               </a:rPr>
               <a:t> = Date()</a:t>
@@ -9740,20 +9731,20 @@
             </a:endParaRPr>
           </a:p>
           <a:p>
-            <a:endParaRPr lang="en-US" sz="2800" dirty="0">
+            <a:endParaRPr lang="en-US" sz="2800">
               <a:ea typeface="+mn-lt"/>
               <a:cs typeface="+mn-lt"/>
             </a:endParaRPr>
           </a:p>
           <a:p>
-            <a:endParaRPr lang="en-US" sz="2800" dirty="0">
+            <a:endParaRPr lang="en-US" sz="2800">
               <a:ea typeface="+mn-lt"/>
               <a:cs typeface="+mn-lt"/>
             </a:endParaRPr>
           </a:p>
           <a:p>
             <a:r>
-              <a:rPr lang="en-US" sz="2800" b="1" dirty="0">
+              <a:rPr lang="en-US" sz="2800" b="1">
                 <a:ea typeface="+mn-lt"/>
                 <a:cs typeface="+mn-lt"/>
               </a:rPr>
@@ -9948,10 +9939,10 @@
           <a:p>
             <a:pPr algn="ctr"/>
             <a:r>
-              <a:rPr lang="en-US" sz="3200" dirty="0"/>
+              <a:rPr lang="en-US" sz="3200"/>
               <a:t>Hands-on: Syntax</a:t>
             </a:r>
-            <a:endParaRPr lang="en-US" sz="3200" dirty="0">
+            <a:endParaRPr lang="en-US" sz="3200">
               <a:effectLst>
                 <a:glow rad="38100">
                   <a:prstClr val="black">
@@ -10156,10 +10147,10 @@
           <a:p>
             <a:pPr algn="ctr"/>
             <a:r>
-              <a:rPr lang="en-US" sz="3600" dirty="0"/>
+              <a:rPr lang="en-US" sz="3600"/>
               <a:t>Hands-on: syntax and variables</a:t>
             </a:r>
-            <a:endParaRPr lang="en-US" dirty="0"/>
+            <a:endParaRPr lang="en-US"/>
           </a:p>
         </p:txBody>
       </p:sp>
@@ -10290,10 +10281,10 @@
           <a:p>
             <a:pPr algn="ctr"/>
             <a:r>
-              <a:rPr lang="en-US" sz="3200" dirty="0"/>
+              <a:rPr lang="en-US" sz="3200"/>
               <a:t>Variables </a:t>
             </a:r>
-            <a:endParaRPr lang="en-US" sz="3200" dirty="0">
+            <a:endParaRPr lang="en-US" sz="3200">
               <a:effectLst>
                 <a:glow rad="38100">
                   <a:prstClr val="black">
@@ -10345,7 +10336,7 @@
               <a:buChar char="•"/>
             </a:pPr>
             <a:r>
-              <a:rPr lang="en-US" dirty="0">
+              <a:rPr lang="en-US">
                 <a:ea typeface="+mj-lt"/>
                 <a:cs typeface="+mj-lt"/>
                 <a:hlinkClick r:id="rId2"/>
@@ -10363,7 +10354,6 @@
               <a:rPr lang="en-US"/>
               <a:t>In order to create variables in JS you must declare them like so: </a:t>
             </a:r>
-            <a:endParaRPr lang="en-US" dirty="0"/>
           </a:p>
           <a:p>
             <a:pPr lvl="1">
@@ -10429,7 +10419,7 @@
             <a:pPr marL="57150">
               <a:buNone/>
             </a:pPr>
-            <a:endParaRPr lang="en-US" sz="1800" dirty="0"/>
+            <a:endParaRPr lang="en-US" sz="1800"/>
           </a:p>
         </p:txBody>
       </p:sp>
@@ -10493,10 +10483,10 @@
           <a:p>
             <a:pPr algn="ctr"/>
             <a:r>
-              <a:rPr lang="en-US" sz="3200" dirty="0"/>
+              <a:rPr lang="en-US" sz="3200"/>
               <a:t>Operators</a:t>
             </a:r>
-            <a:endParaRPr lang="en-US" sz="3200" dirty="0">
+            <a:endParaRPr lang="en-US" sz="3200">
               <a:effectLst>
                 <a:glow rad="38100">
                   <a:prstClr val="black">
@@ -10548,7 +10538,7 @@
               <a:buChar char="v"/>
             </a:pPr>
             <a:r>
-              <a:rPr lang="en-US" dirty="0">
+              <a:rPr lang="en-US">
                 <a:ea typeface="+mj-lt"/>
                 <a:cs typeface="+mj-lt"/>
                 <a:hlinkClick r:id="rId2"/>
@@ -10694,7 +10684,7 @@
               <a:t>typeof</a:t>
             </a:r>
             <a:r>
-              <a:rPr lang="en-US" dirty="0"/>
+              <a:rPr lang="en-US"/>
               <a:t> </a:t>
             </a:r>
           </a:p>
@@ -10720,26 +10710,13 @@
               <a:t>typeof</a:t>
             </a:r>
             <a:r>
-              <a:rPr lang="en-US" sz="1800" dirty="0">
+              <a:rPr lang="en-US" sz="1800">
                 <a:solidFill>
                   <a:srgbClr val="FFC000"/>
                 </a:solidFill>
               </a:rPr>
-              <a:t> </a:t>
-            </a:r>
-            <a:r>
-              <a:rPr lang="en-US" sz="1800">
-                <a:solidFill>
-                  <a:srgbClr val="FFC000"/>
-                </a:solidFill>
-              </a:rPr>
-              <a:t>42);   //outputs: "number"</a:t>
-            </a:r>
-            <a:endParaRPr lang="en-US" sz="1800" dirty="0">
-              <a:solidFill>
-                <a:srgbClr val="FFC000"/>
-              </a:solidFill>
-            </a:endParaRPr>
+              <a:t> 42);   //outputs: "number"</a:t>
+            </a:r>
           </a:p>
           <a:p>
             <a:pPr>
@@ -10754,7 +10731,7 @@
               <a:rPr lang="en-US" err="1"/>
               <a:t>instanceof</a:t>
             </a:r>
-            <a:endParaRPr lang="en-US" dirty="0"/>
+            <a:endParaRPr lang="en-US"/>
           </a:p>
           <a:p>
             <a:pPr lvl="1">
@@ -10765,7 +10742,6 @@
               <a:rPr lang="en-US" sz="1800"/>
               <a:t>Assume we have a car object and auto is an instance of car:</a:t>
             </a:r>
-            <a:endParaRPr lang="en-US" sz="1800" dirty="0"/>
           </a:p>
           <a:p>
             <a:pPr lvl="1">
@@ -10789,46 +10765,33 @@
               <a:t>instanceof</a:t>
             </a:r>
             <a:r>
-              <a:rPr lang="en-US" sz="1800" dirty="0">
+              <a:rPr lang="en-US" sz="1800">
                 <a:solidFill>
                   <a:srgbClr val="FFC000"/>
                 </a:solidFill>
               </a:rPr>
-              <a:t> </a:t>
-            </a:r>
-            <a:r>
-              <a:rPr lang="en-US" sz="1800">
-                <a:solidFill>
-                  <a:srgbClr val="FFC000"/>
-                </a:solidFill>
-              </a:rPr>
-              <a:t>car);  //true</a:t>
-            </a:r>
-            <a:endParaRPr lang="en-US" sz="1800" dirty="0">
-              <a:solidFill>
-                <a:srgbClr val="FFC000"/>
-              </a:solidFill>
-            </a:endParaRPr>
+              <a:t> car);  //true</a:t>
+            </a:r>
           </a:p>
           <a:p>
             <a:pPr lvl="1">
               <a:buFont typeface="Wingdings" charset="2"/>
               <a:buChar char="v"/>
             </a:pPr>
-            <a:endParaRPr lang="en-US" sz="1400" dirty="0"/>
+            <a:endParaRPr lang="en-US" sz="1400"/>
           </a:p>
           <a:p>
             <a:pPr marL="57150" indent="0">
               <a:buNone/>
             </a:pPr>
-            <a:endParaRPr lang="en-US" sz="1600" dirty="0"/>
+            <a:endParaRPr lang="en-US" sz="1600"/>
           </a:p>
           <a:p>
             <a:pPr>
               <a:buFont typeface="Arial" charset="2"/>
               <a:buChar char="•"/>
             </a:pPr>
-            <a:endParaRPr lang="en-US" sz="1600" dirty="0"/>
+            <a:endParaRPr lang="en-US" sz="1600"/>
           </a:p>
         </p:txBody>
       </p:sp>
@@ -10890,7 +10853,7 @@
           <a:p>
             <a:pPr algn="ctr"/>
             <a:r>
-              <a:rPr lang="en-US" sz="3200" dirty="0"/>
+              <a:rPr lang="en-US" sz="3200"/>
               <a:t>Data Types</a:t>
             </a:r>
           </a:p>
@@ -10929,7 +10892,7 @@
               <a:buChar char="•"/>
             </a:pPr>
             <a:r>
-              <a:rPr lang="en-US" dirty="0">
+              <a:rPr lang="en-US">
                 <a:ea typeface="+mj-lt"/>
                 <a:cs typeface="+mj-lt"/>
                 <a:hlinkClick r:id="rId2"/>
@@ -10953,7 +10916,7 @@
               <a:buNone/>
             </a:pPr>
             <a:r>
-              <a:rPr lang="en-US" sz="2000" dirty="0">
+              <a:rPr lang="en-US" sz="2000">
                 <a:ea typeface="+mj-lt"/>
                 <a:cs typeface="+mj-lt"/>
               </a:rPr>
@@ -10970,7 +10933,7 @@
               <a:t>var x;           // Now x is undefined</a:t>
             </a:r>
             <a:br>
-              <a:rPr lang="en-US" sz="2000" dirty="0">
+              <a:rPr lang="en-US" sz="2000">
                 <a:ea typeface="+mj-lt"/>
                 <a:cs typeface="+mj-lt"/>
               </a:rPr>
@@ -10986,7 +10949,7 @@
               <a:t>     x = 5;           // Now x is a Number</a:t>
             </a:r>
             <a:br>
-              <a:rPr lang="en-US" sz="2000" dirty="0">
+              <a:rPr lang="en-US" sz="2000">
                 <a:ea typeface="+mj-lt"/>
                 <a:cs typeface="+mj-lt"/>
               </a:rPr>
@@ -11001,13 +10964,6 @@
               </a:rPr>
               <a:t>     x = "John";      // Now x is a String</a:t>
             </a:r>
-            <a:endParaRPr lang="en-US" sz="2000" dirty="0">
-              <a:solidFill>
-                <a:srgbClr val="FFC000"/>
-              </a:solidFill>
-              <a:ea typeface="+mj-lt"/>
-              <a:cs typeface="+mj-lt"/>
-            </a:endParaRPr>
           </a:p>
           <a:p>
             <a:pPr>
@@ -11072,20 +11028,13 @@
               </a:rPr>
               <a:t>:"John", </a:t>
             </a:r>
-            <a:endParaRPr lang="en-US" sz="2000" dirty="0">
-              <a:solidFill>
-                <a:srgbClr val="FFC000"/>
-              </a:solidFill>
-              <a:ea typeface="+mj-lt"/>
-              <a:cs typeface="+mj-lt"/>
-            </a:endParaRPr>
           </a:p>
           <a:p>
             <a:pPr marL="400050" lvl="1" indent="0">
               <a:buNone/>
             </a:pPr>
             <a:r>
-              <a:rPr lang="en-US" sz="2000" dirty="0">
+              <a:rPr lang="en-US" sz="2000">
                 <a:solidFill>
                   <a:srgbClr val="FFC000"/>
                 </a:solidFill>
@@ -11114,13 +11063,6 @@
               </a:rPr>
               <a:t>:"Doe",      </a:t>
             </a:r>
-            <a:endParaRPr lang="en-US" sz="2000" dirty="0">
-              <a:solidFill>
-                <a:srgbClr val="FFC000"/>
-              </a:solidFill>
-              <a:ea typeface="+mj-lt"/>
-              <a:cs typeface="+mj-lt"/>
-            </a:endParaRPr>
           </a:p>
           <a:p>
             <a:pPr marL="400050" lvl="1" indent="0">
@@ -11136,20 +11078,13 @@
               </a:rPr>
               <a:t>                        age:50, </a:t>
             </a:r>
-            <a:endParaRPr lang="en-US" sz="2000" dirty="0">
-              <a:solidFill>
-                <a:srgbClr val="FFC000"/>
-              </a:solidFill>
-              <a:ea typeface="+mj-lt"/>
-              <a:cs typeface="+mj-lt"/>
-            </a:endParaRPr>
           </a:p>
           <a:p>
             <a:pPr marL="400050" lvl="1" indent="0">
               <a:buNone/>
             </a:pPr>
             <a:r>
-              <a:rPr lang="en-US" sz="2000" dirty="0">
+              <a:rPr lang="en-US" sz="2000">
                 <a:solidFill>
                   <a:srgbClr val="FFC000"/>
                 </a:solidFill>
@@ -11246,7 +11181,7 @@
           <a:p>
             <a:pPr algn="ctr"/>
             <a:r>
-              <a:rPr lang="en-US" sz="3200" dirty="0"/>
+              <a:rPr lang="en-US" sz="3200"/>
               <a:t>Functions</a:t>
             </a:r>
           </a:p>
@@ -11281,14 +11216,14 @@
           <a:lstStyle/>
           <a:p>
             <a:r>
-              <a:rPr lang="en-US" dirty="0">
+              <a:rPr lang="en-US">
                 <a:ea typeface="+mj-lt"/>
                 <a:cs typeface="+mj-lt"/>
                 <a:hlinkClick r:id="rId2"/>
               </a:rPr>
               <a:t>https://www.w3schools.com/js/js_functions.asp</a:t>
             </a:r>
-            <a:endParaRPr lang="en-US" dirty="0"/>
+            <a:endParaRPr lang="en-US"/>
           </a:p>
           <a:p>
             <a:r>
@@ -11423,7 +11358,7 @@
           <a:p>
             <a:pPr algn="ctr"/>
             <a:r>
-              <a:rPr lang="en-US" dirty="0"/>
+              <a:rPr lang="en-US"/>
               <a:t>Hands-on: functions</a:t>
             </a:r>
           </a:p>
@@ -11519,10 +11454,10 @@
           <a:p>
             <a:pPr algn="ctr"/>
             <a:r>
-              <a:rPr lang="en-US" sz="3200" dirty="0"/>
+              <a:rPr lang="en-US" sz="3200"/>
               <a:t>Objects</a:t>
             </a:r>
-            <a:endParaRPr lang="en-US" sz="3200" dirty="0">
+            <a:endParaRPr lang="en-US" sz="3200">
               <a:effectLst>
                 <a:glow rad="38100">
                   <a:prstClr val="black">
@@ -11574,7 +11509,7 @@
               <a:buChar char="•"/>
             </a:pPr>
             <a:r>
-              <a:rPr lang="en-US" dirty="0">
+              <a:rPr lang="en-US">
                 <a:ea typeface="+mj-lt"/>
                 <a:cs typeface="+mj-lt"/>
                 <a:hlinkClick r:id="rId2"/>
@@ -11655,13 +11590,6 @@
               </a:rPr>
               <a:t>"};</a:t>
             </a:r>
-            <a:endParaRPr lang="en-US" sz="2000" dirty="0">
-              <a:solidFill>
-                <a:srgbClr val="FFC000"/>
-              </a:solidFill>
-              <a:ea typeface="+mj-lt"/>
-              <a:cs typeface="+mj-lt"/>
-            </a:endParaRPr>
           </a:p>
           <a:p>
             <a:pPr>
@@ -11691,7 +11619,7 @@
               </a:rPr>
               <a:t>ObjectName.propertyName</a:t>
             </a:r>
-            <a:endParaRPr lang="en-US" sz="2000" dirty="0">
+            <a:endParaRPr lang="en-US" sz="2000">
               <a:solidFill>
                 <a:srgbClr val="FFC000"/>
               </a:solidFill>
@@ -11781,13 +11709,13 @@
               <a:t>var person = {</a:t>
             </a:r>
             <a:br>
-              <a:rPr lang="en-US" sz="2000" dirty="0">
+              <a:rPr lang="en-US" sz="2000">
                 <a:ea typeface="+mj-lt"/>
                 <a:cs typeface="+mj-lt"/>
               </a:rPr>
             </a:br>
             <a:r>
-              <a:rPr lang="en-US" sz="2000" dirty="0">
+              <a:rPr lang="en-US" sz="2000">
                 <a:solidFill>
                   <a:srgbClr val="FFC000"/>
                 </a:solidFill>
@@ -11817,13 +11745,13 @@
               <a:t>: "John",</a:t>
             </a:r>
             <a:br>
-              <a:rPr lang="en-US" sz="2000" dirty="0">
+              <a:rPr lang="en-US" sz="2000">
                 <a:ea typeface="+mj-lt"/>
                 <a:cs typeface="+mj-lt"/>
               </a:rPr>
             </a:br>
             <a:r>
-              <a:rPr lang="en-US" sz="2000" dirty="0">
+              <a:rPr lang="en-US" sz="2000">
                 <a:solidFill>
                   <a:srgbClr val="FFC000"/>
                 </a:solidFill>
@@ -11853,7 +11781,7 @@
               <a:t> : "Doe",</a:t>
             </a:r>
             <a:br>
-              <a:rPr lang="en-US" sz="2000" dirty="0">
+              <a:rPr lang="en-US" sz="2000">
                 <a:ea typeface="+mj-lt"/>
                 <a:cs typeface="+mj-lt"/>
               </a:rPr>
@@ -11869,13 +11797,13 @@
               <a:t>   id       : 5566,</a:t>
             </a:r>
             <a:br>
-              <a:rPr lang="en-US" sz="2000" dirty="0">
+              <a:rPr lang="en-US" sz="2000">
                 <a:ea typeface="+mj-lt"/>
                 <a:cs typeface="+mj-lt"/>
               </a:rPr>
             </a:br>
             <a:r>
-              <a:rPr lang="en-US" sz="2000" dirty="0">
+              <a:rPr lang="en-US" sz="2000">
                 <a:solidFill>
                   <a:srgbClr val="FFC000"/>
                 </a:solidFill>
@@ -11905,7 +11833,7 @@
               <a:t> : function() {</a:t>
             </a:r>
             <a:br>
-              <a:rPr lang="en-US" sz="2000" dirty="0">
+              <a:rPr lang="en-US" sz="2000">
                 <a:ea typeface="+mj-lt"/>
                 <a:cs typeface="+mj-lt"/>
               </a:rPr>
@@ -11961,7 +11889,7 @@
               <a:t>;</a:t>
             </a:r>
             <a:br>
-              <a:rPr lang="en-US" sz="2000" dirty="0">
+              <a:rPr lang="en-US" sz="2000">
                 <a:ea typeface="+mj-lt"/>
                 <a:cs typeface="+mj-lt"/>
               </a:rPr>
@@ -11977,7 +11905,7 @@
               <a:t>  }</a:t>
             </a:r>
             <a:br>
-              <a:rPr lang="en-US" sz="2000" dirty="0">
+              <a:rPr lang="en-US" sz="2000">
                 <a:ea typeface="+mj-lt"/>
                 <a:cs typeface="+mj-lt"/>
               </a:rPr>
@@ -11992,13 +11920,6 @@
               </a:rPr>
               <a:t> };</a:t>
             </a:r>
-            <a:endParaRPr lang="en-US" sz="2000" dirty="0">
-              <a:solidFill>
-                <a:srgbClr val="FFC000"/>
-              </a:solidFill>
-              <a:ea typeface="+mj-lt"/>
-              <a:cs typeface="+mj-lt"/>
-            </a:endParaRPr>
           </a:p>
         </p:txBody>
       </p:sp>
@@ -12062,10 +11983,10 @@
           <a:p>
             <a:pPr algn="ctr"/>
             <a:r>
-              <a:rPr lang="en-US" sz="3200" b="1" dirty="0"/>
+              <a:rPr lang="en-US" sz="3200" b="1"/>
               <a:t>Where is it used today?</a:t>
             </a:r>
-            <a:endParaRPr lang="en-US" sz="3200" b="1" dirty="0">
+            <a:endParaRPr lang="en-US" sz="3200" b="1">
               <a:effectLst>
                 <a:glow rad="38100">
                   <a:prstClr val="black">
@@ -12422,10 +12343,10 @@
           <a:p>
             <a:pPr algn="ctr"/>
             <a:r>
-              <a:rPr lang="en-US" sz="3200" dirty="0"/>
+              <a:rPr lang="en-US" sz="3200"/>
               <a:t>Objects (cont.)</a:t>
             </a:r>
-            <a:endParaRPr lang="en-US" sz="3200" dirty="0">
+            <a:endParaRPr lang="en-US" sz="3200">
               <a:effectLst>
                 <a:glow rad="38100">
                   <a:prstClr val="black">
@@ -12761,10 +12682,10 @@
           <a:p>
             <a:pPr algn="ctr"/>
             <a:r>
-              <a:rPr lang="en-US" sz="3200" dirty="0"/>
+              <a:rPr lang="en-US" sz="3200"/>
               <a:t>Scope</a:t>
             </a:r>
-            <a:endParaRPr lang="en-US" sz="3200" dirty="0">
+            <a:endParaRPr lang="en-US" sz="3200">
               <a:effectLst>
                 <a:glow rad="38100">
                   <a:prstClr val="black">
@@ -12816,7 +12737,7 @@
               <a:buChar char="v"/>
             </a:pPr>
             <a:r>
-              <a:rPr lang="en-US" sz="2400" dirty="0">
+              <a:rPr lang="en-US" sz="2400">
                 <a:ea typeface="+mj-lt"/>
                 <a:cs typeface="+mj-lt"/>
                 <a:hlinkClick r:id="rId2"/>
@@ -12900,18 +12821,11 @@
               <a:t>GLOBAL</a:t>
             </a:r>
             <a:r>
-              <a:rPr lang="en-US" sz="2000" dirty="0">
-                <a:ea typeface="+mj-lt"/>
-                <a:cs typeface="+mj-lt"/>
-              </a:rPr>
-              <a:t> </a:t>
-            </a:r>
-            <a:r>
               <a:rPr lang="en-US" sz="2000">
                 <a:ea typeface="+mj-lt"/>
                 <a:cs typeface="+mj-lt"/>
               </a:rPr>
-              <a:t>variable. This is an example of hoisting in JS.</a:t>
+              <a:t> variable. This is an example of hoisting in JS.</a:t>
             </a:r>
             <a:endParaRPr lang="en-US" sz="2000"/>
           </a:p>
@@ -13097,10 +13011,10 @@
           <a:p>
             <a:pPr algn="ctr"/>
             <a:r>
-              <a:rPr lang="en-US" sz="3200" dirty="0"/>
+              <a:rPr lang="en-US" sz="3200"/>
               <a:t>Scope (cont.)</a:t>
             </a:r>
-            <a:endParaRPr lang="en-US" sz="3200" dirty="0">
+            <a:endParaRPr lang="en-US" sz="3200">
               <a:effectLst>
                 <a:glow rad="38100">
                   <a:prstClr val="black">
@@ -13332,7 +13246,7 @@
             <a:pPr algn="ctr"/>
             <a:r>
               <a:rPr lang="en-US" sz="3200" dirty="0"/>
-              <a:t>Example 01: The Colors</a:t>
+              <a:t>Example: The Basics</a:t>
             </a:r>
             <a:endParaRPr lang="en-US" sz="3200" dirty="0">
               <a:effectLst>
@@ -13385,19 +13299,19 @@
           <a:lstStyle/>
           <a:p>
             <a:r>
-              <a:rPr lang="en-US" sz="2000" dirty="0"/>
+              <a:rPr lang="en-US" sz="2000"/>
               <a:t>Download our example code by holding CTRL and clicking:</a:t>
             </a:r>
           </a:p>
           <a:p>
             <a:r>
-              <a:rPr lang="en-US" sz="2000" dirty="0">
+              <a:rPr lang="en-US" sz="2000">
                 <a:hlinkClick r:id="rId2"/>
               </a:rPr>
               <a:t>https</a:t>
             </a:r>
             <a:r>
-              <a:rPr lang="en-US" sz="2000" dirty="0">
+              <a:rPr lang="en-US" sz="2000">
                 <a:ea typeface="+mn-lt"/>
                 <a:cs typeface="+mn-lt"/>
                 <a:hlinkClick r:id="rId2"/>
@@ -13444,10 +13358,10 @@
           <a:p>
             <a:pPr algn="just"/>
             <a:r>
-              <a:rPr lang="en-US" sz="2000" dirty="0"/>
+              <a:rPr lang="en-US" sz="2000"/>
               <a:t>Once downloaded, navigate to the file in Windows Explorer and extract the contents by right clicking and selecting "Extract all..."</a:t>
             </a:r>
-            <a:endParaRPr lang="en-US" dirty="0"/>
+            <a:endParaRPr lang="en-US"/>
           </a:p>
         </p:txBody>
       </p:sp>
@@ -13542,7 +13456,7 @@
             <a:pPr algn="ctr"/>
             <a:r>
               <a:rPr lang="en-US" sz="3200" dirty="0"/>
-              <a:t>Example 01: The Colors</a:t>
+              <a:t>Example: The Basics</a:t>
             </a:r>
             <a:endParaRPr lang="en-US" sz="3200" dirty="0">
               <a:effectLst>
@@ -13577,7 +13491,7 @@
         </p:nvSpPr>
         <p:spPr>
           <a:xfrm>
-            <a:off x="591670" y="1411939"/>
+            <a:off x="860611" y="1142998"/>
             <a:ext cx="4046283" cy="400110"/>
           </a:xfrm>
           <a:prstGeom prst="rect">
@@ -13596,7 +13510,7 @@
           <a:p>
             <a:pPr algn="just"/>
             <a:r>
-              <a:rPr lang="en-US" sz="2000" dirty="0"/>
+              <a:rPr lang="en-US" sz="2000"/>
               <a:t>Open Visual Studio and click: </a:t>
             </a:r>
           </a:p>
@@ -13624,7 +13538,7 @@
         </p:blipFill>
         <p:spPr>
           <a:xfrm>
-            <a:off x="4487475" y="1248404"/>
+            <a:off x="4837098" y="979462"/>
             <a:ext cx="2743200" cy="730484"/>
           </a:xfrm>
           <a:prstGeom prst="rect">
@@ -13632,12 +13546,91 @@
           </a:prstGeom>
         </p:spPr>
       </p:pic>
+      <p:sp>
+        <p:nvSpPr>
+          <p:cNvPr id="12" name="TextBox 11">
+            <a:extLst>
+              <a:ext uri="{FF2B5EF4-FFF2-40B4-BE49-F238E27FC236}">
+                <a16:creationId xmlns:a16="http://schemas.microsoft.com/office/drawing/2014/main" id="{14BBF6F3-7667-4D14-A49C-D4E511C7D1C2}"/>
+              </a:ext>
+            </a:extLst>
+          </p:cNvPr>
+          <p:cNvSpPr txBox="1"/>
+          <p:nvPr/>
+        </p:nvSpPr>
+        <p:spPr>
+          <a:xfrm>
+            <a:off x="1692408" y="2055477"/>
+            <a:ext cx="4913937" cy="707886"/>
+          </a:xfrm>
+          <a:prstGeom prst="rect">
+            <a:avLst/>
+          </a:prstGeom>
+          <a:noFill/>
+        </p:spPr>
+        <p:txBody>
+          <a:bodyPr rot="0" spcFirstLastPara="0" vertOverflow="overflow" horzOverflow="overflow" vert="horz" wrap="square" lIns="91440" tIns="45720" rIns="91440" bIns="45720" numCol="1" spcCol="0" rtlCol="0" fromWordArt="0" anchor="t" anchorCtr="0" forceAA="0" compatLnSpc="1">
+            <a:prstTxWarp prst="textNoShape">
+              <a:avLst/>
+            </a:prstTxWarp>
+            <a:spAutoFit/>
+          </a:bodyPr>
+          <a:lstStyle/>
+          <a:p>
+            <a:pPr algn="just"/>
+            <a:r>
+              <a:rPr lang="en-US" sz="2000" dirty="0"/>
+              <a:t>Then browse to the extracted files. We'll look at the_basics.html first:</a:t>
+            </a:r>
+            <a:endParaRPr lang="en-US" dirty="0"/>
+          </a:p>
+        </p:txBody>
+      </p:sp>
+      <p:sp>
+        <p:nvSpPr>
+          <p:cNvPr id="13" name="TextBox 12">
+            <a:extLst>
+              <a:ext uri="{FF2B5EF4-FFF2-40B4-BE49-F238E27FC236}">
+                <a16:creationId xmlns:a16="http://schemas.microsoft.com/office/drawing/2014/main" id="{57DF9970-142E-4DAE-8196-F2B4D3D9B08E}"/>
+              </a:ext>
+            </a:extLst>
+          </p:cNvPr>
+          <p:cNvSpPr txBox="1"/>
+          <p:nvPr/>
+        </p:nvSpPr>
+        <p:spPr>
+          <a:xfrm>
+            <a:off x="519953" y="6411044"/>
+            <a:ext cx="8766199" cy="400110"/>
+          </a:xfrm>
+          <a:prstGeom prst="rect">
+            <a:avLst/>
+          </a:prstGeom>
+          <a:noFill/>
+        </p:spPr>
+        <p:txBody>
+          <a:bodyPr rot="0" spcFirstLastPara="0" vertOverflow="overflow" horzOverflow="overflow" vert="horz" wrap="square" lIns="91440" tIns="45720" rIns="91440" bIns="45720" numCol="1" spcCol="0" rtlCol="0" fromWordArt="0" anchor="t" anchorCtr="0" forceAA="0" compatLnSpc="1">
+            <a:prstTxWarp prst="textNoShape">
+              <a:avLst/>
+            </a:prstTxWarp>
+            <a:spAutoFit/>
+          </a:bodyPr>
+          <a:lstStyle/>
+          <a:p>
+            <a:pPr algn="just"/>
+            <a:r>
+              <a:rPr lang="en-US" sz="2000"/>
+              <a:t>If Solution Explorer isn't open, hold CTRL+ALT and tap the L key.</a:t>
+            </a:r>
+          </a:p>
+        </p:txBody>
+      </p:sp>
       <p:pic>
         <p:nvPicPr>
-          <p:cNvPr id="10" name="Picture 10" descr="A screenshot of a computer screen&#10;&#10;Description generated with very high confidence">
+          <p:cNvPr id="3" name="Picture 4" descr="A screenshot of a computer screen&#10;&#10;Description generated with very high confidence">
             <a:extLst>
               <a:ext uri="{FF2B5EF4-FFF2-40B4-BE49-F238E27FC236}">
-                <a16:creationId xmlns:a16="http://schemas.microsoft.com/office/drawing/2014/main" id="{BCE40C61-3AF7-4845-A402-13399D077DA2}"/>
+                <a16:creationId xmlns:a16="http://schemas.microsoft.com/office/drawing/2014/main" id="{C5FE8487-859F-4C3D-973C-4707EE24DDA9}"/>
               </a:ext>
             </a:extLst>
           </p:cNvPr>
@@ -13654,100 +13647,14 @@
         </p:blipFill>
         <p:spPr>
           <a:xfrm>
-            <a:off x="587828" y="3498194"/>
-            <a:ext cx="3742124" cy="2829570"/>
+            <a:off x="2097741" y="2759321"/>
+            <a:ext cx="4186517" cy="3607427"/>
           </a:xfrm>
           <a:prstGeom prst="rect">
             <a:avLst/>
           </a:prstGeom>
         </p:spPr>
       </p:pic>
-      <p:sp>
-        <p:nvSpPr>
-          <p:cNvPr id="12" name="TextBox 11">
-            <a:extLst>
-              <a:ext uri="{FF2B5EF4-FFF2-40B4-BE49-F238E27FC236}">
-                <a16:creationId xmlns:a16="http://schemas.microsoft.com/office/drawing/2014/main" id="{14BBF6F3-7667-4D14-A49C-D4E511C7D1C2}"/>
-              </a:ext>
-            </a:extLst>
-          </p:cNvPr>
-          <p:cNvSpPr txBox="1"/>
-          <p:nvPr/>
-        </p:nvSpPr>
-        <p:spPr>
-          <a:xfrm>
-            <a:off x="697326" y="2458888"/>
-            <a:ext cx="7110290" cy="707886"/>
-          </a:xfrm>
-          <a:prstGeom prst="rect">
-            <a:avLst/>
-          </a:prstGeom>
-          <a:noFill/>
-        </p:spPr>
-        <p:txBody>
-          <a:bodyPr rot="0" spcFirstLastPara="0" vertOverflow="overflow" horzOverflow="overflow" vert="horz" wrap="square" lIns="91440" tIns="45720" rIns="91440" bIns="45720" numCol="1" spcCol="0" rtlCol="0" fromWordArt="0" anchor="t" anchorCtr="0" forceAA="0" compatLnSpc="1">
-            <a:prstTxWarp prst="textNoShape">
-              <a:avLst/>
-            </a:prstTxWarp>
-            <a:spAutoFit/>
-          </a:bodyPr>
-          <a:lstStyle/>
-          <a:p>
-            <a:pPr algn="just"/>
-            <a:r>
-              <a:rPr lang="en-US" sz="2000" dirty="0"/>
-              <a:t>Then browse to the extracted files in Solution Explorer.</a:t>
-            </a:r>
-          </a:p>
-          <a:p>
-            <a:pPr algn="just"/>
-            <a:r>
-              <a:rPr lang="en-US" sz="2000" dirty="0"/>
-              <a:t>We'll look at example01.html first.</a:t>
-            </a:r>
-            <a:endParaRPr lang="en-US" dirty="0"/>
-          </a:p>
-        </p:txBody>
-      </p:sp>
-      <p:sp>
-        <p:nvSpPr>
-          <p:cNvPr id="13" name="TextBox 12">
-            <a:extLst>
-              <a:ext uri="{FF2B5EF4-FFF2-40B4-BE49-F238E27FC236}">
-                <a16:creationId xmlns:a16="http://schemas.microsoft.com/office/drawing/2014/main" id="{57DF9970-142E-4DAE-8196-F2B4D3D9B08E}"/>
-              </a:ext>
-            </a:extLst>
-          </p:cNvPr>
-          <p:cNvSpPr txBox="1"/>
-          <p:nvPr/>
-        </p:nvSpPr>
-        <p:spPr>
-          <a:xfrm>
-            <a:off x="4491317" y="4456738"/>
-            <a:ext cx="4382459" cy="707886"/>
-          </a:xfrm>
-          <a:prstGeom prst="rect">
-            <a:avLst/>
-          </a:prstGeom>
-          <a:noFill/>
-        </p:spPr>
-        <p:txBody>
-          <a:bodyPr rot="0" spcFirstLastPara="0" vertOverflow="overflow" horzOverflow="overflow" vert="horz" wrap="square" lIns="91440" tIns="45720" rIns="91440" bIns="45720" numCol="1" spcCol="0" rtlCol="0" fromWordArt="0" anchor="t" anchorCtr="0" forceAA="0" compatLnSpc="1">
-            <a:prstTxWarp prst="textNoShape">
-              <a:avLst/>
-            </a:prstTxWarp>
-            <a:spAutoFit/>
-          </a:bodyPr>
-          <a:lstStyle/>
-          <a:p>
-            <a:pPr algn="just"/>
-            <a:r>
-              <a:rPr lang="en-US" sz="2000" dirty="0"/>
-              <a:t>If Solution Explorer isn't open, hold CTRL+ALT and tap the L key.</a:t>
-            </a:r>
-          </a:p>
-        </p:txBody>
-      </p:sp>
     </p:spTree>
     <p:extLst>
       <p:ext uri="{BB962C8B-B14F-4D97-AF65-F5344CB8AC3E}">
@@ -13804,10 +13711,15 @@
           <a:bodyPr/>
           <a:lstStyle/>
           <a:p>
-            <a:r>
-              <a:rPr lang="en-US"/>
-              <a:t>Example 01: The Colors</a:t>
-            </a:r>
+            <a:pPr algn="ctr"/>
+            <a:r>
+              <a:rPr lang="en-US" dirty="0">
+                <a:ea typeface="+mj-lt"/>
+                <a:cs typeface="+mj-lt"/>
+              </a:rPr>
+              <a:t>Example: The Basics</a:t>
+            </a:r>
+            <a:endParaRPr lang="en-US" dirty="0"/>
           </a:p>
         </p:txBody>
       </p:sp>
@@ -13845,13 +13757,13 @@
             <a:pPr algn="just"/>
             <a:r>
               <a:rPr lang="en-US" sz="2000" dirty="0"/>
-              <a:t>To view the HTML in a web browser, right click example01.html in the Solution Explorer, and click Open with...</a:t>
+              <a:t>To view the HTML in a web browser, right click the_basics.html in the Solution Explorer, and click Open with...</a:t>
             </a:r>
             <a:endParaRPr lang="en-US"/>
           </a:p>
           <a:p>
             <a:pPr algn="just"/>
-            <a:endParaRPr lang="en-US" sz="2000" dirty="0"/>
+            <a:endParaRPr lang="en-US" sz="2000"/>
           </a:p>
           <a:p>
             <a:pPr algn="just"/>
@@ -13940,7 +13852,7 @@
         </p:nvSpPr>
         <p:spPr>
           <a:xfrm>
-            <a:off x="1039857" y="160759"/>
+            <a:off x="1039856" y="210671"/>
             <a:ext cx="7055380" cy="710249"/>
           </a:xfrm>
         </p:spPr>
@@ -13952,10 +13864,10 @@
           <a:p>
             <a:pPr algn="ctr"/>
             <a:r>
-              <a:rPr lang="en-US" sz="3200" dirty="0"/>
-              <a:t>Example 01: The Colors</a:t>
-            </a:r>
-            <a:endParaRPr lang="en-US" sz="3200" dirty="0">
+              <a:rPr lang="en-US" sz="3200"/>
+              <a:t>The Debugger</a:t>
+            </a:r>
+            <a:endParaRPr lang="en-US" sz="3200">
               <a:effectLst>
                 <a:glow rad="38100">
                   <a:prstClr val="black">
@@ -13988,8 +13900,8 @@
         </p:nvSpPr>
         <p:spPr>
           <a:xfrm>
-            <a:off x="650217" y="1002597"/>
-            <a:ext cx="7849879" cy="707886"/>
+            <a:off x="486015" y="867013"/>
+            <a:ext cx="8512626" cy="1015663"/>
           </a:xfrm>
           <a:prstGeom prst="rect">
             <a:avLst/>
@@ -14005,28 +13917,41 @@
           </a:bodyPr>
           <a:lstStyle/>
           <a:p>
-            <a:pPr algn="ctr"/>
+            <a:pPr algn="just"/>
             <a:r>
               <a:rPr lang="en-US" sz="2000" dirty="0"/>
-              <a:t>You'll notice some features of the page don't work</a:t>
+              <a:t>In Chrome, hit the F12 key.</a:t>
             </a:r>
             <a:endParaRPr lang="en-US" dirty="0"/>
           </a:p>
           <a:p>
-            <a:pPr algn="ctr"/>
+            <a:pPr algn="just"/>
             <a:r>
               <a:rPr lang="en-US" sz="2000" dirty="0"/>
-              <a:t>Don't worry, you'll be fixing that soon.</a:t>
-            </a:r>
+              <a:t>Click on the</a:t>
+            </a:r>
+            <a:r>
+              <a:rPr lang="en-US" sz="2000" b="1" dirty="0"/>
+              <a:t> Sources</a:t>
+            </a:r>
+            <a:r>
+              <a:rPr lang="en-US" sz="2000" dirty="0"/>
+              <a:t> tab to see our code loaded in the browser.</a:t>
+            </a:r>
+            <a:endParaRPr lang="en-US"/>
+          </a:p>
+          <a:p>
+            <a:pPr algn="just"/>
+            <a:endParaRPr lang="en-US" sz="2000"/>
           </a:p>
         </p:txBody>
       </p:sp>
       <p:pic>
         <p:nvPicPr>
-          <p:cNvPr id="7" name="Picture 7" descr="A screenshot of a cell phone&#10;&#10;Description generated with very high confidence">
+          <p:cNvPr id="3" name="Picture 4" descr="A screenshot of a cell phone&#10;&#10;Description generated with very high confidence">
             <a:extLst>
               <a:ext uri="{FF2B5EF4-FFF2-40B4-BE49-F238E27FC236}">
-                <a16:creationId xmlns:a16="http://schemas.microsoft.com/office/drawing/2014/main" id="{263072F9-B7FA-45AC-B8B3-A56DB7A5D297}"/>
+                <a16:creationId xmlns:a16="http://schemas.microsoft.com/office/drawing/2014/main" id="{A34D15D2-6385-458D-9E20-85A14A1BABFC}"/>
               </a:ext>
             </a:extLst>
           </p:cNvPr>
@@ -14043,58 +13968,18 @@
         </p:blipFill>
         <p:spPr>
           <a:xfrm>
-            <a:off x="2201598" y="1968115"/>
-            <a:ext cx="4746071" cy="3992373"/>
+            <a:off x="71717" y="1819344"/>
+            <a:ext cx="9072281" cy="4357829"/>
           </a:xfrm>
           <a:prstGeom prst="rect">
             <a:avLst/>
           </a:prstGeom>
         </p:spPr>
       </p:pic>
-      <p:sp>
-        <p:nvSpPr>
-          <p:cNvPr id="9" name="TextBox 8">
-            <a:extLst>
-              <a:ext uri="{FF2B5EF4-FFF2-40B4-BE49-F238E27FC236}">
-                <a16:creationId xmlns:a16="http://schemas.microsoft.com/office/drawing/2014/main" id="{01D039B4-A8D6-4B09-A379-6D3B1CD7C595}"/>
-              </a:ext>
-            </a:extLst>
-          </p:cNvPr>
-          <p:cNvSpPr txBox="1"/>
-          <p:nvPr/>
-        </p:nvSpPr>
-        <p:spPr>
-          <a:xfrm>
-            <a:off x="544438" y="6213754"/>
-            <a:ext cx="7849879" cy="400110"/>
-          </a:xfrm>
-          <a:prstGeom prst="rect">
-            <a:avLst/>
-          </a:prstGeom>
-          <a:noFill/>
-        </p:spPr>
-        <p:txBody>
-          <a:bodyPr rot="0" spcFirstLastPara="0" vertOverflow="overflow" horzOverflow="overflow" vert="horz" wrap="square" lIns="91440" tIns="45720" rIns="91440" bIns="45720" numCol="1" spcCol="0" rtlCol="0" fromWordArt="0" anchor="t" anchorCtr="0" forceAA="0" compatLnSpc="1">
-            <a:prstTxWarp prst="textNoShape">
-              <a:avLst/>
-            </a:prstTxWarp>
-            <a:spAutoFit/>
-          </a:bodyPr>
-          <a:lstStyle/>
-          <a:p>
-            <a:pPr algn="ctr"/>
-            <a:r>
-              <a:rPr lang="en-US" sz="2000" dirty="0"/>
-              <a:t>First, let's take a moment to revisit the debugger</a:t>
-            </a:r>
-            <a:endParaRPr lang="en-US" dirty="0"/>
-          </a:p>
-        </p:txBody>
-      </p:sp>
     </p:spTree>
     <p:extLst>
       <p:ext uri="{BB962C8B-B14F-4D97-AF65-F5344CB8AC3E}">
-        <p14:creationId xmlns:p14="http://schemas.microsoft.com/office/powerpoint/2010/main" val="653725357"/>
+        <p14:creationId xmlns:p14="http://schemas.microsoft.com/office/powerpoint/2010/main" val="4227264421"/>
       </p:ext>
     </p:extLst>
   </p:cSld>
@@ -14139,22 +14024,23 @@
         </p:nvSpPr>
         <p:spPr>
           <a:xfrm>
-            <a:off x="1039856" y="210671"/>
+            <a:off x="910084" y="170741"/>
             <a:ext cx="7055380" cy="710249"/>
           </a:xfrm>
         </p:spPr>
         <p:txBody>
-          <a:bodyPr>
-            <a:normAutofit/>
-          </a:bodyPr>
+          <a:bodyPr/>
           <a:lstStyle/>
           <a:p>
             <a:pPr algn="ctr"/>
             <a:r>
-              <a:rPr lang="en-US" sz="3200" dirty="0"/>
+              <a:rPr lang="en-US" sz="3200">
+                <a:ea typeface="+mj-lt"/>
+                <a:cs typeface="+mj-lt"/>
+              </a:rPr>
               <a:t>The Debugger</a:t>
             </a:r>
-            <a:endParaRPr lang="en-US" sz="3200" dirty="0">
+            <a:endParaRPr lang="en-US" sz="3200">
               <a:effectLst>
                 <a:glow rad="38100">
                   <a:prstClr val="black">
@@ -14169,6 +14055,8 @@
                   </a:srgbClr>
                 </a:outerShdw>
               </a:effectLst>
+              <a:ea typeface="+mj-lt"/>
+              <a:cs typeface="+mj-lt"/>
             </a:endParaRPr>
           </a:p>
         </p:txBody>
@@ -14187,8 +14075,8 @@
         </p:nvSpPr>
         <p:spPr>
           <a:xfrm>
-            <a:off x="486015" y="1037342"/>
-            <a:ext cx="8512626" cy="1015663"/>
+            <a:off x="466805" y="835636"/>
+            <a:ext cx="7849879" cy="707886"/>
           </a:xfrm>
           <a:prstGeom prst="rect">
             <a:avLst/>
@@ -14207,38 +14095,18 @@
             <a:pPr algn="just"/>
             <a:r>
               <a:rPr lang="en-US" sz="2000" dirty="0"/>
-              <a:t>In Chrome, hit the F12 key to open the debugger. </a:t>
-            </a:r>
-            <a:endParaRPr lang="en-US"/>
-          </a:p>
-          <a:p>
-            <a:pPr algn="just"/>
-            <a:r>
-              <a:rPr lang="en-US" sz="2000" dirty="0"/>
-              <a:t>Click on the</a:t>
-            </a:r>
-            <a:r>
-              <a:rPr lang="en-US" sz="2000" b="1" dirty="0"/>
-              <a:t> Sources</a:t>
-            </a:r>
-            <a:r>
-              <a:rPr lang="en-US" sz="2000" dirty="0"/>
-              <a:t> tab to see our code loaded in the browser.</a:t>
+              <a:t>Try setting a breakpoint on Line 5 of the_basics.js by clicking on the '5'. Add watches for a, b, and c. Press F5 to reload.</a:t>
             </a:r>
             <a:endParaRPr lang="en-US" dirty="0"/>
-          </a:p>
-          <a:p>
-            <a:pPr algn="just"/>
-            <a:endParaRPr lang="en-US" sz="2000" dirty="0"/>
           </a:p>
         </p:txBody>
       </p:sp>
       <p:pic>
         <p:nvPicPr>
-          <p:cNvPr id="6" name="Picture 6" descr="A screenshot of a cell phone&#10;&#10;Description generated with very high confidence">
+          <p:cNvPr id="5" name="Picture 5">
             <a:extLst>
               <a:ext uri="{FF2B5EF4-FFF2-40B4-BE49-F238E27FC236}">
-                <a16:creationId xmlns:a16="http://schemas.microsoft.com/office/drawing/2014/main" id="{D55CDF0F-E6F2-4C40-93C2-A29B3BAE1013}"/>
+                <a16:creationId xmlns:a16="http://schemas.microsoft.com/office/drawing/2014/main" id="{A3DEA2A2-E8CB-41F8-B7B9-FB9C40AF12FC}"/>
               </a:ext>
             </a:extLst>
           </p:cNvPr>
@@ -14255,8 +14123,77 @@
         </p:blipFill>
         <p:spPr>
           <a:xfrm>
-            <a:off x="584545" y="1767357"/>
-            <a:ext cx="7969623" cy="4980542"/>
+            <a:off x="4334395" y="1715460"/>
+            <a:ext cx="2838049" cy="496900"/>
+          </a:xfrm>
+          <a:prstGeom prst="rect">
+            <a:avLst/>
+          </a:prstGeom>
+        </p:spPr>
+      </p:pic>
+      <p:sp>
+        <p:nvSpPr>
+          <p:cNvPr id="7" name="TextBox 6">
+            <a:extLst>
+              <a:ext uri="{FF2B5EF4-FFF2-40B4-BE49-F238E27FC236}">
+                <a16:creationId xmlns:a16="http://schemas.microsoft.com/office/drawing/2014/main" id="{B259B8A0-E848-4BE7-B78D-BA72C4202978}"/>
+              </a:ext>
+            </a:extLst>
+          </p:cNvPr>
+          <p:cNvSpPr txBox="1"/>
+          <p:nvPr/>
+        </p:nvSpPr>
+        <p:spPr>
+          <a:xfrm>
+            <a:off x="457839" y="1747474"/>
+            <a:ext cx="3979048" cy="400110"/>
+          </a:xfrm>
+          <a:prstGeom prst="rect">
+            <a:avLst/>
+          </a:prstGeom>
+          <a:noFill/>
+        </p:spPr>
+        <p:txBody>
+          <a:bodyPr rot="0" spcFirstLastPara="0" vertOverflow="overflow" horzOverflow="overflow" vert="horz" wrap="square" lIns="91440" tIns="45720" rIns="91440" bIns="45720" numCol="1" spcCol="0" rtlCol="0" fromWordArt="0" anchor="t" anchorCtr="0" forceAA="0" compatLnSpc="1">
+            <a:prstTxWarp prst="textNoShape">
+              <a:avLst/>
+            </a:prstTxWarp>
+            <a:spAutoFit/>
+          </a:bodyPr>
+          <a:lstStyle/>
+          <a:p>
+            <a:pPr algn="just"/>
+            <a:r>
+              <a:rPr lang="en-US" sz="2000"/>
+              <a:t>You'll notice the page shows:</a:t>
+            </a:r>
+          </a:p>
+        </p:txBody>
+      </p:sp>
+      <p:pic>
+        <p:nvPicPr>
+          <p:cNvPr id="3" name="Picture 5" descr="A screenshot of a cell phone&#10;&#10;Description generated with very high confidence">
+            <a:extLst>
+              <a:ext uri="{FF2B5EF4-FFF2-40B4-BE49-F238E27FC236}">
+                <a16:creationId xmlns:a16="http://schemas.microsoft.com/office/drawing/2014/main" id="{1237F6BE-7133-4281-AFD3-8D42D2380087}"/>
+              </a:ext>
+            </a:extLst>
+          </p:cNvPr>
+          <p:cNvPicPr>
+            <a:picLocks noChangeAspect="1"/>
+          </p:cNvPicPr>
+          <p:nvPr/>
+        </p:nvPicPr>
+        <p:blipFill>
+          <a:blip r:embed="rId3"/>
+          <a:stretch>
+            <a:fillRect/>
+          </a:stretch>
+        </p:blipFill>
+        <p:spPr>
+          <a:xfrm>
+            <a:off x="1138518" y="2275383"/>
+            <a:ext cx="6723528" cy="4548409"/>
           </a:xfrm>
           <a:prstGeom prst="rect">
             <a:avLst/>
@@ -14266,7 +14203,7 @@
     </p:spTree>
     <p:extLst>
       <p:ext uri="{BB962C8B-B14F-4D97-AF65-F5344CB8AC3E}">
-        <p14:creationId xmlns:p14="http://schemas.microsoft.com/office/powerpoint/2010/main" val="4227264421"/>
+        <p14:creationId xmlns:p14="http://schemas.microsoft.com/office/powerpoint/2010/main" val="3056313575"/>
       </p:ext>
     </p:extLst>
   </p:cSld>
@@ -14321,13 +14258,13 @@
           <a:p>
             <a:pPr algn="ctr"/>
             <a:r>
-              <a:rPr lang="en-US" sz="3200" dirty="0">
+              <a:rPr lang="en-US" sz="3200">
                 <a:ea typeface="+mj-lt"/>
                 <a:cs typeface="+mj-lt"/>
               </a:rPr>
               <a:t>The Debugger</a:t>
             </a:r>
-            <a:endParaRPr lang="en-US" sz="3200" dirty="0">
+            <a:endParaRPr lang="en-US" sz="3200">
               <a:effectLst>
                 <a:glow rad="38100">
                   <a:prstClr val="black">
@@ -14350,10 +14287,10 @@
       </p:sp>
       <p:sp>
         <p:nvSpPr>
-          <p:cNvPr id="4" name="TextBox 3">
+          <p:cNvPr id="11" name="TextBox 10">
             <a:extLst>
               <a:ext uri="{FF2B5EF4-FFF2-40B4-BE49-F238E27FC236}">
-                <a16:creationId xmlns:a16="http://schemas.microsoft.com/office/drawing/2014/main" id="{D3841CC4-5C87-49CE-88C0-8A98AA1A8147}"/>
+                <a16:creationId xmlns:a16="http://schemas.microsoft.com/office/drawing/2014/main" id="{B203A47B-8F17-4F9B-BDE4-50181CA34F31}"/>
               </a:ext>
             </a:extLst>
           </p:cNvPr>
@@ -14362,8 +14299,8 @@
         </p:nvSpPr>
         <p:spPr>
           <a:xfrm>
-            <a:off x="466805" y="1104577"/>
-            <a:ext cx="7849879" cy="1631216"/>
+            <a:off x="672353" y="1255059"/>
+            <a:ext cx="3541058" cy="523220"/>
           </a:xfrm>
           <a:prstGeom prst="rect">
             <a:avLst/>
@@ -14379,29 +14316,108 @@
           </a:bodyPr>
           <a:lstStyle/>
           <a:p>
-            <a:pPr algn="just"/>
-            <a:r>
-              <a:rPr lang="en-US" sz="2000" dirty="0"/>
-              <a:t>Double click example01.js, and try setting a breakpoint on Line 5 by clicking on the '5'. Hit F5 to reload the page and it should trigger</a:t>
-            </a:r>
-            <a:endParaRPr lang="en-US" dirty="0"/>
-          </a:p>
-          <a:p>
-            <a:pPr algn="just"/>
-            <a:endParaRPr lang="en-US" sz="2000" dirty="0"/>
-          </a:p>
-          <a:p>
-            <a:pPr algn="just"/>
-            <a:endParaRPr lang="en-US" sz="2000" dirty="0"/>
+            <a:r>
+              <a:rPr lang="en-US" sz="2800" dirty="0"/>
+              <a:t>Debugger controls:</a:t>
+            </a:r>
+            <a:endParaRPr lang="en-US" sz="2800"/>
+          </a:p>
+        </p:txBody>
+      </p:sp>
+      <p:sp>
+        <p:nvSpPr>
+          <p:cNvPr id="12" name="TextBox 11">
+            <a:extLst>
+              <a:ext uri="{FF2B5EF4-FFF2-40B4-BE49-F238E27FC236}">
+                <a16:creationId xmlns:a16="http://schemas.microsoft.com/office/drawing/2014/main" id="{A8197E31-A3D9-4700-9AE1-A4854704D2C5}"/>
+              </a:ext>
+            </a:extLst>
+          </p:cNvPr>
+          <p:cNvSpPr txBox="1"/>
+          <p:nvPr/>
+        </p:nvSpPr>
+        <p:spPr>
+          <a:xfrm>
+            <a:off x="672354" y="2286000"/>
+            <a:ext cx="7736538" cy="2677656"/>
+          </a:xfrm>
+          <a:prstGeom prst="rect">
+            <a:avLst/>
+          </a:prstGeom>
+          <a:noFill/>
+        </p:spPr>
+        <p:txBody>
+          <a:bodyPr rot="0" spcFirstLastPara="0" vertOverflow="overflow" horzOverflow="overflow" vert="horz" wrap="square" lIns="91440" tIns="45720" rIns="91440" bIns="45720" numCol="1" spcCol="0" rtlCol="0" fromWordArt="0" anchor="t" anchorCtr="0" forceAA="0" compatLnSpc="1">
+            <a:prstTxWarp prst="textNoShape">
+              <a:avLst/>
+            </a:prstTxWarp>
+            <a:spAutoFit/>
+          </a:bodyPr>
+          <a:lstStyle/>
+          <a:p>
+            <a:r>
+              <a:rPr lang="en-US" sz="2800" dirty="0"/>
+              <a:t>From left to right:</a:t>
+            </a:r>
+          </a:p>
+          <a:p>
+            <a:pPr marL="342900" indent="-342900">
+              <a:buFont typeface="Arial"/>
+              <a:buChar char="•"/>
+            </a:pPr>
+            <a:r>
+              <a:rPr lang="en-US" sz="2800" dirty="0"/>
+              <a:t>Resume execution (F8)</a:t>
+            </a:r>
+          </a:p>
+          <a:p>
+            <a:pPr marL="342900" indent="-342900">
+              <a:buFont typeface="Arial"/>
+              <a:buChar char="•"/>
+            </a:pPr>
+            <a:r>
+              <a:rPr lang="en-US" sz="2800" dirty="0"/>
+              <a:t>Step over next function call (F10)</a:t>
+            </a:r>
+          </a:p>
+          <a:p>
+            <a:pPr marL="342900" indent="-342900">
+              <a:buFont typeface="Arial"/>
+              <a:buChar char="•"/>
+            </a:pPr>
+            <a:r>
+              <a:rPr lang="en-US" sz="2800" dirty="0"/>
+              <a:t>Step into next function call (F11)</a:t>
+            </a:r>
+          </a:p>
+          <a:p>
+            <a:pPr marL="342900" indent="-342900">
+              <a:buFont typeface="Arial"/>
+              <a:buChar char="•"/>
+            </a:pPr>
+            <a:r>
+              <a:rPr lang="en-US" sz="2800" dirty="0"/>
+              <a:t>Step out of current function (Shift+F11)</a:t>
+            </a:r>
+          </a:p>
+          <a:p>
+            <a:pPr marL="342900" indent="-342900">
+              <a:buFont typeface="Arial"/>
+              <a:buChar char="•"/>
+            </a:pPr>
+            <a:r>
+              <a:rPr lang="en-US" sz="2800" dirty="0"/>
+              <a:t>Step (F9)</a:t>
+            </a:r>
           </a:p>
         </p:txBody>
       </p:sp>
       <p:pic>
         <p:nvPicPr>
-          <p:cNvPr id="5" name="Picture 5">
+          <p:cNvPr id="13" name="Picture 13">
             <a:extLst>
               <a:ext uri="{FF2B5EF4-FFF2-40B4-BE49-F238E27FC236}">
-                <a16:creationId xmlns:a16="http://schemas.microsoft.com/office/drawing/2014/main" id="{A3DEA2A2-E8CB-41F8-B7B9-FB9C40AF12FC}"/>
+                <a16:creationId xmlns:a16="http://schemas.microsoft.com/office/drawing/2014/main" id="{9E77AC59-1F70-492E-9704-F8EB9D133534}"/>
               </a:ext>
             </a:extLst>
           </p:cNvPr>
@@ -14418,8 +14434,8 @@
         </p:blipFill>
         <p:spPr>
           <a:xfrm>
-            <a:off x="4334395" y="2316095"/>
-            <a:ext cx="2838049" cy="496900"/>
+            <a:off x="4438650" y="1209394"/>
+            <a:ext cx="3341594" cy="620245"/>
           </a:xfrm>
           <a:prstGeom prst="rect">
             <a:avLst/>
@@ -14428,10 +14444,10 @@
       </p:pic>
       <p:sp>
         <p:nvSpPr>
-          <p:cNvPr id="7" name="TextBox 6">
+          <p:cNvPr id="15" name="TextBox 14">
             <a:extLst>
               <a:ext uri="{FF2B5EF4-FFF2-40B4-BE49-F238E27FC236}">
-                <a16:creationId xmlns:a16="http://schemas.microsoft.com/office/drawing/2014/main" id="{B259B8A0-E848-4BE7-B78D-BA72C4202978}"/>
+                <a16:creationId xmlns:a16="http://schemas.microsoft.com/office/drawing/2014/main" id="{3A3C1022-E852-4E33-9600-EFCA3045BE33}"/>
               </a:ext>
             </a:extLst>
           </p:cNvPr>
@@ -14440,8 +14456,8 @@
         </p:nvSpPr>
         <p:spPr>
           <a:xfrm>
-            <a:off x="466804" y="2410862"/>
-            <a:ext cx="3979048" cy="400110"/>
+            <a:off x="439271" y="6087035"/>
+            <a:ext cx="8390963" cy="523220"/>
           </a:xfrm>
           <a:prstGeom prst="rect">
             <a:avLst/>
@@ -14457,48 +14473,18 @@
           </a:bodyPr>
           <a:lstStyle/>
           <a:p>
-            <a:pPr algn="just"/>
-            <a:r>
-              <a:rPr lang="en-US" sz="2000" dirty="0"/>
-              <a:t>You'll notice the page shows:</a:t>
-            </a:r>
-          </a:p>
-        </p:txBody>
-      </p:sp>
-      <p:pic>
-        <p:nvPicPr>
-          <p:cNvPr id="8" name="Picture 8" descr="A screenshot of a cell phone&#10;&#10;Description generated with very high confidence">
-            <a:extLst>
-              <a:ext uri="{FF2B5EF4-FFF2-40B4-BE49-F238E27FC236}">
-                <a16:creationId xmlns:a16="http://schemas.microsoft.com/office/drawing/2014/main" id="{2D85F888-B99F-4E0E-8FC3-28DD22A8782B}"/>
-              </a:ext>
-            </a:extLst>
-          </p:cNvPr>
-          <p:cNvPicPr>
-            <a:picLocks noChangeAspect="1"/>
-          </p:cNvPicPr>
-          <p:nvPr/>
-        </p:nvPicPr>
-        <p:blipFill>
-          <a:blip r:embed="rId3"/>
-          <a:stretch>
-            <a:fillRect/>
-          </a:stretch>
-        </p:blipFill>
-        <p:spPr>
-          <a:xfrm>
-            <a:off x="30736" y="3352010"/>
-            <a:ext cx="9111342" cy="2987465"/>
-          </a:xfrm>
-          <a:prstGeom prst="rect">
-            <a:avLst/>
-          </a:prstGeom>
-        </p:spPr>
-      </p:pic>
+            <a:r>
+              <a:rPr lang="en-US" sz="2800" b="1" dirty="0"/>
+              <a:t>Press F9 a few times to step through the code.</a:t>
+            </a:r>
+            <a:endParaRPr lang="en-US" b="1"/>
+          </a:p>
+        </p:txBody>
+      </p:sp>
     </p:spTree>
     <p:extLst>
       <p:ext uri="{BB962C8B-B14F-4D97-AF65-F5344CB8AC3E}">
-        <p14:creationId xmlns:p14="http://schemas.microsoft.com/office/powerpoint/2010/main" val="3056313575"/>
+        <p14:creationId xmlns:p14="http://schemas.microsoft.com/office/powerpoint/2010/main" val="1680363142"/>
       </p:ext>
     </p:extLst>
   </p:cSld>
@@ -14543,7 +14529,7 @@
         </p:nvSpPr>
         <p:spPr>
           <a:xfrm>
-            <a:off x="847135" y="116130"/>
+            <a:off x="861228" y="121024"/>
             <a:ext cx="7055380" cy="710249"/>
           </a:xfrm>
         </p:spPr>
@@ -14555,22 +14541,34 @@
           <a:p>
             <a:pPr algn="ctr"/>
             <a:r>
-              <a:rPr lang="en-US" sz="3200" dirty="0">
-                <a:ea typeface="+mj-lt"/>
-                <a:cs typeface="+mj-lt"/>
-              </a:rPr>
-              <a:t>The Debugger</a:t>
-            </a:r>
-            <a:endParaRPr lang="en-US" sz="3200" dirty="0"/>
-          </a:p>
-        </p:txBody>
-      </p:sp>
-      <p:sp>
-        <p:nvSpPr>
-          <p:cNvPr id="9" name="TextBox 1">
+              <a:rPr lang="en-US" sz="3200" dirty="0"/>
+              <a:t>Example: The Basics</a:t>
+            </a:r>
+            <a:endParaRPr lang="en-US" sz="3200" dirty="0">
+              <a:effectLst>
+                <a:glow rad="38100">
+                  <a:prstClr val="black">
+                    <a:lumMod val="65000"/>
+                    <a:lumOff val="35000"/>
+                    <a:alpha val="40000"/>
+                  </a:prstClr>
+                </a:glow>
+                <a:outerShdw blurRad="28575" dist="38100" dir="14040000" algn="tl" rotWithShape="0">
+                  <a:srgbClr val="000000">
+                    <a:alpha val="25000"/>
+                  </a:srgbClr>
+                </a:outerShdw>
+              </a:effectLst>
+            </a:endParaRPr>
+          </a:p>
+        </p:txBody>
+      </p:sp>
+      <p:sp>
+        <p:nvSpPr>
+          <p:cNvPr id="3" name="TextBox 2">
             <a:extLst>
               <a:ext uri="{FF2B5EF4-FFF2-40B4-BE49-F238E27FC236}">
-                <a16:creationId xmlns:a16="http://schemas.microsoft.com/office/drawing/2014/main" id="{E9FECBE0-AE70-45E0-8FFD-F76BD9DBC999}"/>
+                <a16:creationId xmlns:a16="http://schemas.microsoft.com/office/drawing/2014/main" id="{E61DBC47-78EB-4073-8B62-19078A06C703}"/>
               </a:ext>
             </a:extLst>
           </p:cNvPr>
@@ -14579,8 +14577,8 @@
         </p:nvSpPr>
         <p:spPr>
           <a:xfrm>
-            <a:off x="428385" y="1104576"/>
-            <a:ext cx="7849879" cy="4708981"/>
+            <a:off x="430306" y="1299882"/>
+            <a:ext cx="8462682" cy="830997"/>
           </a:xfrm>
           <a:prstGeom prst="rect">
             <a:avLst/>
@@ -14588,247 +14586,359 @@
           <a:noFill/>
         </p:spPr>
         <p:txBody>
-          <a:bodyPr rot="0" spcFirstLastPara="0" vert="horz" wrap="square" lIns="91440" tIns="45720" rIns="91440" bIns="45720" numCol="1" spcCol="0" rtlCol="0" fromWordArt="0" anchor="t" anchorCtr="0" forceAA="0" compatLnSpc="1">
+          <a:bodyPr rot="0" spcFirstLastPara="0" vertOverflow="overflow" horzOverflow="overflow" vert="horz" wrap="square" lIns="91440" tIns="45720" rIns="91440" bIns="45720" numCol="1" spcCol="0" rtlCol="0" fromWordArt="0" anchor="t" anchorCtr="0" forceAA="0" compatLnSpc="1">
             <a:prstTxWarp prst="textNoShape">
               <a:avLst/>
             </a:prstTxWarp>
             <a:spAutoFit/>
           </a:bodyPr>
-          <a:lstStyle>
-            <a:defPPr>
-              <a:defRPr lang="en-US"/>
-            </a:defPPr>
-            <a:lvl1pPr marL="0" algn="l" defTabSz="914400" rtl="0" eaLnBrk="1" latinLnBrk="0" hangingPunct="1">
-              <a:defRPr sz="1800" kern="1200">
-                <a:solidFill>
-                  <a:schemeClr val="tx1"/>
-                </a:solidFill>
-                <a:latin typeface="+mn-lt"/>
-                <a:ea typeface="+mn-ea"/>
-                <a:cs typeface="+mn-cs"/>
-              </a:defRPr>
-            </a:lvl1pPr>
-            <a:lvl2pPr marL="457200" algn="l" defTabSz="914400" rtl="0" eaLnBrk="1" latinLnBrk="0" hangingPunct="1">
-              <a:defRPr sz="1800" kern="1200">
-                <a:solidFill>
-                  <a:schemeClr val="tx1"/>
-                </a:solidFill>
-                <a:latin typeface="+mn-lt"/>
-                <a:ea typeface="+mn-ea"/>
-                <a:cs typeface="+mn-cs"/>
-              </a:defRPr>
-            </a:lvl2pPr>
-            <a:lvl3pPr marL="914400" algn="l" defTabSz="914400" rtl="0" eaLnBrk="1" latinLnBrk="0" hangingPunct="1">
-              <a:defRPr sz="1800" kern="1200">
-                <a:solidFill>
-                  <a:schemeClr val="tx1"/>
-                </a:solidFill>
-                <a:latin typeface="+mn-lt"/>
-                <a:ea typeface="+mn-ea"/>
-                <a:cs typeface="+mn-cs"/>
-              </a:defRPr>
-            </a:lvl3pPr>
-            <a:lvl4pPr marL="1371600" algn="l" defTabSz="914400" rtl="0" eaLnBrk="1" latinLnBrk="0" hangingPunct="1">
-              <a:defRPr sz="1800" kern="1200">
-                <a:solidFill>
-                  <a:schemeClr val="tx1"/>
-                </a:solidFill>
-                <a:latin typeface="+mn-lt"/>
-                <a:ea typeface="+mn-ea"/>
-                <a:cs typeface="+mn-cs"/>
-              </a:defRPr>
-            </a:lvl4pPr>
-            <a:lvl5pPr marL="1828800" algn="l" defTabSz="914400" rtl="0" eaLnBrk="1" latinLnBrk="0" hangingPunct="1">
-              <a:defRPr sz="1800" kern="1200">
-                <a:solidFill>
-                  <a:schemeClr val="tx1"/>
-                </a:solidFill>
-                <a:latin typeface="+mn-lt"/>
-                <a:ea typeface="+mn-ea"/>
-                <a:cs typeface="+mn-cs"/>
-              </a:defRPr>
-            </a:lvl5pPr>
-            <a:lvl6pPr marL="2286000" algn="l" defTabSz="914400" rtl="0" eaLnBrk="1" latinLnBrk="0" hangingPunct="1">
-              <a:defRPr sz="1800" kern="1200">
-                <a:solidFill>
-                  <a:schemeClr val="tx1"/>
-                </a:solidFill>
-                <a:latin typeface="+mn-lt"/>
-                <a:ea typeface="+mn-ea"/>
-                <a:cs typeface="+mn-cs"/>
-              </a:defRPr>
-            </a:lvl6pPr>
-            <a:lvl7pPr marL="2743200" algn="l" defTabSz="914400" rtl="0" eaLnBrk="1" latinLnBrk="0" hangingPunct="1">
-              <a:defRPr sz="1800" kern="1200">
-                <a:solidFill>
-                  <a:schemeClr val="tx1"/>
-                </a:solidFill>
-                <a:latin typeface="+mn-lt"/>
-                <a:ea typeface="+mn-ea"/>
-                <a:cs typeface="+mn-cs"/>
-              </a:defRPr>
-            </a:lvl7pPr>
-            <a:lvl8pPr marL="3200400" algn="l" defTabSz="914400" rtl="0" eaLnBrk="1" latinLnBrk="0" hangingPunct="1">
-              <a:defRPr sz="1800" kern="1200">
-                <a:solidFill>
-                  <a:schemeClr val="tx1"/>
-                </a:solidFill>
-                <a:latin typeface="+mn-lt"/>
-                <a:ea typeface="+mn-ea"/>
-                <a:cs typeface="+mn-cs"/>
-              </a:defRPr>
-            </a:lvl8pPr>
-            <a:lvl9pPr marL="3657600" algn="l" defTabSz="914400" rtl="0" eaLnBrk="1" latinLnBrk="0" hangingPunct="1">
-              <a:defRPr sz="1800" kern="1200">
-                <a:solidFill>
-                  <a:schemeClr val="tx1"/>
-                </a:solidFill>
-                <a:latin typeface="+mn-lt"/>
-                <a:ea typeface="+mn-ea"/>
-                <a:cs typeface="+mn-cs"/>
-              </a:defRPr>
-            </a:lvl9pPr>
-          </a:lstStyle>
+          <a:lstStyle/>
           <a:p>
             <a:pPr marL="342900" indent="-342900" algn="just">
+              <a:buFont typeface="Arial,Sans-Serif"/>
+              <a:buChar char="•"/>
+            </a:pPr>
+            <a:r>
+              <a:rPr lang="en-US" sz="2400" dirty="0">
+                <a:ea typeface="+mn-lt"/>
+                <a:cs typeface="+mn-lt"/>
+              </a:rPr>
+              <a:t>Code changes in the debugger won't persist upon page reload, so we'll be working in Visual Studio</a:t>
+            </a:r>
+          </a:p>
+        </p:txBody>
+      </p:sp>
+      <p:sp>
+        <p:nvSpPr>
+          <p:cNvPr id="7" name="TextBox 6">
+            <a:extLst>
+              <a:ext uri="{FF2B5EF4-FFF2-40B4-BE49-F238E27FC236}">
+                <a16:creationId xmlns:a16="http://schemas.microsoft.com/office/drawing/2014/main" id="{DD11F90E-CBD9-49B2-973F-F71F218380B3}"/>
+              </a:ext>
+            </a:extLst>
+          </p:cNvPr>
+          <p:cNvSpPr txBox="1"/>
+          <p:nvPr/>
+        </p:nvSpPr>
+        <p:spPr>
+          <a:xfrm>
+            <a:off x="428624" y="4373095"/>
+            <a:ext cx="8014447" cy="461665"/>
+          </a:xfrm>
+          <a:prstGeom prst="rect">
+            <a:avLst/>
+          </a:prstGeom>
+          <a:noFill/>
+        </p:spPr>
+        <p:txBody>
+          <a:bodyPr rot="0" spcFirstLastPara="0" vertOverflow="overflow" horzOverflow="overflow" vert="horz" wrap="square" lIns="91440" tIns="45720" rIns="91440" bIns="45720" numCol="1" spcCol="0" rtlCol="0" fromWordArt="0" anchor="t" anchorCtr="0" forceAA="0" compatLnSpc="1">
+            <a:prstTxWarp prst="textNoShape">
+              <a:avLst/>
+            </a:prstTxWarp>
+            <a:spAutoFit/>
+          </a:bodyPr>
+          <a:lstStyle/>
+          <a:p>
+            <a:pPr marL="285750" indent="-285750">
               <a:buFont typeface="Arial"/>
               <a:buChar char="•"/>
             </a:pPr>
             <a:r>
-              <a:rPr lang="en-US" sz="2000" dirty="0"/>
-              <a:t>You can step line by line using the F10 key or continue running by pressing F8</a:t>
-            </a:r>
-            <a:endParaRPr lang="en-US"/>
-          </a:p>
-          <a:p>
-            <a:pPr marL="342900" indent="-342900" algn="just">
+              <a:rPr lang="en-US" sz="2400" b="1" dirty="0"/>
+              <a:t>Try the exercises in the_basics.js now</a:t>
+            </a:r>
+          </a:p>
+        </p:txBody>
+      </p:sp>
+      <p:sp>
+        <p:nvSpPr>
+          <p:cNvPr id="5" name="TextBox 4">
+            <a:extLst>
+              <a:ext uri="{FF2B5EF4-FFF2-40B4-BE49-F238E27FC236}">
+                <a16:creationId xmlns:a16="http://schemas.microsoft.com/office/drawing/2014/main" id="{B2432976-82BB-437F-B119-134DD09CB02D}"/>
+              </a:ext>
+            </a:extLst>
+          </p:cNvPr>
+          <p:cNvSpPr txBox="1"/>
+          <p:nvPr/>
+        </p:nvSpPr>
+        <p:spPr>
+          <a:xfrm>
+            <a:off x="430306" y="2608729"/>
+            <a:ext cx="8462682" cy="1200329"/>
+          </a:xfrm>
+          <a:prstGeom prst="rect">
+            <a:avLst/>
+          </a:prstGeom>
+          <a:noFill/>
+        </p:spPr>
+        <p:txBody>
+          <a:bodyPr rot="0" spcFirstLastPara="0" vertOverflow="overflow" horzOverflow="overflow" vert="horz" wrap="square" lIns="91440" tIns="45720" rIns="91440" bIns="45720" numCol="1" spcCol="0" rtlCol="0" fromWordArt="0" anchor="t" anchorCtr="0" forceAA="0" compatLnSpc="1">
+            <a:prstTxWarp prst="textNoShape">
+              <a:avLst/>
+            </a:prstTxWarp>
+            <a:spAutoFit/>
+          </a:bodyPr>
+          <a:lstStyle/>
+          <a:p>
+            <a:pPr marL="285750" indent="-285750">
               <a:buFont typeface="Arial"/>
               <a:buChar char="•"/>
             </a:pPr>
-            <a:endParaRPr lang="en-US" sz="2000" dirty="0"/>
-          </a:p>
-          <a:p>
-            <a:pPr marL="342900" indent="-342900" algn="just">
+            <a:r>
+              <a:rPr lang="en-US" sz="2400" dirty="0"/>
+              <a:t>Remember to save your changes in Visual Studio, then reload the HTML in Chrome (hit F5) to see them applied </a:t>
+            </a:r>
+            <a:endParaRPr lang="en-US"/>
+          </a:p>
+        </p:txBody>
+      </p:sp>
+      <p:sp>
+        <p:nvSpPr>
+          <p:cNvPr id="9" name="TextBox 8">
+            <a:extLst>
+              <a:ext uri="{FF2B5EF4-FFF2-40B4-BE49-F238E27FC236}">
+                <a16:creationId xmlns:a16="http://schemas.microsoft.com/office/drawing/2014/main" id="{3961B07A-D810-4BDD-AB40-D462755973AB}"/>
+              </a:ext>
+            </a:extLst>
+          </p:cNvPr>
+          <p:cNvSpPr txBox="1"/>
+          <p:nvPr/>
+        </p:nvSpPr>
+        <p:spPr>
+          <a:xfrm>
+            <a:off x="428625" y="5421966"/>
+            <a:ext cx="8014447" cy="830997"/>
+          </a:xfrm>
+          <a:prstGeom prst="rect">
+            <a:avLst/>
+          </a:prstGeom>
+          <a:noFill/>
+        </p:spPr>
+        <p:txBody>
+          <a:bodyPr rot="0" spcFirstLastPara="0" vertOverflow="overflow" horzOverflow="overflow" vert="horz" wrap="square" lIns="91440" tIns="45720" rIns="91440" bIns="45720" numCol="1" spcCol="0" rtlCol="0" fromWordArt="0" anchor="t" anchorCtr="0" forceAA="0" compatLnSpc="1">
+            <a:prstTxWarp prst="textNoShape">
+              <a:avLst/>
+            </a:prstTxWarp>
+            <a:spAutoFit/>
+          </a:bodyPr>
+          <a:lstStyle/>
+          <a:p>
+            <a:pPr marL="285750" indent="-285750">
               <a:buFont typeface="Arial"/>
               <a:buChar char="•"/>
             </a:pPr>
             <a:r>
-              <a:rPr lang="en-US" sz="2000" dirty="0"/>
-              <a:t>There are also button controls in the top right of the debugger. Hover the mouse over them for details</a:t>
-            </a:r>
-          </a:p>
-          <a:p>
-            <a:pPr algn="just"/>
-            <a:endParaRPr lang="en-US" sz="2000" dirty="0"/>
-          </a:p>
-          <a:p>
-            <a:pPr marL="342900" indent="-342900" algn="just">
-              <a:buFont typeface="Arial"/>
-              <a:buChar char="•"/>
-            </a:pPr>
-            <a:endParaRPr lang="en-US" sz="2000" dirty="0"/>
-          </a:p>
-          <a:p>
-            <a:pPr marL="342900" indent="-342900" algn="just">
-              <a:buFont typeface="Arial"/>
-              <a:buChar char="•"/>
-            </a:pPr>
-            <a:endParaRPr lang="en-US" sz="2000" dirty="0"/>
-          </a:p>
-          <a:p>
-            <a:pPr marL="342900" indent="-342900" algn="just">
-              <a:buFont typeface="Arial"/>
-              <a:buChar char="•"/>
-            </a:pPr>
-            <a:endParaRPr lang="en-US" sz="2000" dirty="0"/>
-          </a:p>
-          <a:p>
-            <a:pPr marL="342900" indent="-342900" algn="just">
-              <a:buFont typeface="Arial"/>
-              <a:buChar char="•"/>
-            </a:pPr>
-            <a:endParaRPr lang="en-US" sz="2000" dirty="0"/>
-          </a:p>
-          <a:p>
-            <a:pPr marL="342900" indent="-342900" algn="just">
-              <a:buFont typeface="Arial"/>
-              <a:buChar char="•"/>
-            </a:pPr>
-            <a:r>
-              <a:rPr lang="en-US" sz="2000" dirty="0"/>
-              <a:t>Try setting a watch on a variable:</a:t>
-            </a:r>
-          </a:p>
-          <a:p>
-            <a:pPr marL="342900" indent="-342900" algn="just">
-              <a:buFont typeface="Arial"/>
-              <a:buChar char="•"/>
-            </a:pPr>
-            <a:endParaRPr lang="en-US" sz="2000" dirty="0"/>
-          </a:p>
-          <a:p>
-            <a:pPr marL="342900" indent="-342900" algn="just">
-              <a:buFont typeface="Arial"/>
-              <a:buChar char="•"/>
-            </a:pPr>
-            <a:endParaRPr lang="en-US" sz="2000" dirty="0"/>
-          </a:p>
-          <a:p>
-            <a:pPr marL="342900" indent="-342900" algn="just">
-              <a:buFont typeface="Arial"/>
-              <a:buChar char="•"/>
-            </a:pPr>
-            <a:r>
-              <a:rPr lang="en-US" sz="2000" dirty="0"/>
-              <a:t>Then hit F8 to see the assignment</a:t>
-            </a:r>
-          </a:p>
-          <a:p>
-            <a:pPr algn="just"/>
-            <a:endParaRPr lang="en-US" sz="2000" dirty="0"/>
-          </a:p>
-        </p:txBody>
-      </p:sp>
-      <p:pic>
-        <p:nvPicPr>
-          <p:cNvPr id="10" name="Picture 10" descr="A screenshot of a computer screen&#10;&#10;Description generated with very high confidence">
-            <a:extLst>
-              <a:ext uri="{FF2B5EF4-FFF2-40B4-BE49-F238E27FC236}">
-                <a16:creationId xmlns:a16="http://schemas.microsoft.com/office/drawing/2014/main" id="{B68483D3-B19B-49D7-A772-A20A5B04EFCB}"/>
-              </a:ext>
-            </a:extLst>
-          </p:cNvPr>
-          <p:cNvPicPr>
-            <a:picLocks noChangeAspect="1"/>
-          </p:cNvPicPr>
-          <p:nvPr/>
-        </p:nvPicPr>
-        <p:blipFill>
-          <a:blip r:embed="rId2"/>
-          <a:stretch>
-            <a:fillRect/>
-          </a:stretch>
-        </p:blipFill>
-        <p:spPr>
-          <a:xfrm>
-            <a:off x="5720884" y="2779540"/>
-            <a:ext cx="3273158" cy="4074778"/>
-          </a:xfrm>
-          <a:prstGeom prst="rect">
-            <a:avLst/>
-          </a:prstGeom>
-        </p:spPr>
-      </p:pic>
+              <a:rPr lang="en-US" sz="2400" dirty="0"/>
+              <a:t>There are solutions in the_basics_solution.js, but try the problems on your own first</a:t>
+            </a:r>
+          </a:p>
+        </p:txBody>
+      </p:sp>
     </p:spTree>
     <p:extLst>
       <p:ext uri="{BB962C8B-B14F-4D97-AF65-F5344CB8AC3E}">
-        <p14:creationId xmlns:p14="http://schemas.microsoft.com/office/powerpoint/2010/main" val="3996183693"/>
+        <p14:creationId xmlns:p14="http://schemas.microsoft.com/office/powerpoint/2010/main" val="3774311452"/>
       </p:ext>
     </p:extLst>
   </p:cSld>
   <p:clrMapOvr>
     <a:masterClrMapping/>
   </p:clrMapOvr>
+  <p:timing>
+    <p:tnLst>
+      <p:par>
+        <p:cTn id="1" dur="indefinite" restart="never" nodeType="tmRoot">
+          <p:childTnLst>
+            <p:seq concurrent="1" nextAc="seek">
+              <p:cTn id="2" dur="indefinite" nodeType="mainSeq">
+                <p:childTnLst>
+                  <p:par>
+                    <p:cTn id="3" fill="hold">
+                      <p:stCondLst>
+                        <p:cond delay="indefinite"/>
+                      </p:stCondLst>
+                      <p:childTnLst>
+                        <p:par>
+                          <p:cTn id="4" fill="hold">
+                            <p:stCondLst>
+                              <p:cond delay="0"/>
+                            </p:stCondLst>
+                            <p:childTnLst>
+                              <p:par>
+                                <p:cTn id="5" presetID="10" presetClass="entr" presetSubtype="0" fill="hold" grpId="0" nodeType="clickEffect">
+                                  <p:stCondLst>
+                                    <p:cond delay="0"/>
+                                  </p:stCondLst>
+                                  <p:childTnLst>
+                                    <p:set>
+                                      <p:cBhvr>
+                                        <p:cTn id="6" dur="1" fill="hold">
+                                          <p:stCondLst>
+                                            <p:cond delay="0"/>
+                                          </p:stCondLst>
+                                        </p:cTn>
+                                        <p:tgtEl>
+                                          <p:spTgt spid="5"/>
+                                        </p:tgtEl>
+                                        <p:attrNameLst>
+                                          <p:attrName>style.visibility</p:attrName>
+                                        </p:attrNameLst>
+                                      </p:cBhvr>
+                                      <p:to>
+                                        <p:strVal val="visible"/>
+                                      </p:to>
+                                    </p:set>
+                                    <p:animEffect transition="in" filter="fade">
+                                      <p:cBhvr>
+                                        <p:cTn id="7" dur="500"/>
+                                        <p:tgtEl>
+                                          <p:spTgt spid="5"/>
+                                        </p:tgtEl>
+                                      </p:cBhvr>
+                                    </p:animEffect>
+                                  </p:childTnLst>
+                                </p:cTn>
+                              </p:par>
+                            </p:childTnLst>
+                          </p:cTn>
+                        </p:par>
+                      </p:childTnLst>
+                    </p:cTn>
+                  </p:par>
+                  <p:par>
+                    <p:cTn id="8" fill="hold">
+                      <p:stCondLst>
+                        <p:cond delay="indefinite"/>
+                      </p:stCondLst>
+                      <p:childTnLst>
+                        <p:par>
+                          <p:cTn id="9" fill="hold">
+                            <p:stCondLst>
+                              <p:cond delay="0"/>
+                            </p:stCondLst>
+                            <p:childTnLst>
+                              <p:par>
+                                <p:cTn id="10" presetID="10" presetClass="entr" presetSubtype="0" fill="hold" grpId="0" nodeType="clickEffect">
+                                  <p:stCondLst>
+                                    <p:cond delay="0"/>
+                                  </p:stCondLst>
+                                  <p:childTnLst>
+                                    <p:set>
+                                      <p:cBhvr>
+                                        <p:cTn id="11" dur="1" fill="hold">
+                                          <p:stCondLst>
+                                            <p:cond delay="0"/>
+                                          </p:stCondLst>
+                                        </p:cTn>
+                                        <p:tgtEl>
+                                          <p:spTgt spid="7"/>
+                                        </p:tgtEl>
+                                        <p:attrNameLst>
+                                          <p:attrName>style.visibility</p:attrName>
+                                        </p:attrNameLst>
+                                      </p:cBhvr>
+                                      <p:to>
+                                        <p:strVal val="visible"/>
+                                      </p:to>
+                                    </p:set>
+                                    <p:animEffect transition="in" filter="fade">
+                                      <p:cBhvr>
+                                        <p:cTn id="12" dur="500"/>
+                                        <p:tgtEl>
+                                          <p:spTgt spid="7"/>
+                                        </p:tgtEl>
+                                      </p:cBhvr>
+                                    </p:animEffect>
+                                  </p:childTnLst>
+                                </p:cTn>
+                              </p:par>
+                            </p:childTnLst>
+                          </p:cTn>
+                        </p:par>
+                      </p:childTnLst>
+                    </p:cTn>
+                  </p:par>
+                  <p:par>
+                    <p:cTn id="13" fill="hold">
+                      <p:stCondLst>
+                        <p:cond delay="indefinite"/>
+                      </p:stCondLst>
+                      <p:childTnLst>
+                        <p:par>
+                          <p:cTn id="14" fill="hold">
+                            <p:stCondLst>
+                              <p:cond delay="0"/>
+                            </p:stCondLst>
+                            <p:childTnLst>
+                              <p:par>
+                                <p:cTn id="15" presetID="10" presetClass="entr" presetSubtype="0" fill="hold" grpId="0" nodeType="clickEffect">
+                                  <p:stCondLst>
+                                    <p:cond delay="0"/>
+                                  </p:stCondLst>
+                                  <p:childTnLst>
+                                    <p:set>
+                                      <p:cBhvr>
+                                        <p:cTn id="16" dur="1" fill="hold">
+                                          <p:stCondLst>
+                                            <p:cond delay="0"/>
+                                          </p:stCondLst>
+                                        </p:cTn>
+                                        <p:tgtEl>
+                                          <p:spTgt spid="9"/>
+                                        </p:tgtEl>
+                                        <p:attrNameLst>
+                                          <p:attrName>style.visibility</p:attrName>
+                                        </p:attrNameLst>
+                                      </p:cBhvr>
+                                      <p:to>
+                                        <p:strVal val="visible"/>
+                                      </p:to>
+                                    </p:set>
+                                    <p:animEffect transition="in" filter="fade">
+                                      <p:cBhvr>
+                                        <p:cTn id="17" dur="500"/>
+                                        <p:tgtEl>
+                                          <p:spTgt spid="9"/>
+                                        </p:tgtEl>
+                                      </p:cBhvr>
+                                    </p:animEffect>
+                                  </p:childTnLst>
+                                </p:cTn>
+                              </p:par>
+                            </p:childTnLst>
+                          </p:cTn>
+                        </p:par>
+                      </p:childTnLst>
+                    </p:cTn>
+                  </p:par>
+                </p:childTnLst>
+              </p:cTn>
+              <p:prevCondLst>
+                <p:cond evt="onPrev" delay="0">
+                  <p:tgtEl>
+                    <p:sldTgt/>
+                  </p:tgtEl>
+                </p:cond>
+              </p:prevCondLst>
+              <p:nextCondLst>
+                <p:cond evt="onNext" delay="0">
+                  <p:tgtEl>
+                    <p:sldTgt/>
+                  </p:tgtEl>
+                </p:cond>
+              </p:nextCondLst>
+            </p:seq>
+          </p:childTnLst>
+        </p:cTn>
+      </p:par>
+    </p:tnLst>
+    <p:bldLst>
+      <p:bldP spid="7" grpId="0"/>
+      <p:bldP spid="5" grpId="0"/>
+      <p:bldP spid="9" grpId="0"/>
+    </p:bldLst>
+  </p:timing>
 </p:sld>
 </file>
 
@@ -14879,10 +14989,10 @@
           <a:p>
             <a:pPr algn="ctr"/>
             <a:r>
-              <a:rPr lang="en-US" sz="3200" b="1" dirty="0"/>
+              <a:rPr lang="en-US" sz="3200" b="1"/>
               <a:t>Strengths</a:t>
             </a:r>
-            <a:endParaRPr lang="en-US" sz="3200" b="1" dirty="0">
+            <a:endParaRPr lang="en-US" sz="3200" b="1">
               <a:effectLst>
                 <a:glow rad="38100">
                   <a:prstClr val="black">
@@ -14937,20 +15047,20 @@
               <a:buChar char="•"/>
             </a:pPr>
             <a:r>
-              <a:rPr lang="en-US" sz="2800" b="1" dirty="0">
+              <a:rPr lang="en-US" sz="2800" b="1">
                 <a:ea typeface="+mn-lt"/>
                 <a:cs typeface="+mn-lt"/>
               </a:rPr>
               <a:t>Simplicity</a:t>
             </a:r>
             <a:r>
-              <a:rPr lang="en-US" sz="2800" dirty="0">
+              <a:rPr lang="en-US" sz="2800">
                 <a:ea typeface="+mn-lt"/>
                 <a:cs typeface="+mn-lt"/>
               </a:rPr>
               <a:t>. JavaScript is relatively simple to learn and implement</a:t>
             </a:r>
-            <a:endParaRPr lang="en-US" sz="2800" dirty="0"/>
+            <a:endParaRPr lang="en-US" sz="2800"/>
           </a:p>
         </p:txBody>
       </p:sp>
@@ -14990,20 +15100,20 @@
               <a:buChar char="•"/>
             </a:pPr>
             <a:r>
-              <a:rPr lang="en-US" sz="2800" b="1" dirty="0">
+              <a:rPr lang="en-US" sz="2800" b="1">
                 <a:ea typeface="+mn-lt"/>
                 <a:cs typeface="+mn-lt"/>
               </a:rPr>
               <a:t>Runs on anything.</a:t>
             </a:r>
             <a:r>
-              <a:rPr lang="en-US" sz="2800" dirty="0">
+              <a:rPr lang="en-US" sz="2800">
                 <a:ea typeface="+mn-lt"/>
                 <a:cs typeface="+mn-lt"/>
               </a:rPr>
               <a:t> Modern JavaScript engines are available for virtually every platform</a:t>
             </a:r>
-            <a:endParaRPr lang="en-US" sz="2800" dirty="0"/>
+            <a:endParaRPr lang="en-US" sz="2800"/>
           </a:p>
         </p:txBody>
       </p:sp>
@@ -15217,24 +15327,24 @@
               <a:buChar char="•"/>
             </a:pPr>
             <a:r>
-              <a:rPr lang="en-US" sz="2800" b="1" dirty="0">
+              <a:rPr lang="en-US" sz="2800" b="1">
                 <a:ea typeface="+mn-lt"/>
                 <a:cs typeface="+mn-lt"/>
               </a:rPr>
               <a:t>Versatility. </a:t>
             </a:r>
             <a:r>
-              <a:rPr lang="en-US" sz="2800" dirty="0">
+              <a:rPr lang="en-US" sz="2800">
                 <a:ea typeface="+mn-lt"/>
                 <a:cs typeface="+mn-lt"/>
               </a:rPr>
               <a:t>It's</a:t>
             </a:r>
             <a:r>
-              <a:rPr lang="en-US" sz="2800" dirty="0"/>
+              <a:rPr lang="en-US" sz="2800"/>
               <a:t> possible to develop an entire app from front to back using only JavaScript</a:t>
             </a:r>
-            <a:endParaRPr lang="en-US" dirty="0"/>
+            <a:endParaRPr lang="en-US"/>
           </a:p>
         </p:txBody>
       </p:sp>
@@ -15480,7 +15590,7 @@
         </p:nvSpPr>
         <p:spPr>
           <a:xfrm>
-            <a:off x="861228" y="121024"/>
+            <a:off x="1039857" y="160759"/>
             <a:ext cx="7055380" cy="710249"/>
           </a:xfrm>
         </p:spPr>
@@ -15492,10 +15602,10 @@
           <a:p>
             <a:pPr algn="ctr"/>
             <a:r>
-              <a:rPr lang="en-US" sz="3200" dirty="0"/>
-              <a:t>Example 01: The Colors</a:t>
-            </a:r>
-            <a:endParaRPr lang="en-US" sz="3200" dirty="0">
+              <a:rPr lang="en-US" sz="3200"/>
+              <a:t>Example: The Colors</a:t>
+            </a:r>
+            <a:endParaRPr lang="en-US" sz="3200">
               <a:effectLst>
                 <a:glow rad="38100">
                   <a:prstClr val="black">
@@ -15528,8 +15638,8 @@
         </p:nvSpPr>
         <p:spPr>
           <a:xfrm>
-            <a:off x="466805" y="1104577"/>
-            <a:ext cx="7849879" cy="400110"/>
+            <a:off x="605393" y="868126"/>
+            <a:ext cx="7849879" cy="707886"/>
           </a:xfrm>
           <a:prstGeom prst="rect">
             <a:avLst/>
@@ -15545,23 +15655,58 @@
           </a:bodyPr>
           <a:lstStyle/>
           <a:p>
-            <a:pPr marL="342900" indent="-342900" algn="just">
-              <a:buFont typeface="Arial"/>
-              <a:buChar char="•"/>
-            </a:pPr>
+            <a:pPr algn="ctr"/>
             <a:r>
               <a:rPr lang="en-US" sz="2000" dirty="0"/>
-              <a:t>The debugger is an invaluable tool</a:t>
-            </a:r>
-          </a:p>
-        </p:txBody>
-      </p:sp>
+              <a:t>Open colorful_events.html in Chrome.</a:t>
+            </a:r>
+          </a:p>
+          <a:p>
+            <a:pPr algn="ctr"/>
+            <a:r>
+              <a:rPr lang="en-US" sz="2000" dirty="0"/>
+              <a:t>Some features of the page don't work.</a:t>
+            </a:r>
+            <a:endParaRPr lang="en-US" sz="2000" b="1" dirty="0"/>
+          </a:p>
+        </p:txBody>
+      </p:sp>
+      <p:pic>
+        <p:nvPicPr>
+          <p:cNvPr id="7" name="Picture 7" descr="A screenshot of a cell phone&#10;&#10;Description generated with very high confidence">
+            <a:extLst>
+              <a:ext uri="{FF2B5EF4-FFF2-40B4-BE49-F238E27FC236}">
+                <a16:creationId xmlns:a16="http://schemas.microsoft.com/office/drawing/2014/main" id="{263072F9-B7FA-45AC-B8B3-A56DB7A5D297}"/>
+              </a:ext>
+            </a:extLst>
+          </p:cNvPr>
+          <p:cNvPicPr>
+            <a:picLocks noChangeAspect="1"/>
+          </p:cNvPicPr>
+          <p:nvPr/>
+        </p:nvPicPr>
+        <p:blipFill>
+          <a:blip r:embed="rId2"/>
+          <a:stretch>
+            <a:fillRect/>
+          </a:stretch>
+        </p:blipFill>
+        <p:spPr>
+          <a:xfrm>
+            <a:off x="2120915" y="1627457"/>
+            <a:ext cx="5167412" cy="4350961"/>
+          </a:xfrm>
+          <a:prstGeom prst="rect">
+            <a:avLst/>
+          </a:prstGeom>
+        </p:spPr>
+      </p:pic>
       <p:sp>
         <p:nvSpPr>
           <p:cNvPr id="3" name="TextBox 2">
             <a:extLst>
               <a:ext uri="{FF2B5EF4-FFF2-40B4-BE49-F238E27FC236}">
-                <a16:creationId xmlns:a16="http://schemas.microsoft.com/office/drawing/2014/main" id="{E61DBC47-78EB-4073-8B62-19078A06C703}"/>
+                <a16:creationId xmlns:a16="http://schemas.microsoft.com/office/drawing/2014/main" id="{0C756E51-9D41-4CDE-B267-154C1ACE9901}"/>
               </a:ext>
             </a:extLst>
           </p:cNvPr>
@@ -15570,8 +15715,8 @@
         </p:nvSpPr>
         <p:spPr>
           <a:xfrm>
-            <a:off x="430306" y="1981200"/>
-            <a:ext cx="8462682" cy="646331"/>
+            <a:off x="663389" y="6248400"/>
+            <a:ext cx="7790328" cy="800219"/>
           </a:xfrm>
           <a:prstGeom prst="rect">
             <a:avLst/>
@@ -15587,415 +15732,35 @@
           </a:bodyPr>
           <a:lstStyle/>
           <a:p>
-            <a:pPr marL="342900" indent="-342900" algn="just">
-              <a:buFont typeface="Arial,Sans-Serif"/>
-              <a:buChar char="•"/>
-            </a:pPr>
-            <a:r>
-              <a:rPr lang="en-US" dirty="0">
+            <a:pPr algn="ctr"/>
+            <a:r>
+              <a:rPr lang="en-US" sz="2800" b="1" dirty="0">
                 <a:ea typeface="+mn-lt"/>
                 <a:cs typeface="+mn-lt"/>
               </a:rPr>
-              <a:t>However, changes made to the files in the editor don't persist through page reload, so we'll be working in Visual Studio</a:t>
-            </a:r>
-          </a:p>
-        </p:txBody>
-      </p:sp>
-      <p:sp>
-        <p:nvSpPr>
-          <p:cNvPr id="5" name="TextBox 4">
-            <a:extLst>
-              <a:ext uri="{FF2B5EF4-FFF2-40B4-BE49-F238E27FC236}">
-                <a16:creationId xmlns:a16="http://schemas.microsoft.com/office/drawing/2014/main" id="{351ED184-45DA-433C-87A6-EE6B50B864B3}"/>
-              </a:ext>
-            </a:extLst>
-          </p:cNvPr>
-          <p:cNvSpPr txBox="1"/>
-          <p:nvPr/>
-        </p:nvSpPr>
-        <p:spPr>
-          <a:xfrm>
-            <a:off x="429745" y="3155015"/>
-            <a:ext cx="8462682" cy="369332"/>
-          </a:xfrm>
-          <a:prstGeom prst="rect">
-            <a:avLst/>
-          </a:prstGeom>
-          <a:noFill/>
-        </p:spPr>
-        <p:txBody>
-          <a:bodyPr rot="0" spcFirstLastPara="0" vertOverflow="overflow" horzOverflow="overflow" vert="horz" wrap="square" lIns="91440" tIns="45720" rIns="91440" bIns="45720" numCol="1" spcCol="0" rtlCol="0" fromWordArt="0" anchor="t" anchorCtr="0" forceAA="0" compatLnSpc="1">
-            <a:prstTxWarp prst="textNoShape">
-              <a:avLst/>
-            </a:prstTxWarp>
-            <a:spAutoFit/>
-          </a:bodyPr>
-          <a:lstStyle/>
-          <a:p>
-            <a:pPr marL="342900" indent="-342900" algn="just">
-              <a:buFont typeface="Arial,Sans-Serif"/>
-              <a:buChar char="•"/>
-            </a:pPr>
-            <a:r>
-              <a:rPr lang="en-US" dirty="0"/>
-              <a:t>There are 5 problems for you to solve in example01.js</a:t>
-            </a:r>
-            <a:endParaRPr lang="en-US" dirty="0">
+              <a:t>Let's fix this page by editing the_colors.js</a:t>
+            </a:r>
+            <a:endParaRPr lang="en-US" sz="2800">
               <a:ea typeface="+mn-lt"/>
               <a:cs typeface="+mn-lt"/>
             </a:endParaRPr>
           </a:p>
-        </p:txBody>
-      </p:sp>
-      <p:sp>
-        <p:nvSpPr>
-          <p:cNvPr id="6" name="TextBox 5">
-            <a:extLst>
-              <a:ext uri="{FF2B5EF4-FFF2-40B4-BE49-F238E27FC236}">
-                <a16:creationId xmlns:a16="http://schemas.microsoft.com/office/drawing/2014/main" id="{F533ABD9-436F-43A2-9947-A40D137FA589}"/>
-              </a:ext>
-            </a:extLst>
-          </p:cNvPr>
-          <p:cNvSpPr txBox="1"/>
-          <p:nvPr/>
-        </p:nvSpPr>
-        <p:spPr>
-          <a:xfrm>
-            <a:off x="429186" y="4104715"/>
-            <a:ext cx="8220634" cy="646331"/>
-          </a:xfrm>
-          <a:prstGeom prst="rect">
-            <a:avLst/>
-          </a:prstGeom>
-          <a:noFill/>
-        </p:spPr>
-        <p:txBody>
-          <a:bodyPr rot="0" spcFirstLastPara="0" vertOverflow="overflow" horzOverflow="overflow" vert="horz" wrap="square" lIns="91440" tIns="45720" rIns="91440" bIns="45720" numCol="1" spcCol="0" rtlCol="0" fromWordArt="0" anchor="t" anchorCtr="0" forceAA="0" compatLnSpc="1">
-            <a:prstTxWarp prst="textNoShape">
-              <a:avLst/>
-            </a:prstTxWarp>
-            <a:spAutoFit/>
-          </a:bodyPr>
-          <a:lstStyle/>
-          <a:p>
-            <a:pPr algn="just">
-              <a:buChar char="•"/>
-            </a:pPr>
-            <a:r>
-              <a:rPr lang="en-US" dirty="0">
-                <a:solidFill>
-                  <a:srgbClr val="FFFFFF"/>
-                </a:solidFill>
-                <a:latin typeface="Century Gothic"/>
-                <a:ea typeface="Arial"/>
-                <a:cs typeface="Arial"/>
-              </a:rPr>
-              <a:t> Remember to save your changes in Visual Studio, then reload the HTML in Chrome (hit F5) to see them applied​</a:t>
-            </a:r>
-          </a:p>
-        </p:txBody>
-      </p:sp>
-      <p:sp>
-        <p:nvSpPr>
-          <p:cNvPr id="7" name="TextBox 6">
-            <a:extLst>
-              <a:ext uri="{FF2B5EF4-FFF2-40B4-BE49-F238E27FC236}">
-                <a16:creationId xmlns:a16="http://schemas.microsoft.com/office/drawing/2014/main" id="{DD11F90E-CBD9-49B2-973F-F71F218380B3}"/>
-              </a:ext>
-            </a:extLst>
-          </p:cNvPr>
-          <p:cNvSpPr txBox="1"/>
-          <p:nvPr/>
-        </p:nvSpPr>
-        <p:spPr>
-          <a:xfrm>
-            <a:off x="383800" y="5421966"/>
-            <a:ext cx="8014447" cy="646331"/>
-          </a:xfrm>
-          <a:prstGeom prst="rect">
-            <a:avLst/>
-          </a:prstGeom>
-          <a:noFill/>
-        </p:spPr>
-        <p:txBody>
-          <a:bodyPr rot="0" spcFirstLastPara="0" vertOverflow="overflow" horzOverflow="overflow" vert="horz" wrap="square" lIns="91440" tIns="45720" rIns="91440" bIns="45720" numCol="1" spcCol="0" rtlCol="0" fromWordArt="0" anchor="t" anchorCtr="0" forceAA="0" compatLnSpc="1">
-            <a:prstTxWarp prst="textNoShape">
-              <a:avLst/>
-            </a:prstTxWarp>
-            <a:spAutoFit/>
-          </a:bodyPr>
-          <a:lstStyle/>
-          <a:p>
-            <a:pPr marL="285750" indent="-285750">
-              <a:buFont typeface="Arial"/>
-              <a:buChar char="•"/>
-            </a:pPr>
-            <a:r>
-              <a:rPr lang="en-US" dirty="0"/>
-              <a:t>There are solutions in example01_solutions.js, but we encourage you to try the problems on your own first</a:t>
-            </a:r>
-            <a:endParaRPr lang="en-US"/>
+          <a:p>
+            <a:pPr algn="l"/>
+            <a:endParaRPr lang="en-US" dirty="0"/>
           </a:p>
         </p:txBody>
       </p:sp>
     </p:spTree>
     <p:extLst>
       <p:ext uri="{BB962C8B-B14F-4D97-AF65-F5344CB8AC3E}">
-        <p14:creationId xmlns:p14="http://schemas.microsoft.com/office/powerpoint/2010/main" val="3774311452"/>
+        <p14:creationId xmlns:p14="http://schemas.microsoft.com/office/powerpoint/2010/main" val="653725357"/>
       </p:ext>
     </p:extLst>
   </p:cSld>
   <p:clrMapOvr>
     <a:masterClrMapping/>
   </p:clrMapOvr>
-  <p:timing>
-    <p:tnLst>
-      <p:par>
-        <p:cTn id="1" dur="indefinite" restart="never" nodeType="tmRoot">
-          <p:childTnLst>
-            <p:seq concurrent="1" nextAc="seek">
-              <p:cTn id="2" dur="indefinite" nodeType="mainSeq">
-                <p:childTnLst>
-                  <p:par>
-                    <p:cTn id="3" fill="hold">
-                      <p:stCondLst>
-                        <p:cond delay="indefinite"/>
-                      </p:stCondLst>
-                      <p:childTnLst>
-                        <p:par>
-                          <p:cTn id="4" fill="hold">
-                            <p:stCondLst>
-                              <p:cond delay="0"/>
-                            </p:stCondLst>
-                            <p:childTnLst>
-                              <p:par>
-                                <p:cTn id="5" presetID="10" presetClass="entr" presetSubtype="0" fill="hold" grpId="0" nodeType="clickEffect">
-                                  <p:stCondLst>
-                                    <p:cond delay="0"/>
-                                  </p:stCondLst>
-                                  <p:childTnLst>
-                                    <p:set>
-                                      <p:cBhvr>
-                                        <p:cTn id="6" dur="1" fill="hold">
-                                          <p:stCondLst>
-                                            <p:cond delay="0"/>
-                                          </p:stCondLst>
-                                        </p:cTn>
-                                        <p:tgtEl>
-                                          <p:spTgt spid="3"/>
-                                        </p:tgtEl>
-                                        <p:attrNameLst>
-                                          <p:attrName>style.visibility</p:attrName>
-                                        </p:attrNameLst>
-                                      </p:cBhvr>
-                                      <p:to>
-                                        <p:strVal val="visible"/>
-                                      </p:to>
-                                    </p:set>
-                                    <p:animEffect transition="in" filter="fade">
-                                      <p:cBhvr>
-                                        <p:cTn id="7" dur="500"/>
-                                        <p:tgtEl>
-                                          <p:spTgt spid="3"/>
-                                        </p:tgtEl>
-                                      </p:cBhvr>
-                                    </p:animEffect>
-                                  </p:childTnLst>
-                                </p:cTn>
-                              </p:par>
-                            </p:childTnLst>
-                          </p:cTn>
-                        </p:par>
-                      </p:childTnLst>
-                    </p:cTn>
-                  </p:par>
-                  <p:par>
-                    <p:cTn id="8" fill="hold">
-                      <p:stCondLst>
-                        <p:cond delay="indefinite"/>
-                      </p:stCondLst>
-                      <p:childTnLst>
-                        <p:par>
-                          <p:cTn id="9" fill="hold">
-                            <p:stCondLst>
-                              <p:cond delay="0"/>
-                            </p:stCondLst>
-                            <p:childTnLst>
-                              <p:par>
-                                <p:cTn id="10" presetID="10" presetClass="entr" presetSubtype="0" fill="hold" grpId="0" nodeType="clickEffect">
-                                  <p:stCondLst>
-                                    <p:cond delay="0"/>
-                                  </p:stCondLst>
-                                  <p:childTnLst>
-                                    <p:set>
-                                      <p:cBhvr>
-                                        <p:cTn id="11" dur="1" fill="hold">
-                                          <p:stCondLst>
-                                            <p:cond delay="0"/>
-                                          </p:stCondLst>
-                                        </p:cTn>
-                                        <p:tgtEl>
-                                          <p:spTgt spid="5"/>
-                                        </p:tgtEl>
-                                        <p:attrNameLst>
-                                          <p:attrName>style.visibility</p:attrName>
-                                        </p:attrNameLst>
-                                      </p:cBhvr>
-                                      <p:to>
-                                        <p:strVal val="visible"/>
-                                      </p:to>
-                                    </p:set>
-                                    <p:animEffect transition="in" filter="fade">
-                                      <p:cBhvr>
-                                        <p:cTn id="12" dur="500"/>
-                                        <p:tgtEl>
-                                          <p:spTgt spid="5"/>
-                                        </p:tgtEl>
-                                      </p:cBhvr>
-                                    </p:animEffect>
-                                  </p:childTnLst>
-                                </p:cTn>
-                              </p:par>
-                            </p:childTnLst>
-                          </p:cTn>
-                        </p:par>
-                      </p:childTnLst>
-                    </p:cTn>
-                  </p:par>
-                  <p:par>
-                    <p:cTn id="13" fill="hold">
-                      <p:stCondLst>
-                        <p:cond delay="indefinite"/>
-                      </p:stCondLst>
-                      <p:childTnLst>
-                        <p:par>
-                          <p:cTn id="14" fill="hold">
-                            <p:stCondLst>
-                              <p:cond delay="0"/>
-                            </p:stCondLst>
-                            <p:childTnLst>
-                              <p:par>
-                                <p:cTn id="15" presetID="10" presetClass="entr" presetSubtype="0" fill="hold" grpId="0" nodeType="clickEffect">
-                                  <p:stCondLst>
-                                    <p:cond delay="0"/>
-                                  </p:stCondLst>
-                                  <p:childTnLst>
-                                    <p:set>
-                                      <p:cBhvr>
-                                        <p:cTn id="16" dur="1" fill="hold">
-                                          <p:stCondLst>
-                                            <p:cond delay="0"/>
-                                          </p:stCondLst>
-                                        </p:cTn>
-                                        <p:tgtEl>
-                                          <p:spTgt spid="6"/>
-                                        </p:tgtEl>
-                                        <p:attrNameLst>
-                                          <p:attrName>style.visibility</p:attrName>
-                                        </p:attrNameLst>
-                                      </p:cBhvr>
-                                      <p:to>
-                                        <p:strVal val="visible"/>
-                                      </p:to>
-                                    </p:set>
-                                    <p:animEffect transition="in" filter="fade">
-                                      <p:cBhvr>
-                                        <p:cTn id="17" dur="500"/>
-                                        <p:tgtEl>
-                                          <p:spTgt spid="6"/>
-                                        </p:tgtEl>
-                                      </p:cBhvr>
-                                    </p:animEffect>
-                                  </p:childTnLst>
-                                </p:cTn>
-                              </p:par>
-                            </p:childTnLst>
-                          </p:cTn>
-                        </p:par>
-                      </p:childTnLst>
-                    </p:cTn>
-                  </p:par>
-                  <p:par>
-                    <p:cTn id="18" fill="hold">
-                      <p:stCondLst>
-                        <p:cond delay="indefinite"/>
-                      </p:stCondLst>
-                      <p:childTnLst>
-                        <p:par>
-                          <p:cTn id="19" fill="hold">
-                            <p:stCondLst>
-                              <p:cond delay="0"/>
-                            </p:stCondLst>
-                            <p:childTnLst>
-                              <p:par>
-                                <p:cTn id="20" presetID="10" presetClass="entr" presetSubtype="0" fill="hold" grpId="0" nodeType="clickEffect">
-                                  <p:stCondLst>
-                                    <p:cond delay="0"/>
-                                  </p:stCondLst>
-                                  <p:childTnLst>
-                                    <p:set>
-                                      <p:cBhvr>
-                                        <p:cTn id="21" dur="1" fill="hold">
-                                          <p:stCondLst>
-                                            <p:cond delay="0"/>
-                                          </p:stCondLst>
-                                        </p:cTn>
-                                        <p:tgtEl>
-                                          <p:spTgt spid="7"/>
-                                        </p:tgtEl>
-                                        <p:attrNameLst>
-                                          <p:attrName>style.visibility</p:attrName>
-                                        </p:attrNameLst>
-                                      </p:cBhvr>
-                                      <p:to>
-                                        <p:strVal val="visible"/>
-                                      </p:to>
-                                    </p:set>
-                                    <p:animEffect transition="in" filter="fade">
-                                      <p:cBhvr>
-                                        <p:cTn id="22" dur="500"/>
-                                        <p:tgtEl>
-                                          <p:spTgt spid="7"/>
-                                        </p:tgtEl>
-                                      </p:cBhvr>
-                                    </p:animEffect>
-                                  </p:childTnLst>
-                                </p:cTn>
-                              </p:par>
-                            </p:childTnLst>
-                          </p:cTn>
-                        </p:par>
-                      </p:childTnLst>
-                    </p:cTn>
-                  </p:par>
-                </p:childTnLst>
-              </p:cTn>
-              <p:prevCondLst>
-                <p:cond evt="onPrev" delay="0">
-                  <p:tgtEl>
-                    <p:sldTgt/>
-                  </p:tgtEl>
-                </p:cond>
-              </p:prevCondLst>
-              <p:nextCondLst>
-                <p:cond evt="onNext" delay="0">
-                  <p:tgtEl>
-                    <p:sldTgt/>
-                  </p:tgtEl>
-                </p:cond>
-              </p:nextCondLst>
-            </p:seq>
-          </p:childTnLst>
-        </p:cTn>
-      </p:par>
-    </p:tnLst>
-    <p:bldLst>
-      <p:bldP spid="3" grpId="0"/>
-      <p:bldP spid="5" grpId="0"/>
-      <p:bldP spid="6" grpId="0"/>
-      <p:bldP spid="7" grpId="0"/>
-    </p:bldLst>
-  </p:timing>
 </p:sld>
 </file>
 
@@ -16046,10 +15811,10 @@
           <a:p>
             <a:pPr algn="ctr"/>
             <a:r>
-              <a:rPr lang="en-US" sz="3200" b="1" dirty="0"/>
+              <a:rPr lang="en-US" sz="3200" b="1"/>
               <a:t>Weaknesses</a:t>
             </a:r>
-            <a:endParaRPr lang="en-US" sz="3200" dirty="0"/>
+            <a:endParaRPr lang="en-US" sz="3200"/>
           </a:p>
         </p:txBody>
       </p:sp>
@@ -16089,20 +15854,20 @@
               <a:buChar char="•"/>
             </a:pPr>
             <a:r>
-              <a:rPr lang="en-US" sz="2800" b="1" dirty="0">
+              <a:rPr lang="en-US" sz="2800" b="1">
                 <a:ea typeface="+mn-lt"/>
                 <a:cs typeface="+mn-lt"/>
               </a:rPr>
               <a:t>Client-Side Security</a:t>
             </a:r>
             <a:r>
-              <a:rPr lang="en-US" sz="2800" dirty="0">
+              <a:rPr lang="en-US" sz="2800">
                 <a:ea typeface="+mn-lt"/>
                 <a:cs typeface="+mn-lt"/>
               </a:rPr>
               <a:t>. Because the code executes on the users’ computer, it can be exploited for malicious purposes. </a:t>
             </a:r>
-            <a:endParaRPr lang="en-US" dirty="0"/>
+            <a:endParaRPr lang="en-US"/>
           </a:p>
           <a:p>
             <a:pPr marL="742950" lvl="1" indent="-285750">
@@ -16110,7 +15875,7 @@
               <a:buChar char="•"/>
             </a:pPr>
             <a:r>
-              <a:rPr lang="en-US" sz="2800" dirty="0">
+              <a:rPr lang="en-US" sz="2800">
                 <a:ea typeface="+mn-lt"/>
                 <a:cs typeface="+mn-lt"/>
               </a:rPr>
@@ -16123,7 +15888,7 @@
               <a:buChar char="•"/>
             </a:pPr>
             <a:r>
-              <a:rPr lang="en-US" sz="2800" dirty="0"/>
+              <a:rPr lang="en-US" sz="2800"/>
               <a:t>Mitigated by browser sandboxing</a:t>
             </a:r>
           </a:p>
@@ -16212,11 +15977,11 @@
               <a:buChar char="•"/>
             </a:pPr>
             <a:r>
-              <a:rPr lang="en-US" sz="2800" b="1" dirty="0"/>
+              <a:rPr lang="en-US" sz="2800" b="1"/>
               <a:t>Speed. </a:t>
             </a:r>
             <a:r>
-              <a:rPr lang="en-US" sz="2800" dirty="0"/>
+              <a:rPr lang="en-US" sz="2800"/>
               <a:t>JavaScript is still slower than most compiled languages</a:t>
             </a:r>
           </a:p>
@@ -16460,7 +16225,7 @@
           <a:p>
             <a:pPr algn="ctr"/>
             <a:r>
-              <a:rPr lang="en-US" sz="3200" b="1" dirty="0"/>
+              <a:rPr lang="en-US" sz="3200" b="1"/>
               <a:t>Weirdness</a:t>
             </a:r>
             <a:endParaRPr lang="en-US"/>
@@ -16565,10 +16330,10 @@
           <a:lstStyle/>
           <a:p>
             <a:r>
-              <a:rPr lang="en-US" sz="2800" dirty="0"/>
+              <a:rPr lang="en-US" sz="2800"/>
               <a:t>Unintuitive behavior:</a:t>
             </a:r>
-            <a:endParaRPr lang="en-US" dirty="0"/>
+            <a:endParaRPr lang="en-US"/>
           </a:p>
         </p:txBody>
       </p:sp>
@@ -16715,10 +16480,10 @@
           <a:p>
             <a:pPr algn="ctr"/>
             <a:r>
-              <a:rPr lang="en-US" sz="3200" b="1" dirty="0"/>
+              <a:rPr lang="en-US" sz="3200" b="1"/>
               <a:t>MORE Weirdness</a:t>
             </a:r>
-            <a:endParaRPr lang="en-US" sz="3200" b="1" dirty="0">
+            <a:endParaRPr lang="en-US" sz="3200" b="1">
               <a:effectLst>
                 <a:glow rad="38100">
                   <a:prstClr val="black">
@@ -16860,10 +16625,10 @@
           <a:lstStyle/>
           <a:p>
             <a:r>
-              <a:rPr lang="en-US" b="1" dirty="0"/>
+              <a:rPr lang="en-US" b="1"/>
               <a:t>Major companies using JavaScript</a:t>
             </a:r>
-            <a:endParaRPr lang="en-US" dirty="0" err="1"/>
+            <a:endParaRPr lang="en-US" err="1"/>
           </a:p>
         </p:txBody>
       </p:sp>
@@ -17683,10 +17448,10 @@
           <a:p>
             <a:pPr algn="ctr"/>
             <a:r>
-              <a:rPr lang="en-US" sz="3200" dirty="0"/>
+              <a:rPr lang="en-US" sz="3200"/>
               <a:t>Popularity: 7th in 2019</a:t>
             </a:r>
-            <a:endParaRPr lang="en-US" sz="3200" dirty="0">
+            <a:endParaRPr lang="en-US" sz="3200">
               <a:effectLst>
                 <a:glow rad="38100">
                   <a:prstClr val="black">

</xml_diff>

<commit_message>
Add skeleton slides to ppt
</commit_message>
<xml_diff>
--- a/Javascript.pptx
+++ b/Javascript.pptx
@@ -45,6 +45,8 @@
     <p:sldId id="299" r:id="rId39"/>
     <p:sldId id="293" r:id="rId40"/>
     <p:sldId id="295" r:id="rId41"/>
+    <p:sldId id="300" r:id="rId42"/>
+    <p:sldId id="301" r:id="rId43"/>
   </p:sldIdLst>
   <p:sldSz cx="9144000" cy="6858000" type="screen4x3"/>
   <p:notesSz cx="6858000" cy="9144000"/>
@@ -154,7 +156,7 @@
 <file path=ppt/revisionInfo.xml><?xml version="1.0" encoding="utf-8"?>
 <p1510:revInfo xmlns:a="http://schemas.openxmlformats.org/drawingml/2006/main" xmlns:r="http://schemas.openxmlformats.org/officeDocument/2006/relationships" xmlns:p1510="http://schemas.microsoft.com/office/powerpoint/2015/10/main">
   <p1510:revLst>
-    <p1510:client id="{36D0BE91-E8E9-7A67-4D45-35D6594435A8}" v="552" dt="2019-11-12T12:10:34.725"/>
+    <p1510:client id="{36D0BE91-E8E9-7A67-4D45-35D6594435A8}" v="743" dt="2019-11-12T12:47:48.628"/>
     <p1510:client id="{38B46382-DAC1-EC02-9741-7C1E2C1EE79E}" v="1" dt="2019-11-10T20:32:54.948"/>
     <p1510:client id="{632A1651-6036-33FD-C8E2-F95E4F72265A}" v="2251" dt="2019-11-11T22:23:38.050"/>
     <p1510:client id="{6B517C38-4A99-C407-302D-7F28E1679330}" v="1" dt="2019-11-10T23:24:49.594"/>
@@ -13245,10 +13247,10 @@
           <a:p>
             <a:pPr algn="ctr"/>
             <a:r>
-              <a:rPr lang="en-US" sz="3200" dirty="0"/>
-              <a:t>Example: The Basics</a:t>
-            </a:r>
-            <a:endParaRPr lang="en-US" sz="3200" dirty="0">
+              <a:rPr lang="en-US" sz="3200"/>
+              <a:t>EDITING AND DEBUGGING</a:t>
+            </a:r>
+            <a:endParaRPr lang="en-US" sz="3200">
               <a:effectLst>
                 <a:glow rad="38100">
                   <a:prstClr val="black">
@@ -13443,7 +13445,7 @@
         </p:nvSpPr>
         <p:spPr>
           <a:xfrm>
-            <a:off x="800276" y="230636"/>
+            <a:off x="829091" y="86560"/>
             <a:ext cx="7055380" cy="710249"/>
           </a:xfrm>
         </p:spPr>
@@ -13455,10 +13457,13 @@
           <a:p>
             <a:pPr algn="ctr"/>
             <a:r>
-              <a:rPr lang="en-US" sz="3200" dirty="0"/>
-              <a:t>Example: The Basics</a:t>
-            </a:r>
-            <a:endParaRPr lang="en-US" sz="3200" dirty="0">
+              <a:rPr lang="en-US" sz="3200">
+                <a:ea typeface="+mj-lt"/>
+                <a:cs typeface="+mj-lt"/>
+              </a:rPr>
+              <a:t>EDITING AND DEBUGGING</a:t>
+            </a:r>
+            <a:endParaRPr lang="en-US" sz="3200">
               <a:effectLst>
                 <a:glow rad="38100">
                   <a:prstClr val="black">
@@ -13703,7 +13708,7 @@
         </p:nvSpPr>
         <p:spPr>
           <a:xfrm>
-            <a:off x="430922" y="210671"/>
+            <a:off x="1045645" y="105016"/>
             <a:ext cx="7055380" cy="710249"/>
           </a:xfrm>
         </p:spPr>
@@ -13713,13 +13718,12 @@
           <a:p>
             <a:pPr algn="ctr"/>
             <a:r>
-              <a:rPr lang="en-US" dirty="0">
+              <a:rPr lang="en-US">
                 <a:ea typeface="+mj-lt"/>
                 <a:cs typeface="+mj-lt"/>
               </a:rPr>
-              <a:t>Example: The Basics</a:t>
-            </a:r>
-            <a:endParaRPr lang="en-US" dirty="0"/>
+              <a:t>EDITING AND DEBUGGING</a:t>
+            </a:r>
           </a:p>
         </p:txBody>
       </p:sp>
@@ -13796,7 +13800,7 @@
         </p:blipFill>
         <p:spPr>
           <a:xfrm>
-            <a:off x="1548332" y="1037208"/>
+            <a:off x="1903719" y="979578"/>
             <a:ext cx="5326956" cy="3506113"/>
           </a:xfrm>
           <a:prstGeom prst="rect">
@@ -13852,7 +13856,7 @@
         </p:nvSpPr>
         <p:spPr>
           <a:xfrm>
-            <a:off x="1039856" y="210671"/>
+            <a:off x="1039856" y="95411"/>
             <a:ext cx="7055380" cy="710249"/>
           </a:xfrm>
         </p:spPr>
@@ -14095,9 +14099,13 @@
             <a:pPr algn="just"/>
             <a:r>
               <a:rPr lang="en-US" sz="2000" dirty="0"/>
-              <a:t>Try setting a breakpoint on Line 5 of the_basics.js by clicking on the '5'. Add watches for a, b, and c. Press F5 to reload.</a:t>
-            </a:r>
-            <a:endParaRPr lang="en-US" dirty="0"/>
+              <a:t>Try setting a breakpoint on Line 3 of the_basics.js by clicking </a:t>
+            </a:r>
+            <a:r>
+              <a:rPr lang="en-US" sz="2000"/>
+              <a:t>on the '3'. Add watches for a, b, and c. Press F5 to reload.</a:t>
+            </a:r>
+            <a:endParaRPr lang="en-US"/>
           </a:p>
         </p:txBody>
       </p:sp>
@@ -14299,7 +14307,7 @@
         </p:nvSpPr>
         <p:spPr>
           <a:xfrm>
-            <a:off x="672353" y="1255059"/>
+            <a:off x="883664" y="2926336"/>
             <a:ext cx="3541058" cy="523220"/>
           </a:xfrm>
           <a:prstGeom prst="rect">
@@ -14338,7 +14346,7 @@
         </p:nvSpPr>
         <p:spPr>
           <a:xfrm>
-            <a:off x="672354" y="2286000"/>
+            <a:off x="883665" y="3957277"/>
             <a:ext cx="7736538" cy="2677656"/>
           </a:xfrm>
           <a:prstGeom prst="rect">
@@ -14434,7 +14442,7 @@
         </p:blipFill>
         <p:spPr>
           <a:xfrm>
-            <a:off x="4438650" y="1209394"/>
+            <a:off x="4649961" y="2880671"/>
             <a:ext cx="3341594" cy="620245"/>
           </a:xfrm>
           <a:prstGeom prst="rect">
@@ -14456,8 +14464,8 @@
         </p:nvSpPr>
         <p:spPr>
           <a:xfrm>
-            <a:off x="439271" y="6087035"/>
-            <a:ext cx="8390963" cy="523220"/>
+            <a:off x="554531" y="1246094"/>
+            <a:ext cx="8390963" cy="954107"/>
           </a:xfrm>
           <a:prstGeom prst="rect">
             <a:avLst/>
@@ -14474,8 +14482,8 @@
           <a:lstStyle/>
           <a:p>
             <a:r>
-              <a:rPr lang="en-US" sz="2800" b="1" dirty="0"/>
-              <a:t>Press F9 a few times to step through the code.</a:t>
+              <a:rPr lang="en-US" sz="2800" b="1"/>
+              <a:t>Press F9 a few times to step through the code, observe what happens.</a:t>
             </a:r>
             <a:endParaRPr lang="en-US" b="1"/>
           </a:p>
@@ -15603,6 +15611,182 @@
             <a:pPr algn="ctr"/>
             <a:r>
               <a:rPr lang="en-US" sz="3200"/>
+              <a:t>Example: MORE BASICS</a:t>
+            </a:r>
+            <a:endParaRPr lang="en-US" sz="3200">
+              <a:effectLst>
+                <a:glow rad="38100">
+                  <a:prstClr val="black">
+                    <a:lumMod val="65000"/>
+                    <a:lumOff val="35000"/>
+                    <a:alpha val="40000"/>
+                  </a:prstClr>
+                </a:glow>
+                <a:outerShdw blurRad="28575" dist="38100" dir="14040000" algn="tl" rotWithShape="0">
+                  <a:srgbClr val="000000">
+                    <a:alpha val="25000"/>
+                  </a:srgbClr>
+                </a:outerShdw>
+              </a:effectLst>
+            </a:endParaRPr>
+          </a:p>
+        </p:txBody>
+      </p:sp>
+      <p:sp>
+        <p:nvSpPr>
+          <p:cNvPr id="4" name="TextBox 3">
+            <a:extLst>
+              <a:ext uri="{FF2B5EF4-FFF2-40B4-BE49-F238E27FC236}">
+                <a16:creationId xmlns:a16="http://schemas.microsoft.com/office/drawing/2014/main" id="{D3841CC4-5C87-49CE-88C0-8A98AA1A8147}"/>
+              </a:ext>
+            </a:extLst>
+          </p:cNvPr>
+          <p:cNvSpPr txBox="1"/>
+          <p:nvPr/>
+        </p:nvSpPr>
+        <p:spPr>
+          <a:xfrm>
+            <a:off x="336452" y="868126"/>
+            <a:ext cx="8358946" cy="707886"/>
+          </a:xfrm>
+          <a:prstGeom prst="rect">
+            <a:avLst/>
+          </a:prstGeom>
+          <a:noFill/>
+        </p:spPr>
+        <p:txBody>
+          <a:bodyPr rot="0" spcFirstLastPara="0" vertOverflow="overflow" horzOverflow="overflow" vert="horz" wrap="square" lIns="91440" tIns="45720" rIns="91440" bIns="45720" numCol="1" spcCol="0" rtlCol="0" fromWordArt="0" anchor="t" anchorCtr="0" forceAA="0" compatLnSpc="1">
+            <a:prstTxWarp prst="textNoShape">
+              <a:avLst/>
+            </a:prstTxWarp>
+            <a:spAutoFit/>
+          </a:bodyPr>
+          <a:lstStyle/>
+          <a:p>
+            <a:pPr algn="ctr"/>
+            <a:r>
+              <a:rPr lang="en-US" sz="2000" dirty="0"/>
+              <a:t>Open more_basics.html in </a:t>
+            </a:r>
+            <a:r>
+              <a:rPr lang="en-US" sz="2000"/>
+              <a:t>Chrome and open the Console (F12).</a:t>
+            </a:r>
+          </a:p>
+          <a:p>
+            <a:pPr algn="ctr"/>
+            <a:endParaRPr lang="en-US" sz="2000" dirty="0"/>
+          </a:p>
+        </p:txBody>
+      </p:sp>
+      <p:sp>
+        <p:nvSpPr>
+          <p:cNvPr id="3" name="TextBox 2">
+            <a:extLst>
+              <a:ext uri="{FF2B5EF4-FFF2-40B4-BE49-F238E27FC236}">
+                <a16:creationId xmlns:a16="http://schemas.microsoft.com/office/drawing/2014/main" id="{0C756E51-9D41-4CDE-B267-154C1ACE9901}"/>
+              </a:ext>
+            </a:extLst>
+          </p:cNvPr>
+          <p:cNvSpPr txBox="1"/>
+          <p:nvPr/>
+        </p:nvSpPr>
+        <p:spPr>
+          <a:xfrm>
+            <a:off x="663389" y="6248400"/>
+            <a:ext cx="7790328" cy="800219"/>
+          </a:xfrm>
+          <a:prstGeom prst="rect">
+            <a:avLst/>
+          </a:prstGeom>
+          <a:noFill/>
+        </p:spPr>
+        <p:txBody>
+          <a:bodyPr rot="0" spcFirstLastPara="0" vertOverflow="overflow" horzOverflow="overflow" vert="horz" wrap="square" lIns="91440" tIns="45720" rIns="91440" bIns="45720" numCol="1" spcCol="0" rtlCol="0" fromWordArt="0" anchor="t" anchorCtr="0" forceAA="0" compatLnSpc="1">
+            <a:prstTxWarp prst="textNoShape">
+              <a:avLst/>
+            </a:prstTxWarp>
+            <a:spAutoFit/>
+          </a:bodyPr>
+          <a:lstStyle/>
+          <a:p>
+            <a:pPr algn="ctr"/>
+            <a:r>
+              <a:rPr lang="en-US" sz="2800" b="1">
+                <a:ea typeface="+mn-lt"/>
+                <a:cs typeface="+mn-lt"/>
+              </a:rPr>
+              <a:t>We'll be adding code to more_basics.js</a:t>
+            </a:r>
+            <a:endParaRPr lang="en-US"/>
+          </a:p>
+          <a:p>
+            <a:pPr algn="l"/>
+            <a:endParaRPr lang="en-US" dirty="0"/>
+          </a:p>
+        </p:txBody>
+      </p:sp>
+    </p:spTree>
+    <p:extLst>
+      <p:ext uri="{BB962C8B-B14F-4D97-AF65-F5344CB8AC3E}">
+        <p14:creationId xmlns:p14="http://schemas.microsoft.com/office/powerpoint/2010/main" val="653725357"/>
+      </p:ext>
+    </p:extLst>
+  </p:cSld>
+  <p:clrMapOvr>
+    <a:masterClrMapping/>
+  </p:clrMapOvr>
+</p:sld>
+</file>
+
+<file path=ppt/slides/slide41.xml><?xml version="1.0" encoding="utf-8"?>
+<p:sld xmlns:a="http://schemas.openxmlformats.org/drawingml/2006/main" xmlns:r="http://schemas.openxmlformats.org/officeDocument/2006/relationships" xmlns:p="http://schemas.openxmlformats.org/presentationml/2006/main">
+  <p:cSld>
+    <p:spTree>
+      <p:nvGrpSpPr>
+        <p:cNvPr id="1" name=""/>
+        <p:cNvGrpSpPr/>
+        <p:nvPr/>
+      </p:nvGrpSpPr>
+      <p:grpSpPr>
+        <a:xfrm>
+          <a:off x="0" y="0"/>
+          <a:ext cx="0" cy="0"/>
+          <a:chOff x="0" y="0"/>
+          <a:chExt cx="0" cy="0"/>
+        </a:xfrm>
+      </p:grpSpPr>
+      <p:sp>
+        <p:nvSpPr>
+          <p:cNvPr id="2" name="Title 1">
+            <a:extLst>
+              <a:ext uri="{FF2B5EF4-FFF2-40B4-BE49-F238E27FC236}">
+                <a16:creationId xmlns:a16="http://schemas.microsoft.com/office/drawing/2014/main" id="{ECCF6F8C-2E13-4296-BD55-0D837BF148FE}"/>
+              </a:ext>
+            </a:extLst>
+          </p:cNvPr>
+          <p:cNvSpPr>
+            <a:spLocks noGrp="1"/>
+          </p:cNvSpPr>
+          <p:nvPr>
+            <p:ph type="title"/>
+          </p:nvPr>
+        </p:nvSpPr>
+        <p:spPr>
+          <a:xfrm>
+            <a:off x="1039857" y="160759"/>
+            <a:ext cx="7055380" cy="710249"/>
+          </a:xfrm>
+        </p:spPr>
+        <p:txBody>
+          <a:bodyPr>
+            <a:normAutofit/>
+          </a:bodyPr>
+          <a:lstStyle/>
+          <a:p>
+            <a:pPr algn="ctr"/>
+            <a:r>
+              <a:rPr lang="en-US" sz="3200"/>
               <a:t>Example: The Colors</a:t>
             </a:r>
             <a:endParaRPr lang="en-US" sz="3200">
@@ -15754,7 +15938,179 @@
     </p:spTree>
     <p:extLst>
       <p:ext uri="{BB962C8B-B14F-4D97-AF65-F5344CB8AC3E}">
-        <p14:creationId xmlns:p14="http://schemas.microsoft.com/office/powerpoint/2010/main" val="653725357"/>
+        <p14:creationId xmlns:p14="http://schemas.microsoft.com/office/powerpoint/2010/main" val="498423495"/>
+      </p:ext>
+    </p:extLst>
+  </p:cSld>
+  <p:clrMapOvr>
+    <a:masterClrMapping/>
+  </p:clrMapOvr>
+</p:sld>
+</file>
+
+<file path=ppt/slides/slide42.xml><?xml version="1.0" encoding="utf-8"?>
+<p:sld xmlns:a="http://schemas.openxmlformats.org/drawingml/2006/main" xmlns:r="http://schemas.openxmlformats.org/officeDocument/2006/relationships" xmlns:p="http://schemas.openxmlformats.org/presentationml/2006/main">
+  <p:cSld>
+    <p:spTree>
+      <p:nvGrpSpPr>
+        <p:cNvPr id="1" name=""/>
+        <p:cNvGrpSpPr/>
+        <p:nvPr/>
+      </p:nvGrpSpPr>
+      <p:grpSpPr>
+        <a:xfrm>
+          <a:off x="0" y="0"/>
+          <a:ext cx="0" cy="0"/>
+          <a:chOff x="0" y="0"/>
+          <a:chExt cx="0" cy="0"/>
+        </a:xfrm>
+      </p:grpSpPr>
+      <p:sp>
+        <p:nvSpPr>
+          <p:cNvPr id="2" name="Title 1">
+            <a:extLst>
+              <a:ext uri="{FF2B5EF4-FFF2-40B4-BE49-F238E27FC236}">
+                <a16:creationId xmlns:a16="http://schemas.microsoft.com/office/drawing/2014/main" id="{ECCF6F8C-2E13-4296-BD55-0D837BF148FE}"/>
+              </a:ext>
+            </a:extLst>
+          </p:cNvPr>
+          <p:cNvSpPr>
+            <a:spLocks noGrp="1"/>
+          </p:cNvSpPr>
+          <p:nvPr>
+            <p:ph type="title"/>
+          </p:nvPr>
+        </p:nvSpPr>
+        <p:spPr>
+          <a:xfrm>
+            <a:off x="1039857" y="160759"/>
+            <a:ext cx="7055380" cy="710249"/>
+          </a:xfrm>
+        </p:spPr>
+        <p:txBody>
+          <a:bodyPr>
+            <a:normAutofit/>
+          </a:bodyPr>
+          <a:lstStyle/>
+          <a:p>
+            <a:pPr algn="ctr"/>
+            <a:r>
+              <a:rPr lang="en-US" sz="3200"/>
+              <a:t>Example: Forms</a:t>
+            </a:r>
+            <a:endParaRPr lang="en-US" sz="3200">
+              <a:effectLst>
+                <a:glow rad="38100">
+                  <a:prstClr val="black">
+                    <a:lumMod val="65000"/>
+                    <a:lumOff val="35000"/>
+                    <a:alpha val="40000"/>
+                  </a:prstClr>
+                </a:glow>
+                <a:outerShdw blurRad="28575" dist="38100" dir="14040000" algn="tl" rotWithShape="0">
+                  <a:srgbClr val="000000">
+                    <a:alpha val="25000"/>
+                  </a:srgbClr>
+                </a:outerShdw>
+              </a:effectLst>
+            </a:endParaRPr>
+          </a:p>
+        </p:txBody>
+      </p:sp>
+      <p:sp>
+        <p:nvSpPr>
+          <p:cNvPr id="4" name="TextBox 3">
+            <a:extLst>
+              <a:ext uri="{FF2B5EF4-FFF2-40B4-BE49-F238E27FC236}">
+                <a16:creationId xmlns:a16="http://schemas.microsoft.com/office/drawing/2014/main" id="{D3841CC4-5C87-49CE-88C0-8A98AA1A8147}"/>
+              </a:ext>
+            </a:extLst>
+          </p:cNvPr>
+          <p:cNvSpPr txBox="1"/>
+          <p:nvPr/>
+        </p:nvSpPr>
+        <p:spPr>
+          <a:xfrm>
+            <a:off x="336452" y="868126"/>
+            <a:ext cx="8358946" cy="707886"/>
+          </a:xfrm>
+          <a:prstGeom prst="rect">
+            <a:avLst/>
+          </a:prstGeom>
+          <a:noFill/>
+        </p:spPr>
+        <p:txBody>
+          <a:bodyPr rot="0" spcFirstLastPara="0" vertOverflow="overflow" horzOverflow="overflow" vert="horz" wrap="square" lIns="91440" tIns="45720" rIns="91440" bIns="45720" numCol="1" spcCol="0" rtlCol="0" fromWordArt="0" anchor="t" anchorCtr="0" forceAA="0" compatLnSpc="1">
+            <a:prstTxWarp prst="textNoShape">
+              <a:avLst/>
+            </a:prstTxWarp>
+            <a:spAutoFit/>
+          </a:bodyPr>
+          <a:lstStyle/>
+          <a:p>
+            <a:pPr algn="ctr"/>
+            <a:r>
+              <a:rPr lang="en-US" sz="2000"/>
+              <a:t>Open forms.html in Chrome and open the Console (F12).</a:t>
+            </a:r>
+          </a:p>
+          <a:p>
+            <a:pPr algn="ctr"/>
+            <a:endParaRPr lang="en-US" sz="2000" dirty="0"/>
+          </a:p>
+        </p:txBody>
+      </p:sp>
+      <p:sp>
+        <p:nvSpPr>
+          <p:cNvPr id="3" name="TextBox 2">
+            <a:extLst>
+              <a:ext uri="{FF2B5EF4-FFF2-40B4-BE49-F238E27FC236}">
+                <a16:creationId xmlns:a16="http://schemas.microsoft.com/office/drawing/2014/main" id="{0C756E51-9D41-4CDE-B267-154C1ACE9901}"/>
+              </a:ext>
+            </a:extLst>
+          </p:cNvPr>
+          <p:cNvSpPr txBox="1"/>
+          <p:nvPr/>
+        </p:nvSpPr>
+        <p:spPr>
+          <a:xfrm>
+            <a:off x="663389" y="6248400"/>
+            <a:ext cx="7790328" cy="800219"/>
+          </a:xfrm>
+          <a:prstGeom prst="rect">
+            <a:avLst/>
+          </a:prstGeom>
+          <a:noFill/>
+        </p:spPr>
+        <p:txBody>
+          <a:bodyPr rot="0" spcFirstLastPara="0" vertOverflow="overflow" horzOverflow="overflow" vert="horz" wrap="square" lIns="91440" tIns="45720" rIns="91440" bIns="45720" numCol="1" spcCol="0" rtlCol="0" fromWordArt="0" anchor="t" anchorCtr="0" forceAA="0" compatLnSpc="1">
+            <a:prstTxWarp prst="textNoShape">
+              <a:avLst/>
+            </a:prstTxWarp>
+            <a:spAutoFit/>
+          </a:bodyPr>
+          <a:lstStyle/>
+          <a:p>
+            <a:pPr algn="ctr"/>
+            <a:r>
+              <a:rPr lang="en-US" sz="2800" b="1">
+                <a:ea typeface="+mn-lt"/>
+                <a:cs typeface="+mn-lt"/>
+              </a:rPr>
+              <a:t>We'll be adding code to forms.js</a:t>
+            </a:r>
+            <a:endParaRPr lang="en-US"/>
+          </a:p>
+          <a:p>
+            <a:pPr algn="l"/>
+            <a:endParaRPr lang="en-US" dirty="0"/>
+          </a:p>
+        </p:txBody>
+      </p:sp>
+    </p:spTree>
+    <p:extLst>
+      <p:ext uri="{BB962C8B-B14F-4D97-AF65-F5344CB8AC3E}">
+        <p14:creationId xmlns:p14="http://schemas.microsoft.com/office/powerpoint/2010/main" val="4204890531"/>
       </p:ext>
     </p:extLst>
   </p:cSld>

</xml_diff>

<commit_message>
More content and fixes
</commit_message>
<xml_diff>
--- a/Javascript.pptx
+++ b/Javascript.pptx
@@ -37,16 +37,20 @@
     <p:sldId id="270" r:id="rId31"/>
     <p:sldId id="272" r:id="rId32"/>
     <p:sldId id="277" r:id="rId33"/>
-    <p:sldId id="281" r:id="rId34"/>
-    <p:sldId id="289" r:id="rId35"/>
-    <p:sldId id="290" r:id="rId36"/>
-    <p:sldId id="291" r:id="rId37"/>
-    <p:sldId id="292" r:id="rId38"/>
-    <p:sldId id="299" r:id="rId39"/>
-    <p:sldId id="293" r:id="rId40"/>
-    <p:sldId id="295" r:id="rId41"/>
-    <p:sldId id="300" r:id="rId42"/>
-    <p:sldId id="301" r:id="rId43"/>
+    <p:sldId id="302" r:id="rId34"/>
+    <p:sldId id="281" r:id="rId35"/>
+    <p:sldId id="289" r:id="rId36"/>
+    <p:sldId id="290" r:id="rId37"/>
+    <p:sldId id="291" r:id="rId38"/>
+    <p:sldId id="292" r:id="rId39"/>
+    <p:sldId id="299" r:id="rId40"/>
+    <p:sldId id="293" r:id="rId41"/>
+    <p:sldId id="303" r:id="rId42"/>
+    <p:sldId id="295" r:id="rId43"/>
+    <p:sldId id="304" r:id="rId44"/>
+    <p:sldId id="300" r:id="rId45"/>
+    <p:sldId id="305" r:id="rId46"/>
+    <p:sldId id="301" r:id="rId47"/>
   </p:sldIdLst>
   <p:sldSz cx="9144000" cy="6858000" type="screen4x3"/>
   <p:notesSz cx="6858000" cy="9144000"/>
@@ -156,7 +160,7 @@
 <file path=ppt/revisionInfo.xml><?xml version="1.0" encoding="utf-8"?>
 <p1510:revInfo xmlns:a="http://schemas.openxmlformats.org/drawingml/2006/main" xmlns:r="http://schemas.openxmlformats.org/officeDocument/2006/relationships" xmlns:p1510="http://schemas.microsoft.com/office/powerpoint/2015/10/main">
   <p1510:revLst>
-    <p1510:client id="{36D0BE91-E8E9-7A67-4D45-35D6594435A8}" v="743" dt="2019-11-12T12:47:48.628"/>
+    <p1510:client id="{36D0BE91-E8E9-7A67-4D45-35D6594435A8}" v="854" dt="2019-11-12T12:53:00.308"/>
     <p1510:client id="{38B46382-DAC1-EC02-9741-7C1E2C1EE79E}" v="1" dt="2019-11-10T20:32:54.948"/>
     <p1510:client id="{632A1651-6036-33FD-C8E2-F95E4F72265A}" v="2251" dt="2019-11-11T22:23:38.050"/>
     <p1510:client id="{6B517C38-4A99-C407-302D-7F28E1679330}" v="1" dt="2019-11-10T23:24:49.594"/>
@@ -13222,6 +13226,477 @@
           <p:cNvPr id="2" name="Title 1">
             <a:extLst>
               <a:ext uri="{FF2B5EF4-FFF2-40B4-BE49-F238E27FC236}">
+                <a16:creationId xmlns:a16="http://schemas.microsoft.com/office/drawing/2014/main" id="{E79991AE-7CE8-4405-AD5B-B465CD58A633}"/>
+              </a:ext>
+            </a:extLst>
+          </p:cNvPr>
+          <p:cNvSpPr>
+            <a:spLocks noGrp="1"/>
+          </p:cNvSpPr>
+          <p:nvPr>
+            <p:ph type="title"/>
+          </p:nvPr>
+        </p:nvSpPr>
+        <p:spPr>
+          <a:xfrm>
+            <a:off x="918172" y="116856"/>
+            <a:ext cx="7511473" cy="1312480"/>
+          </a:xfrm>
+        </p:spPr>
+        <p:txBody>
+          <a:bodyPr>
+            <a:normAutofit/>
+          </a:bodyPr>
+          <a:lstStyle/>
+          <a:p>
+            <a:pPr algn="ctr"/>
+            <a:r>
+              <a:rPr lang="en-US" sz="3200"/>
+              <a:t>NOTE TO US</a:t>
+            </a:r>
+            <a:endParaRPr lang="en-US"/>
+          </a:p>
+        </p:txBody>
+      </p:sp>
+      <p:sp>
+        <p:nvSpPr>
+          <p:cNvPr id="3" name="Content Placeholder 2">
+            <a:extLst>
+              <a:ext uri="{FF2B5EF4-FFF2-40B4-BE49-F238E27FC236}">
+                <a16:creationId xmlns:a16="http://schemas.microsoft.com/office/drawing/2014/main" id="{AF8D3678-114A-4DF5-8D81-1D3A1BA02B55}"/>
+              </a:ext>
+            </a:extLst>
+          </p:cNvPr>
+          <p:cNvSpPr>
+            <a:spLocks noGrp="1"/>
+          </p:cNvSpPr>
+          <p:nvPr>
+            <p:ph idx="1"/>
+          </p:nvPr>
+        </p:nvSpPr>
+        <p:spPr>
+          <a:xfrm>
+            <a:off x="827700" y="1332435"/>
+            <a:ext cx="6711654" cy="5319382"/>
+          </a:xfrm>
+        </p:spPr>
+        <p:txBody>
+          <a:bodyPr vert="horz" lIns="91440" tIns="45720" rIns="91440" bIns="45720" rtlCol="0" anchor="t">
+            <a:noAutofit/>
+          </a:bodyPr>
+          <a:lstStyle/>
+          <a:p>
+            <a:pPr marL="0" indent="0">
+              <a:buNone/>
+            </a:pPr>
+            <a:r>
+              <a:rPr lang="en-US" sz="2800" dirty="0">
+                <a:ea typeface="+mj-lt"/>
+                <a:cs typeface="+mj-lt"/>
+              </a:rPr>
+              <a:t>Cover the following on w3schools </a:t>
+            </a:r>
+            <a:r>
+              <a:rPr lang="en-US" sz="2800">
+                <a:ea typeface="+mj-lt"/>
+                <a:cs typeface="+mj-lt"/>
+              </a:rPr>
+              <a:t>before moving to the editing and debugging slide that follows!</a:t>
+            </a:r>
+            <a:endParaRPr lang="en-US">
+              <a:effectLst>
+                <a:glow rad="38100">
+                  <a:prstClr val="black">
+                    <a:lumMod val="50000"/>
+                    <a:lumOff val="50000"/>
+                    <a:alpha val="20000"/>
+                  </a:prstClr>
+                </a:glow>
+                <a:outerShdw blurRad="44450" dist="12700" dir="13860000" algn="tl" rotWithShape="0">
+                  <a:srgbClr val="000000">
+                    <a:alpha val="20000"/>
+                  </a:srgbClr>
+                </a:outerShdw>
+              </a:effectLst>
+              <a:ea typeface="+mj-lt"/>
+              <a:cs typeface="+mj-lt"/>
+            </a:endParaRPr>
+          </a:p>
+          <a:p>
+            <a:pPr>
+              <a:buNone/>
+            </a:pPr>
+            <a:r>
+              <a:rPr lang="en-US" sz="1200">
+                <a:effectLst>
+                  <a:glow rad="38100">
+                    <a:prstClr val="black">
+                      <a:lumMod val="50000"/>
+                      <a:lumOff val="50000"/>
+                      <a:alpha val="20000"/>
+                    </a:prstClr>
+                  </a:glow>
+                  <a:outerShdw blurRad="44450" dist="12700" dir="13860000" algn="tl" rotWithShape="0">
+                    <a:srgbClr val="000000">
+                      <a:alpha val="20000"/>
+                    </a:srgbClr>
+                  </a:outerShdw>
+                </a:effectLst>
+                <a:ea typeface="+mn-lt"/>
+                <a:cs typeface="+mn-lt"/>
+              </a:rPr>
+              <a:t>//JS Statements</a:t>
+            </a:r>
+          </a:p>
+          <a:p>
+            <a:pPr>
+              <a:buNone/>
+            </a:pPr>
+            <a:r>
+              <a:rPr lang="en-US" sz="1200">
+                <a:effectLst>
+                  <a:glow rad="38100">
+                    <a:prstClr val="black">
+                      <a:lumMod val="50000"/>
+                      <a:lumOff val="50000"/>
+                      <a:alpha val="20000"/>
+                    </a:prstClr>
+                  </a:glow>
+                  <a:outerShdw blurRad="44450" dist="12700" dir="13860000" algn="tl" rotWithShape="0">
+                    <a:srgbClr val="000000">
+                      <a:alpha val="20000"/>
+                    </a:srgbClr>
+                  </a:outerShdw>
+                </a:effectLst>
+                <a:ea typeface="+mn-lt"/>
+                <a:cs typeface="+mn-lt"/>
+              </a:rPr>
+              <a:t>//JS Syntax</a:t>
+            </a:r>
+          </a:p>
+          <a:p>
+            <a:pPr>
+              <a:buNone/>
+            </a:pPr>
+            <a:r>
+              <a:rPr lang="en-US" sz="1200">
+                <a:effectLst>
+                  <a:glow rad="38100">
+                    <a:prstClr val="black">
+                      <a:lumMod val="50000"/>
+                      <a:lumOff val="50000"/>
+                      <a:alpha val="20000"/>
+                    </a:prstClr>
+                  </a:glow>
+                  <a:outerShdw blurRad="44450" dist="12700" dir="13860000" algn="tl" rotWithShape="0">
+                    <a:srgbClr val="000000">
+                      <a:alpha val="20000"/>
+                    </a:srgbClr>
+                  </a:outerShdw>
+                </a:effectLst>
+                <a:ea typeface="+mn-lt"/>
+                <a:cs typeface="+mn-lt"/>
+              </a:rPr>
+              <a:t>//JS Comments</a:t>
+            </a:r>
+          </a:p>
+          <a:p>
+            <a:pPr>
+              <a:buNone/>
+            </a:pPr>
+            <a:r>
+              <a:rPr lang="en-US" sz="1200">
+                <a:effectLst>
+                  <a:glow rad="38100">
+                    <a:prstClr val="black">
+                      <a:lumMod val="50000"/>
+                      <a:lumOff val="50000"/>
+                      <a:alpha val="20000"/>
+                    </a:prstClr>
+                  </a:glow>
+                  <a:outerShdw blurRad="44450" dist="12700" dir="13860000" algn="tl" rotWithShape="0">
+                    <a:srgbClr val="000000">
+                      <a:alpha val="20000"/>
+                    </a:srgbClr>
+                  </a:outerShdw>
+                </a:effectLst>
+                <a:ea typeface="+mn-lt"/>
+                <a:cs typeface="+mn-lt"/>
+              </a:rPr>
+              <a:t>//JS Variables</a:t>
+            </a:r>
+          </a:p>
+          <a:p>
+            <a:pPr>
+              <a:buNone/>
+            </a:pPr>
+            <a:r>
+              <a:rPr lang="en-US" sz="1200">
+                <a:effectLst>
+                  <a:glow rad="38100">
+                    <a:prstClr val="black">
+                      <a:lumMod val="50000"/>
+                      <a:lumOff val="50000"/>
+                      <a:alpha val="20000"/>
+                    </a:prstClr>
+                  </a:glow>
+                  <a:outerShdw blurRad="44450" dist="12700" dir="13860000" algn="tl" rotWithShape="0">
+                    <a:srgbClr val="000000">
+                      <a:alpha val="20000"/>
+                    </a:srgbClr>
+                  </a:outerShdw>
+                </a:effectLst>
+                <a:ea typeface="+mn-lt"/>
+                <a:cs typeface="+mn-lt"/>
+              </a:rPr>
+              <a:t>//JS Operators</a:t>
+            </a:r>
+          </a:p>
+          <a:p>
+            <a:pPr>
+              <a:buNone/>
+            </a:pPr>
+            <a:r>
+              <a:rPr lang="en-US" sz="1200">
+                <a:effectLst>
+                  <a:glow rad="38100">
+                    <a:prstClr val="black">
+                      <a:lumMod val="50000"/>
+                      <a:lumOff val="50000"/>
+                      <a:alpha val="20000"/>
+                    </a:prstClr>
+                  </a:glow>
+                  <a:outerShdw blurRad="44450" dist="12700" dir="13860000" algn="tl" rotWithShape="0">
+                    <a:srgbClr val="000000">
+                      <a:alpha val="20000"/>
+                    </a:srgbClr>
+                  </a:outerShdw>
+                </a:effectLst>
+                <a:ea typeface="+mn-lt"/>
+                <a:cs typeface="+mn-lt"/>
+              </a:rPr>
+              <a:t>//JS Arithmetic</a:t>
+            </a:r>
+          </a:p>
+          <a:p>
+            <a:pPr>
+              <a:buNone/>
+            </a:pPr>
+            <a:r>
+              <a:rPr lang="en-US" sz="1200">
+                <a:effectLst>
+                  <a:glow rad="38100">
+                    <a:prstClr val="black">
+                      <a:lumMod val="50000"/>
+                      <a:lumOff val="50000"/>
+                      <a:alpha val="20000"/>
+                    </a:prstClr>
+                  </a:glow>
+                  <a:outerShdw blurRad="44450" dist="12700" dir="13860000" algn="tl" rotWithShape="0">
+                    <a:srgbClr val="000000">
+                      <a:alpha val="20000"/>
+                    </a:srgbClr>
+                  </a:outerShdw>
+                </a:effectLst>
+                <a:ea typeface="+mn-lt"/>
+                <a:cs typeface="+mn-lt"/>
+              </a:rPr>
+              <a:t>//JS Assignment</a:t>
+            </a:r>
+          </a:p>
+          <a:p>
+            <a:pPr>
+              <a:buNone/>
+            </a:pPr>
+            <a:r>
+              <a:rPr lang="en-US" sz="1200">
+                <a:effectLst>
+                  <a:glow rad="38100">
+                    <a:prstClr val="black">
+                      <a:lumMod val="50000"/>
+                      <a:lumOff val="50000"/>
+                      <a:alpha val="20000"/>
+                    </a:prstClr>
+                  </a:glow>
+                  <a:outerShdw blurRad="44450" dist="12700" dir="13860000" algn="tl" rotWithShape="0">
+                    <a:srgbClr val="000000">
+                      <a:alpha val="20000"/>
+                    </a:srgbClr>
+                  </a:outerShdw>
+                </a:effectLst>
+                <a:ea typeface="+mn-lt"/>
+                <a:cs typeface="+mn-lt"/>
+              </a:rPr>
+              <a:t>//JS Data Types</a:t>
+            </a:r>
+          </a:p>
+          <a:p>
+            <a:pPr>
+              <a:buNone/>
+            </a:pPr>
+            <a:r>
+              <a:rPr lang="en-US" sz="1200">
+                <a:effectLst>
+                  <a:glow rad="38100">
+                    <a:prstClr val="black">
+                      <a:lumMod val="50000"/>
+                      <a:lumOff val="50000"/>
+                      <a:alpha val="20000"/>
+                    </a:prstClr>
+                  </a:glow>
+                  <a:outerShdw blurRad="44450" dist="12700" dir="13860000" algn="tl" rotWithShape="0">
+                    <a:srgbClr val="000000">
+                      <a:alpha val="20000"/>
+                    </a:srgbClr>
+                  </a:outerShdw>
+                </a:effectLst>
+                <a:ea typeface="+mn-lt"/>
+                <a:cs typeface="+mn-lt"/>
+              </a:rPr>
+              <a:t>//JS Functions</a:t>
+            </a:r>
+          </a:p>
+          <a:p>
+            <a:pPr>
+              <a:buNone/>
+            </a:pPr>
+            <a:r>
+              <a:rPr lang="en-US" sz="1200">
+                <a:effectLst>
+                  <a:glow rad="38100">
+                    <a:prstClr val="black">
+                      <a:lumMod val="50000"/>
+                      <a:lumOff val="50000"/>
+                      <a:alpha val="20000"/>
+                    </a:prstClr>
+                  </a:glow>
+                  <a:outerShdw blurRad="44450" dist="12700" dir="13860000" algn="tl" rotWithShape="0">
+                    <a:srgbClr val="000000">
+                      <a:alpha val="20000"/>
+                    </a:srgbClr>
+                  </a:outerShdw>
+                </a:effectLst>
+                <a:ea typeface="+mn-lt"/>
+                <a:cs typeface="+mn-lt"/>
+              </a:rPr>
+              <a:t>//JS Objects</a:t>
+            </a:r>
+          </a:p>
+          <a:p>
+            <a:pPr>
+              <a:buNone/>
+            </a:pPr>
+            <a:r>
+              <a:rPr lang="en-US" sz="1400">
+                <a:effectLst>
+                  <a:glow rad="38100">
+                    <a:prstClr val="black">
+                      <a:lumMod val="50000"/>
+                      <a:lumOff val="50000"/>
+                      <a:alpha val="20000"/>
+                    </a:prstClr>
+                  </a:glow>
+                  <a:outerShdw blurRad="44450" dist="12700" dir="13860000" algn="tl" rotWithShape="0">
+                    <a:srgbClr val="000000">
+                      <a:alpha val="20000"/>
+                    </a:srgbClr>
+                  </a:outerShdw>
+                </a:effectLst>
+                <a:ea typeface="+mn-lt"/>
+                <a:cs typeface="+mn-lt"/>
+              </a:rPr>
+              <a:t>//JS Scope – review global</a:t>
+            </a:r>
+          </a:p>
+          <a:p>
+            <a:pPr>
+              <a:buNone/>
+            </a:pPr>
+            <a:r>
+              <a:rPr lang="en-US" sz="1400">
+                <a:effectLst>
+                  <a:glow rad="38100">
+                    <a:prstClr val="black">
+                      <a:lumMod val="50000"/>
+                      <a:lumOff val="50000"/>
+                      <a:alpha val="20000"/>
+                    </a:prstClr>
+                  </a:glow>
+                  <a:outerShdw blurRad="44450" dist="12700" dir="13860000" algn="tl" rotWithShape="0">
+                    <a:srgbClr val="000000">
+                      <a:alpha val="20000"/>
+                    </a:srgbClr>
+                  </a:outerShdw>
+                </a:effectLst>
+                <a:ea typeface="+mn-lt"/>
+                <a:cs typeface="+mn-lt"/>
+              </a:rPr>
+              <a:t>//JS Events</a:t>
+            </a:r>
+          </a:p>
+          <a:p>
+            <a:pPr marL="0" indent="0">
+              <a:buNone/>
+            </a:pPr>
+            <a:r>
+              <a:rPr lang="en-US" sz="1400">
+                <a:effectLst>
+                  <a:glow rad="38100">
+                    <a:prstClr val="black">
+                      <a:lumMod val="50000"/>
+                      <a:lumOff val="50000"/>
+                      <a:alpha val="20000"/>
+                    </a:prstClr>
+                  </a:glow>
+                  <a:outerShdw blurRad="44450" dist="12700" dir="13860000" algn="tl" rotWithShape="0">
+                    <a:srgbClr val="000000">
+                      <a:alpha val="20000"/>
+                    </a:srgbClr>
+                  </a:outerShdw>
+                </a:effectLst>
+                <a:ea typeface="+mn-lt"/>
+                <a:cs typeface="+mn-lt"/>
+              </a:rPr>
+              <a:t>//JS Strings</a:t>
+            </a:r>
+          </a:p>
+        </p:txBody>
+      </p:sp>
+    </p:spTree>
+    <p:extLst>
+      <p:ext uri="{BB962C8B-B14F-4D97-AF65-F5344CB8AC3E}">
+        <p14:creationId xmlns:p14="http://schemas.microsoft.com/office/powerpoint/2010/main" val="1342843187"/>
+      </p:ext>
+    </p:extLst>
+  </p:cSld>
+  <p:clrMapOvr>
+    <a:masterClrMapping/>
+  </p:clrMapOvr>
+</p:sld>
+</file>
+
+<file path=ppt/slides/slide34.xml><?xml version="1.0" encoding="utf-8"?>
+<p:sld xmlns:a="http://schemas.openxmlformats.org/drawingml/2006/main" xmlns:r="http://schemas.openxmlformats.org/officeDocument/2006/relationships" xmlns:p="http://schemas.openxmlformats.org/presentationml/2006/main">
+  <p:cSld>
+    <p:spTree>
+      <p:nvGrpSpPr>
+        <p:cNvPr id="1" name=""/>
+        <p:cNvGrpSpPr/>
+        <p:nvPr/>
+      </p:nvGrpSpPr>
+      <p:grpSpPr>
+        <a:xfrm>
+          <a:off x="0" y="0"/>
+          <a:ext cx="0" cy="0"/>
+          <a:chOff x="0" y="0"/>
+          <a:chExt cx="0" cy="0"/>
+        </a:xfrm>
+      </p:grpSpPr>
+      <p:sp>
+        <p:nvSpPr>
+          <p:cNvPr id="2" name="Title 1">
+            <a:extLst>
+              <a:ext uri="{FF2B5EF4-FFF2-40B4-BE49-F238E27FC236}">
                 <a16:creationId xmlns:a16="http://schemas.microsoft.com/office/drawing/2014/main" id="{ECCF6F8C-2E13-4296-BD55-0D837BF148FE}"/>
               </a:ext>
             </a:extLst>
@@ -13410,7 +13885,7 @@
 </p:sld>
 </file>
 
-<file path=ppt/slides/slide34.xml><?xml version="1.0" encoding="utf-8"?>
+<file path=ppt/slides/slide35.xml><?xml version="1.0" encoding="utf-8"?>
 <p:sld xmlns:a="http://schemas.openxmlformats.org/drawingml/2006/main" xmlns:r="http://schemas.openxmlformats.org/officeDocument/2006/relationships" xmlns:p="http://schemas.openxmlformats.org/presentationml/2006/main">
   <p:cSld>
     <p:spTree>
@@ -13673,7 +14148,7 @@
 </p:sld>
 </file>
 
-<file path=ppt/slides/slide35.xml><?xml version="1.0" encoding="utf-8"?>
+<file path=ppt/slides/slide36.xml><?xml version="1.0" encoding="utf-8"?>
 <p:sld xmlns:a="http://schemas.openxmlformats.org/drawingml/2006/main" xmlns:r="http://schemas.openxmlformats.org/officeDocument/2006/relationships" xmlns:p="http://schemas.openxmlformats.org/presentationml/2006/main">
   <p:cSld>
     <p:spTree>
@@ -13821,7 +14296,7 @@
 </p:sld>
 </file>
 
-<file path=ppt/slides/slide36.xml><?xml version="1.0" encoding="utf-8"?>
+<file path=ppt/slides/slide37.xml><?xml version="1.0" encoding="utf-8"?>
 <p:sld xmlns:a="http://schemas.openxmlformats.org/drawingml/2006/main" xmlns:r="http://schemas.openxmlformats.org/officeDocument/2006/relationships" xmlns:p="http://schemas.openxmlformats.org/presentationml/2006/main">
   <p:cSld>
     <p:spTree>
@@ -13993,7 +14468,7 @@
 </p:sld>
 </file>
 
-<file path=ppt/slides/slide37.xml><?xml version="1.0" encoding="utf-8"?>
+<file path=ppt/slides/slide38.xml><?xml version="1.0" encoding="utf-8"?>
 <p:sld xmlns:a="http://schemas.openxmlformats.org/drawingml/2006/main" xmlns:r="http://schemas.openxmlformats.org/officeDocument/2006/relationships" xmlns:p="http://schemas.openxmlformats.org/presentationml/2006/main">
   <p:cSld>
     <p:spTree>
@@ -14221,7 +14696,7 @@
 </p:sld>
 </file>
 
-<file path=ppt/slides/slide38.xml><?xml version="1.0" encoding="utf-8"?>
+<file path=ppt/slides/slide39.xml><?xml version="1.0" encoding="utf-8"?>
 <p:sld xmlns:a="http://schemas.openxmlformats.org/drawingml/2006/main" xmlns:r="http://schemas.openxmlformats.org/officeDocument/2006/relationships" xmlns:p="http://schemas.openxmlformats.org/presentationml/2006/main">
   <p:cSld>
     <p:spTree>
@@ -14499,454 +14974,6 @@
   <p:clrMapOvr>
     <a:masterClrMapping/>
   </p:clrMapOvr>
-</p:sld>
-</file>
-
-<file path=ppt/slides/slide39.xml><?xml version="1.0" encoding="utf-8"?>
-<p:sld xmlns:a="http://schemas.openxmlformats.org/drawingml/2006/main" xmlns:r="http://schemas.openxmlformats.org/officeDocument/2006/relationships" xmlns:p="http://schemas.openxmlformats.org/presentationml/2006/main">
-  <p:cSld>
-    <p:spTree>
-      <p:nvGrpSpPr>
-        <p:cNvPr id="1" name=""/>
-        <p:cNvGrpSpPr/>
-        <p:nvPr/>
-      </p:nvGrpSpPr>
-      <p:grpSpPr>
-        <a:xfrm>
-          <a:off x="0" y="0"/>
-          <a:ext cx="0" cy="0"/>
-          <a:chOff x="0" y="0"/>
-          <a:chExt cx="0" cy="0"/>
-        </a:xfrm>
-      </p:grpSpPr>
-      <p:sp>
-        <p:nvSpPr>
-          <p:cNvPr id="2" name="Title 1">
-            <a:extLst>
-              <a:ext uri="{FF2B5EF4-FFF2-40B4-BE49-F238E27FC236}">
-                <a16:creationId xmlns:a16="http://schemas.microsoft.com/office/drawing/2014/main" id="{ECCF6F8C-2E13-4296-BD55-0D837BF148FE}"/>
-              </a:ext>
-            </a:extLst>
-          </p:cNvPr>
-          <p:cNvSpPr>
-            <a:spLocks noGrp="1"/>
-          </p:cNvSpPr>
-          <p:nvPr>
-            <p:ph type="title"/>
-          </p:nvPr>
-        </p:nvSpPr>
-        <p:spPr>
-          <a:xfrm>
-            <a:off x="861228" y="121024"/>
-            <a:ext cx="7055380" cy="710249"/>
-          </a:xfrm>
-        </p:spPr>
-        <p:txBody>
-          <a:bodyPr>
-            <a:normAutofit/>
-          </a:bodyPr>
-          <a:lstStyle/>
-          <a:p>
-            <a:pPr algn="ctr"/>
-            <a:r>
-              <a:rPr lang="en-US" sz="3200" dirty="0"/>
-              <a:t>Example: The Basics</a:t>
-            </a:r>
-            <a:endParaRPr lang="en-US" sz="3200" dirty="0">
-              <a:effectLst>
-                <a:glow rad="38100">
-                  <a:prstClr val="black">
-                    <a:lumMod val="65000"/>
-                    <a:lumOff val="35000"/>
-                    <a:alpha val="40000"/>
-                  </a:prstClr>
-                </a:glow>
-                <a:outerShdw blurRad="28575" dist="38100" dir="14040000" algn="tl" rotWithShape="0">
-                  <a:srgbClr val="000000">
-                    <a:alpha val="25000"/>
-                  </a:srgbClr>
-                </a:outerShdw>
-              </a:effectLst>
-            </a:endParaRPr>
-          </a:p>
-        </p:txBody>
-      </p:sp>
-      <p:sp>
-        <p:nvSpPr>
-          <p:cNvPr id="3" name="TextBox 2">
-            <a:extLst>
-              <a:ext uri="{FF2B5EF4-FFF2-40B4-BE49-F238E27FC236}">
-                <a16:creationId xmlns:a16="http://schemas.microsoft.com/office/drawing/2014/main" id="{E61DBC47-78EB-4073-8B62-19078A06C703}"/>
-              </a:ext>
-            </a:extLst>
-          </p:cNvPr>
-          <p:cNvSpPr txBox="1"/>
-          <p:nvPr/>
-        </p:nvSpPr>
-        <p:spPr>
-          <a:xfrm>
-            <a:off x="430306" y="1299882"/>
-            <a:ext cx="8462682" cy="830997"/>
-          </a:xfrm>
-          <a:prstGeom prst="rect">
-            <a:avLst/>
-          </a:prstGeom>
-          <a:noFill/>
-        </p:spPr>
-        <p:txBody>
-          <a:bodyPr rot="0" spcFirstLastPara="0" vertOverflow="overflow" horzOverflow="overflow" vert="horz" wrap="square" lIns="91440" tIns="45720" rIns="91440" bIns="45720" numCol="1" spcCol="0" rtlCol="0" fromWordArt="0" anchor="t" anchorCtr="0" forceAA="0" compatLnSpc="1">
-            <a:prstTxWarp prst="textNoShape">
-              <a:avLst/>
-            </a:prstTxWarp>
-            <a:spAutoFit/>
-          </a:bodyPr>
-          <a:lstStyle/>
-          <a:p>
-            <a:pPr marL="342900" indent="-342900" algn="just">
-              <a:buFont typeface="Arial,Sans-Serif"/>
-              <a:buChar char="•"/>
-            </a:pPr>
-            <a:r>
-              <a:rPr lang="en-US" sz="2400" dirty="0">
-                <a:ea typeface="+mn-lt"/>
-                <a:cs typeface="+mn-lt"/>
-              </a:rPr>
-              <a:t>Code changes in the debugger won't persist upon page reload, so we'll be working in Visual Studio</a:t>
-            </a:r>
-          </a:p>
-        </p:txBody>
-      </p:sp>
-      <p:sp>
-        <p:nvSpPr>
-          <p:cNvPr id="7" name="TextBox 6">
-            <a:extLst>
-              <a:ext uri="{FF2B5EF4-FFF2-40B4-BE49-F238E27FC236}">
-                <a16:creationId xmlns:a16="http://schemas.microsoft.com/office/drawing/2014/main" id="{DD11F90E-CBD9-49B2-973F-F71F218380B3}"/>
-              </a:ext>
-            </a:extLst>
-          </p:cNvPr>
-          <p:cNvSpPr txBox="1"/>
-          <p:nvPr/>
-        </p:nvSpPr>
-        <p:spPr>
-          <a:xfrm>
-            <a:off x="428624" y="4373095"/>
-            <a:ext cx="8014447" cy="461665"/>
-          </a:xfrm>
-          <a:prstGeom prst="rect">
-            <a:avLst/>
-          </a:prstGeom>
-          <a:noFill/>
-        </p:spPr>
-        <p:txBody>
-          <a:bodyPr rot="0" spcFirstLastPara="0" vertOverflow="overflow" horzOverflow="overflow" vert="horz" wrap="square" lIns="91440" tIns="45720" rIns="91440" bIns="45720" numCol="1" spcCol="0" rtlCol="0" fromWordArt="0" anchor="t" anchorCtr="0" forceAA="0" compatLnSpc="1">
-            <a:prstTxWarp prst="textNoShape">
-              <a:avLst/>
-            </a:prstTxWarp>
-            <a:spAutoFit/>
-          </a:bodyPr>
-          <a:lstStyle/>
-          <a:p>
-            <a:pPr marL="285750" indent="-285750">
-              <a:buFont typeface="Arial"/>
-              <a:buChar char="•"/>
-            </a:pPr>
-            <a:r>
-              <a:rPr lang="en-US" sz="2400" b="1" dirty="0"/>
-              <a:t>Try the exercises in the_basics.js now</a:t>
-            </a:r>
-          </a:p>
-        </p:txBody>
-      </p:sp>
-      <p:sp>
-        <p:nvSpPr>
-          <p:cNvPr id="5" name="TextBox 4">
-            <a:extLst>
-              <a:ext uri="{FF2B5EF4-FFF2-40B4-BE49-F238E27FC236}">
-                <a16:creationId xmlns:a16="http://schemas.microsoft.com/office/drawing/2014/main" id="{B2432976-82BB-437F-B119-134DD09CB02D}"/>
-              </a:ext>
-            </a:extLst>
-          </p:cNvPr>
-          <p:cNvSpPr txBox="1"/>
-          <p:nvPr/>
-        </p:nvSpPr>
-        <p:spPr>
-          <a:xfrm>
-            <a:off x="430306" y="2608729"/>
-            <a:ext cx="8462682" cy="1200329"/>
-          </a:xfrm>
-          <a:prstGeom prst="rect">
-            <a:avLst/>
-          </a:prstGeom>
-          <a:noFill/>
-        </p:spPr>
-        <p:txBody>
-          <a:bodyPr rot="0" spcFirstLastPara="0" vertOverflow="overflow" horzOverflow="overflow" vert="horz" wrap="square" lIns="91440" tIns="45720" rIns="91440" bIns="45720" numCol="1" spcCol="0" rtlCol="0" fromWordArt="0" anchor="t" anchorCtr="0" forceAA="0" compatLnSpc="1">
-            <a:prstTxWarp prst="textNoShape">
-              <a:avLst/>
-            </a:prstTxWarp>
-            <a:spAutoFit/>
-          </a:bodyPr>
-          <a:lstStyle/>
-          <a:p>
-            <a:pPr marL="285750" indent="-285750">
-              <a:buFont typeface="Arial"/>
-              <a:buChar char="•"/>
-            </a:pPr>
-            <a:r>
-              <a:rPr lang="en-US" sz="2400" dirty="0"/>
-              <a:t>Remember to save your changes in Visual Studio, then reload the HTML in Chrome (hit F5) to see them applied </a:t>
-            </a:r>
-            <a:endParaRPr lang="en-US"/>
-          </a:p>
-        </p:txBody>
-      </p:sp>
-      <p:sp>
-        <p:nvSpPr>
-          <p:cNvPr id="9" name="TextBox 8">
-            <a:extLst>
-              <a:ext uri="{FF2B5EF4-FFF2-40B4-BE49-F238E27FC236}">
-                <a16:creationId xmlns:a16="http://schemas.microsoft.com/office/drawing/2014/main" id="{3961B07A-D810-4BDD-AB40-D462755973AB}"/>
-              </a:ext>
-            </a:extLst>
-          </p:cNvPr>
-          <p:cNvSpPr txBox="1"/>
-          <p:nvPr/>
-        </p:nvSpPr>
-        <p:spPr>
-          <a:xfrm>
-            <a:off x="428625" y="5421966"/>
-            <a:ext cx="8014447" cy="830997"/>
-          </a:xfrm>
-          <a:prstGeom prst="rect">
-            <a:avLst/>
-          </a:prstGeom>
-          <a:noFill/>
-        </p:spPr>
-        <p:txBody>
-          <a:bodyPr rot="0" spcFirstLastPara="0" vertOverflow="overflow" horzOverflow="overflow" vert="horz" wrap="square" lIns="91440" tIns="45720" rIns="91440" bIns="45720" numCol="1" spcCol="0" rtlCol="0" fromWordArt="0" anchor="t" anchorCtr="0" forceAA="0" compatLnSpc="1">
-            <a:prstTxWarp prst="textNoShape">
-              <a:avLst/>
-            </a:prstTxWarp>
-            <a:spAutoFit/>
-          </a:bodyPr>
-          <a:lstStyle/>
-          <a:p>
-            <a:pPr marL="285750" indent="-285750">
-              <a:buFont typeface="Arial"/>
-              <a:buChar char="•"/>
-            </a:pPr>
-            <a:r>
-              <a:rPr lang="en-US" sz="2400" dirty="0"/>
-              <a:t>There are solutions in the_basics_solution.js, but try the problems on your own first</a:t>
-            </a:r>
-          </a:p>
-        </p:txBody>
-      </p:sp>
-    </p:spTree>
-    <p:extLst>
-      <p:ext uri="{BB962C8B-B14F-4D97-AF65-F5344CB8AC3E}">
-        <p14:creationId xmlns:p14="http://schemas.microsoft.com/office/powerpoint/2010/main" val="3774311452"/>
-      </p:ext>
-    </p:extLst>
-  </p:cSld>
-  <p:clrMapOvr>
-    <a:masterClrMapping/>
-  </p:clrMapOvr>
-  <p:timing>
-    <p:tnLst>
-      <p:par>
-        <p:cTn id="1" dur="indefinite" restart="never" nodeType="tmRoot">
-          <p:childTnLst>
-            <p:seq concurrent="1" nextAc="seek">
-              <p:cTn id="2" dur="indefinite" nodeType="mainSeq">
-                <p:childTnLst>
-                  <p:par>
-                    <p:cTn id="3" fill="hold">
-                      <p:stCondLst>
-                        <p:cond delay="indefinite"/>
-                      </p:stCondLst>
-                      <p:childTnLst>
-                        <p:par>
-                          <p:cTn id="4" fill="hold">
-                            <p:stCondLst>
-                              <p:cond delay="0"/>
-                            </p:stCondLst>
-                            <p:childTnLst>
-                              <p:par>
-                                <p:cTn id="5" presetID="10" presetClass="entr" presetSubtype="0" fill="hold" grpId="0" nodeType="clickEffect">
-                                  <p:stCondLst>
-                                    <p:cond delay="0"/>
-                                  </p:stCondLst>
-                                  <p:childTnLst>
-                                    <p:set>
-                                      <p:cBhvr>
-                                        <p:cTn id="6" dur="1" fill="hold">
-                                          <p:stCondLst>
-                                            <p:cond delay="0"/>
-                                          </p:stCondLst>
-                                        </p:cTn>
-                                        <p:tgtEl>
-                                          <p:spTgt spid="5"/>
-                                        </p:tgtEl>
-                                        <p:attrNameLst>
-                                          <p:attrName>style.visibility</p:attrName>
-                                        </p:attrNameLst>
-                                      </p:cBhvr>
-                                      <p:to>
-                                        <p:strVal val="visible"/>
-                                      </p:to>
-                                    </p:set>
-                                    <p:animEffect transition="in" filter="fade">
-                                      <p:cBhvr>
-                                        <p:cTn id="7" dur="500"/>
-                                        <p:tgtEl>
-                                          <p:spTgt spid="5"/>
-                                        </p:tgtEl>
-                                      </p:cBhvr>
-                                    </p:animEffect>
-                                  </p:childTnLst>
-                                </p:cTn>
-                              </p:par>
-                            </p:childTnLst>
-                          </p:cTn>
-                        </p:par>
-                      </p:childTnLst>
-                    </p:cTn>
-                  </p:par>
-                  <p:par>
-                    <p:cTn id="8" fill="hold">
-                      <p:stCondLst>
-                        <p:cond delay="indefinite"/>
-                      </p:stCondLst>
-                      <p:childTnLst>
-                        <p:par>
-                          <p:cTn id="9" fill="hold">
-                            <p:stCondLst>
-                              <p:cond delay="0"/>
-                            </p:stCondLst>
-                            <p:childTnLst>
-                              <p:par>
-                                <p:cTn id="10" presetID="10" presetClass="entr" presetSubtype="0" fill="hold" grpId="0" nodeType="clickEffect">
-                                  <p:stCondLst>
-                                    <p:cond delay="0"/>
-                                  </p:stCondLst>
-                                  <p:childTnLst>
-                                    <p:set>
-                                      <p:cBhvr>
-                                        <p:cTn id="11" dur="1" fill="hold">
-                                          <p:stCondLst>
-                                            <p:cond delay="0"/>
-                                          </p:stCondLst>
-                                        </p:cTn>
-                                        <p:tgtEl>
-                                          <p:spTgt spid="7"/>
-                                        </p:tgtEl>
-                                        <p:attrNameLst>
-                                          <p:attrName>style.visibility</p:attrName>
-                                        </p:attrNameLst>
-                                      </p:cBhvr>
-                                      <p:to>
-                                        <p:strVal val="visible"/>
-                                      </p:to>
-                                    </p:set>
-                                    <p:animEffect transition="in" filter="fade">
-                                      <p:cBhvr>
-                                        <p:cTn id="12" dur="500"/>
-                                        <p:tgtEl>
-                                          <p:spTgt spid="7"/>
-                                        </p:tgtEl>
-                                      </p:cBhvr>
-                                    </p:animEffect>
-                                  </p:childTnLst>
-                                </p:cTn>
-                              </p:par>
-                            </p:childTnLst>
-                          </p:cTn>
-                        </p:par>
-                      </p:childTnLst>
-                    </p:cTn>
-                  </p:par>
-                  <p:par>
-                    <p:cTn id="13" fill="hold">
-                      <p:stCondLst>
-                        <p:cond delay="indefinite"/>
-                      </p:stCondLst>
-                      <p:childTnLst>
-                        <p:par>
-                          <p:cTn id="14" fill="hold">
-                            <p:stCondLst>
-                              <p:cond delay="0"/>
-                            </p:stCondLst>
-                            <p:childTnLst>
-                              <p:par>
-                                <p:cTn id="15" presetID="10" presetClass="entr" presetSubtype="0" fill="hold" grpId="0" nodeType="clickEffect">
-                                  <p:stCondLst>
-                                    <p:cond delay="0"/>
-                                  </p:stCondLst>
-                                  <p:childTnLst>
-                                    <p:set>
-                                      <p:cBhvr>
-                                        <p:cTn id="16" dur="1" fill="hold">
-                                          <p:stCondLst>
-                                            <p:cond delay="0"/>
-                                          </p:stCondLst>
-                                        </p:cTn>
-                                        <p:tgtEl>
-                                          <p:spTgt spid="9"/>
-                                        </p:tgtEl>
-                                        <p:attrNameLst>
-                                          <p:attrName>style.visibility</p:attrName>
-                                        </p:attrNameLst>
-                                      </p:cBhvr>
-                                      <p:to>
-                                        <p:strVal val="visible"/>
-                                      </p:to>
-                                    </p:set>
-                                    <p:animEffect transition="in" filter="fade">
-                                      <p:cBhvr>
-                                        <p:cTn id="17" dur="500"/>
-                                        <p:tgtEl>
-                                          <p:spTgt spid="9"/>
-                                        </p:tgtEl>
-                                      </p:cBhvr>
-                                    </p:animEffect>
-                                  </p:childTnLst>
-                                </p:cTn>
-                              </p:par>
-                            </p:childTnLst>
-                          </p:cTn>
-                        </p:par>
-                      </p:childTnLst>
-                    </p:cTn>
-                  </p:par>
-                </p:childTnLst>
-              </p:cTn>
-              <p:prevCondLst>
-                <p:cond evt="onPrev" delay="0">
-                  <p:tgtEl>
-                    <p:sldTgt/>
-                  </p:tgtEl>
-                </p:cond>
-              </p:prevCondLst>
-              <p:nextCondLst>
-                <p:cond evt="onNext" delay="0">
-                  <p:tgtEl>
-                    <p:sldTgt/>
-                  </p:tgtEl>
-                </p:cond>
-              </p:nextCondLst>
-            </p:seq>
-          </p:childTnLst>
-        </p:cTn>
-      </p:par>
-    </p:tnLst>
-    <p:bldLst>
-      <p:bldP spid="7" grpId="0"/>
-      <p:bldP spid="5" grpId="0"/>
-      <p:bldP spid="9" grpId="0"/>
-    </p:bldLst>
-  </p:timing>
 </p:sld>
 </file>
 
@@ -15598,6 +15625,1511 @@
         </p:nvSpPr>
         <p:spPr>
           <a:xfrm>
+            <a:off x="861228" y="121024"/>
+            <a:ext cx="7055380" cy="710249"/>
+          </a:xfrm>
+        </p:spPr>
+        <p:txBody>
+          <a:bodyPr>
+            <a:normAutofit/>
+          </a:bodyPr>
+          <a:lstStyle/>
+          <a:p>
+            <a:pPr algn="ctr"/>
+            <a:r>
+              <a:rPr lang="en-US" sz="3200" dirty="0"/>
+              <a:t>Example: The Basics</a:t>
+            </a:r>
+            <a:endParaRPr lang="en-US" sz="3200" dirty="0">
+              <a:effectLst>
+                <a:glow rad="38100">
+                  <a:prstClr val="black">
+                    <a:lumMod val="65000"/>
+                    <a:lumOff val="35000"/>
+                    <a:alpha val="40000"/>
+                  </a:prstClr>
+                </a:glow>
+                <a:outerShdw blurRad="28575" dist="38100" dir="14040000" algn="tl" rotWithShape="0">
+                  <a:srgbClr val="000000">
+                    <a:alpha val="25000"/>
+                  </a:srgbClr>
+                </a:outerShdw>
+              </a:effectLst>
+            </a:endParaRPr>
+          </a:p>
+        </p:txBody>
+      </p:sp>
+      <p:sp>
+        <p:nvSpPr>
+          <p:cNvPr id="3" name="TextBox 2">
+            <a:extLst>
+              <a:ext uri="{FF2B5EF4-FFF2-40B4-BE49-F238E27FC236}">
+                <a16:creationId xmlns:a16="http://schemas.microsoft.com/office/drawing/2014/main" id="{E61DBC47-78EB-4073-8B62-19078A06C703}"/>
+              </a:ext>
+            </a:extLst>
+          </p:cNvPr>
+          <p:cNvSpPr txBox="1"/>
+          <p:nvPr/>
+        </p:nvSpPr>
+        <p:spPr>
+          <a:xfrm>
+            <a:off x="430306" y="1299882"/>
+            <a:ext cx="8462682" cy="830997"/>
+          </a:xfrm>
+          <a:prstGeom prst="rect">
+            <a:avLst/>
+          </a:prstGeom>
+          <a:noFill/>
+        </p:spPr>
+        <p:txBody>
+          <a:bodyPr rot="0" spcFirstLastPara="0" vertOverflow="overflow" horzOverflow="overflow" vert="horz" wrap="square" lIns="91440" tIns="45720" rIns="91440" bIns="45720" numCol="1" spcCol="0" rtlCol="0" fromWordArt="0" anchor="t" anchorCtr="0" forceAA="0" compatLnSpc="1">
+            <a:prstTxWarp prst="textNoShape">
+              <a:avLst/>
+            </a:prstTxWarp>
+            <a:spAutoFit/>
+          </a:bodyPr>
+          <a:lstStyle/>
+          <a:p>
+            <a:pPr marL="342900" indent="-342900" algn="just">
+              <a:buFont typeface="Arial,Sans-Serif"/>
+              <a:buChar char="•"/>
+            </a:pPr>
+            <a:r>
+              <a:rPr lang="en-US" sz="2400" dirty="0">
+                <a:ea typeface="+mn-lt"/>
+                <a:cs typeface="+mn-lt"/>
+              </a:rPr>
+              <a:t>Code changes in the debugger won't persist upon page reload, so we'll be working in Visual Studio</a:t>
+            </a:r>
+          </a:p>
+        </p:txBody>
+      </p:sp>
+      <p:sp>
+        <p:nvSpPr>
+          <p:cNvPr id="7" name="TextBox 6">
+            <a:extLst>
+              <a:ext uri="{FF2B5EF4-FFF2-40B4-BE49-F238E27FC236}">
+                <a16:creationId xmlns:a16="http://schemas.microsoft.com/office/drawing/2014/main" id="{DD11F90E-CBD9-49B2-973F-F71F218380B3}"/>
+              </a:ext>
+            </a:extLst>
+          </p:cNvPr>
+          <p:cNvSpPr txBox="1"/>
+          <p:nvPr/>
+        </p:nvSpPr>
+        <p:spPr>
+          <a:xfrm>
+            <a:off x="428624" y="4373095"/>
+            <a:ext cx="8014447" cy="461665"/>
+          </a:xfrm>
+          <a:prstGeom prst="rect">
+            <a:avLst/>
+          </a:prstGeom>
+          <a:noFill/>
+        </p:spPr>
+        <p:txBody>
+          <a:bodyPr rot="0" spcFirstLastPara="0" vertOverflow="overflow" horzOverflow="overflow" vert="horz" wrap="square" lIns="91440" tIns="45720" rIns="91440" bIns="45720" numCol="1" spcCol="0" rtlCol="0" fromWordArt="0" anchor="t" anchorCtr="0" forceAA="0" compatLnSpc="1">
+            <a:prstTxWarp prst="textNoShape">
+              <a:avLst/>
+            </a:prstTxWarp>
+            <a:spAutoFit/>
+          </a:bodyPr>
+          <a:lstStyle/>
+          <a:p>
+            <a:pPr marL="285750" indent="-285750">
+              <a:buFont typeface="Arial"/>
+              <a:buChar char="•"/>
+            </a:pPr>
+            <a:r>
+              <a:rPr lang="en-US" sz="2400" b="1" dirty="0"/>
+              <a:t>Try the exercises in the_basics.js now</a:t>
+            </a:r>
+          </a:p>
+        </p:txBody>
+      </p:sp>
+      <p:sp>
+        <p:nvSpPr>
+          <p:cNvPr id="5" name="TextBox 4">
+            <a:extLst>
+              <a:ext uri="{FF2B5EF4-FFF2-40B4-BE49-F238E27FC236}">
+                <a16:creationId xmlns:a16="http://schemas.microsoft.com/office/drawing/2014/main" id="{B2432976-82BB-437F-B119-134DD09CB02D}"/>
+              </a:ext>
+            </a:extLst>
+          </p:cNvPr>
+          <p:cNvSpPr txBox="1"/>
+          <p:nvPr/>
+        </p:nvSpPr>
+        <p:spPr>
+          <a:xfrm>
+            <a:off x="430306" y="2608729"/>
+            <a:ext cx="8462682" cy="1200329"/>
+          </a:xfrm>
+          <a:prstGeom prst="rect">
+            <a:avLst/>
+          </a:prstGeom>
+          <a:noFill/>
+        </p:spPr>
+        <p:txBody>
+          <a:bodyPr rot="0" spcFirstLastPara="0" vertOverflow="overflow" horzOverflow="overflow" vert="horz" wrap="square" lIns="91440" tIns="45720" rIns="91440" bIns="45720" numCol="1" spcCol="0" rtlCol="0" fromWordArt="0" anchor="t" anchorCtr="0" forceAA="0" compatLnSpc="1">
+            <a:prstTxWarp prst="textNoShape">
+              <a:avLst/>
+            </a:prstTxWarp>
+            <a:spAutoFit/>
+          </a:bodyPr>
+          <a:lstStyle/>
+          <a:p>
+            <a:pPr marL="285750" indent="-285750">
+              <a:buFont typeface="Arial"/>
+              <a:buChar char="•"/>
+            </a:pPr>
+            <a:r>
+              <a:rPr lang="en-US" sz="2400" dirty="0"/>
+              <a:t>Remember to save your changes in Visual Studio, then reload the HTML in Chrome (hit F5) to see them applied </a:t>
+            </a:r>
+            <a:endParaRPr lang="en-US"/>
+          </a:p>
+        </p:txBody>
+      </p:sp>
+      <p:sp>
+        <p:nvSpPr>
+          <p:cNvPr id="9" name="TextBox 8">
+            <a:extLst>
+              <a:ext uri="{FF2B5EF4-FFF2-40B4-BE49-F238E27FC236}">
+                <a16:creationId xmlns:a16="http://schemas.microsoft.com/office/drawing/2014/main" id="{3961B07A-D810-4BDD-AB40-D462755973AB}"/>
+              </a:ext>
+            </a:extLst>
+          </p:cNvPr>
+          <p:cNvSpPr txBox="1"/>
+          <p:nvPr/>
+        </p:nvSpPr>
+        <p:spPr>
+          <a:xfrm>
+            <a:off x="428625" y="5421966"/>
+            <a:ext cx="8014447" cy="830997"/>
+          </a:xfrm>
+          <a:prstGeom prst="rect">
+            <a:avLst/>
+          </a:prstGeom>
+          <a:noFill/>
+        </p:spPr>
+        <p:txBody>
+          <a:bodyPr rot="0" spcFirstLastPara="0" vertOverflow="overflow" horzOverflow="overflow" vert="horz" wrap="square" lIns="91440" tIns="45720" rIns="91440" bIns="45720" numCol="1" spcCol="0" rtlCol="0" fromWordArt="0" anchor="t" anchorCtr="0" forceAA="0" compatLnSpc="1">
+            <a:prstTxWarp prst="textNoShape">
+              <a:avLst/>
+            </a:prstTxWarp>
+            <a:spAutoFit/>
+          </a:bodyPr>
+          <a:lstStyle/>
+          <a:p>
+            <a:pPr marL="285750" indent="-285750">
+              <a:buFont typeface="Arial"/>
+              <a:buChar char="•"/>
+            </a:pPr>
+            <a:r>
+              <a:rPr lang="en-US" sz="2400" dirty="0"/>
+              <a:t>There are solutions in the_basics_solution.js, but try the problems on your own first</a:t>
+            </a:r>
+          </a:p>
+        </p:txBody>
+      </p:sp>
+    </p:spTree>
+    <p:extLst>
+      <p:ext uri="{BB962C8B-B14F-4D97-AF65-F5344CB8AC3E}">
+        <p14:creationId xmlns:p14="http://schemas.microsoft.com/office/powerpoint/2010/main" val="3774311452"/>
+      </p:ext>
+    </p:extLst>
+  </p:cSld>
+  <p:clrMapOvr>
+    <a:masterClrMapping/>
+  </p:clrMapOvr>
+  <p:timing>
+    <p:tnLst>
+      <p:par>
+        <p:cTn id="1" dur="indefinite" restart="never" nodeType="tmRoot">
+          <p:childTnLst>
+            <p:seq concurrent="1" nextAc="seek">
+              <p:cTn id="2" dur="indefinite" nodeType="mainSeq">
+                <p:childTnLst>
+                  <p:par>
+                    <p:cTn id="3" fill="hold">
+                      <p:stCondLst>
+                        <p:cond delay="indefinite"/>
+                      </p:stCondLst>
+                      <p:childTnLst>
+                        <p:par>
+                          <p:cTn id="4" fill="hold">
+                            <p:stCondLst>
+                              <p:cond delay="0"/>
+                            </p:stCondLst>
+                            <p:childTnLst>
+                              <p:par>
+                                <p:cTn id="5" presetID="10" presetClass="entr" presetSubtype="0" fill="hold" grpId="0" nodeType="clickEffect">
+                                  <p:stCondLst>
+                                    <p:cond delay="0"/>
+                                  </p:stCondLst>
+                                  <p:childTnLst>
+                                    <p:set>
+                                      <p:cBhvr>
+                                        <p:cTn id="6" dur="1" fill="hold">
+                                          <p:stCondLst>
+                                            <p:cond delay="0"/>
+                                          </p:stCondLst>
+                                        </p:cTn>
+                                        <p:tgtEl>
+                                          <p:spTgt spid="5"/>
+                                        </p:tgtEl>
+                                        <p:attrNameLst>
+                                          <p:attrName>style.visibility</p:attrName>
+                                        </p:attrNameLst>
+                                      </p:cBhvr>
+                                      <p:to>
+                                        <p:strVal val="visible"/>
+                                      </p:to>
+                                    </p:set>
+                                    <p:animEffect transition="in" filter="fade">
+                                      <p:cBhvr>
+                                        <p:cTn id="7" dur="500"/>
+                                        <p:tgtEl>
+                                          <p:spTgt spid="5"/>
+                                        </p:tgtEl>
+                                      </p:cBhvr>
+                                    </p:animEffect>
+                                  </p:childTnLst>
+                                </p:cTn>
+                              </p:par>
+                            </p:childTnLst>
+                          </p:cTn>
+                        </p:par>
+                      </p:childTnLst>
+                    </p:cTn>
+                  </p:par>
+                  <p:par>
+                    <p:cTn id="8" fill="hold">
+                      <p:stCondLst>
+                        <p:cond delay="indefinite"/>
+                      </p:stCondLst>
+                      <p:childTnLst>
+                        <p:par>
+                          <p:cTn id="9" fill="hold">
+                            <p:stCondLst>
+                              <p:cond delay="0"/>
+                            </p:stCondLst>
+                            <p:childTnLst>
+                              <p:par>
+                                <p:cTn id="10" presetID="10" presetClass="entr" presetSubtype="0" fill="hold" grpId="0" nodeType="clickEffect">
+                                  <p:stCondLst>
+                                    <p:cond delay="0"/>
+                                  </p:stCondLst>
+                                  <p:childTnLst>
+                                    <p:set>
+                                      <p:cBhvr>
+                                        <p:cTn id="11" dur="1" fill="hold">
+                                          <p:stCondLst>
+                                            <p:cond delay="0"/>
+                                          </p:stCondLst>
+                                        </p:cTn>
+                                        <p:tgtEl>
+                                          <p:spTgt spid="7"/>
+                                        </p:tgtEl>
+                                        <p:attrNameLst>
+                                          <p:attrName>style.visibility</p:attrName>
+                                        </p:attrNameLst>
+                                      </p:cBhvr>
+                                      <p:to>
+                                        <p:strVal val="visible"/>
+                                      </p:to>
+                                    </p:set>
+                                    <p:animEffect transition="in" filter="fade">
+                                      <p:cBhvr>
+                                        <p:cTn id="12" dur="500"/>
+                                        <p:tgtEl>
+                                          <p:spTgt spid="7"/>
+                                        </p:tgtEl>
+                                      </p:cBhvr>
+                                    </p:animEffect>
+                                  </p:childTnLst>
+                                </p:cTn>
+                              </p:par>
+                            </p:childTnLst>
+                          </p:cTn>
+                        </p:par>
+                      </p:childTnLst>
+                    </p:cTn>
+                  </p:par>
+                  <p:par>
+                    <p:cTn id="13" fill="hold">
+                      <p:stCondLst>
+                        <p:cond delay="indefinite"/>
+                      </p:stCondLst>
+                      <p:childTnLst>
+                        <p:par>
+                          <p:cTn id="14" fill="hold">
+                            <p:stCondLst>
+                              <p:cond delay="0"/>
+                            </p:stCondLst>
+                            <p:childTnLst>
+                              <p:par>
+                                <p:cTn id="15" presetID="10" presetClass="entr" presetSubtype="0" fill="hold" grpId="0" nodeType="clickEffect">
+                                  <p:stCondLst>
+                                    <p:cond delay="0"/>
+                                  </p:stCondLst>
+                                  <p:childTnLst>
+                                    <p:set>
+                                      <p:cBhvr>
+                                        <p:cTn id="16" dur="1" fill="hold">
+                                          <p:stCondLst>
+                                            <p:cond delay="0"/>
+                                          </p:stCondLst>
+                                        </p:cTn>
+                                        <p:tgtEl>
+                                          <p:spTgt spid="9"/>
+                                        </p:tgtEl>
+                                        <p:attrNameLst>
+                                          <p:attrName>style.visibility</p:attrName>
+                                        </p:attrNameLst>
+                                      </p:cBhvr>
+                                      <p:to>
+                                        <p:strVal val="visible"/>
+                                      </p:to>
+                                    </p:set>
+                                    <p:animEffect transition="in" filter="fade">
+                                      <p:cBhvr>
+                                        <p:cTn id="17" dur="500"/>
+                                        <p:tgtEl>
+                                          <p:spTgt spid="9"/>
+                                        </p:tgtEl>
+                                      </p:cBhvr>
+                                    </p:animEffect>
+                                  </p:childTnLst>
+                                </p:cTn>
+                              </p:par>
+                            </p:childTnLst>
+                          </p:cTn>
+                        </p:par>
+                      </p:childTnLst>
+                    </p:cTn>
+                  </p:par>
+                </p:childTnLst>
+              </p:cTn>
+              <p:prevCondLst>
+                <p:cond evt="onPrev" delay="0">
+                  <p:tgtEl>
+                    <p:sldTgt/>
+                  </p:tgtEl>
+                </p:cond>
+              </p:prevCondLst>
+              <p:nextCondLst>
+                <p:cond evt="onNext" delay="0">
+                  <p:tgtEl>
+                    <p:sldTgt/>
+                  </p:tgtEl>
+                </p:cond>
+              </p:nextCondLst>
+            </p:seq>
+          </p:childTnLst>
+        </p:cTn>
+      </p:par>
+    </p:tnLst>
+    <p:bldLst>
+      <p:bldP spid="7" grpId="0"/>
+      <p:bldP spid="5" grpId="0"/>
+      <p:bldP spid="9" grpId="0"/>
+    </p:bldLst>
+  </p:timing>
+</p:sld>
+</file>
+
+<file path=ppt/slides/slide41.xml><?xml version="1.0" encoding="utf-8"?>
+<p:sld xmlns:a="http://schemas.openxmlformats.org/drawingml/2006/main" xmlns:r="http://schemas.openxmlformats.org/officeDocument/2006/relationships" xmlns:p="http://schemas.openxmlformats.org/presentationml/2006/main">
+  <p:cSld>
+    <p:spTree>
+      <p:nvGrpSpPr>
+        <p:cNvPr id="1" name=""/>
+        <p:cNvGrpSpPr/>
+        <p:nvPr/>
+      </p:nvGrpSpPr>
+      <p:grpSpPr>
+        <a:xfrm>
+          <a:off x="0" y="0"/>
+          <a:ext cx="0" cy="0"/>
+          <a:chOff x="0" y="0"/>
+          <a:chExt cx="0" cy="0"/>
+        </a:xfrm>
+      </p:grpSpPr>
+      <p:sp>
+        <p:nvSpPr>
+          <p:cNvPr id="2" name="Title 1">
+            <a:extLst>
+              <a:ext uri="{FF2B5EF4-FFF2-40B4-BE49-F238E27FC236}">
+                <a16:creationId xmlns:a16="http://schemas.microsoft.com/office/drawing/2014/main" id="{E79991AE-7CE8-4405-AD5B-B465CD58A633}"/>
+              </a:ext>
+            </a:extLst>
+          </p:cNvPr>
+          <p:cNvSpPr>
+            <a:spLocks noGrp="1"/>
+          </p:cNvSpPr>
+          <p:nvPr>
+            <p:ph type="title"/>
+          </p:nvPr>
+        </p:nvSpPr>
+        <p:spPr>
+          <a:xfrm>
+            <a:off x="-2635694" y="-373001"/>
+            <a:ext cx="7511473" cy="1312480"/>
+          </a:xfrm>
+        </p:spPr>
+        <p:txBody>
+          <a:bodyPr>
+            <a:normAutofit/>
+          </a:bodyPr>
+          <a:lstStyle/>
+          <a:p>
+            <a:pPr algn="ctr"/>
+            <a:r>
+              <a:rPr lang="en-US" sz="3200"/>
+              <a:t>NOTE TO US</a:t>
+            </a:r>
+            <a:endParaRPr lang="en-US"/>
+          </a:p>
+        </p:txBody>
+      </p:sp>
+      <p:sp>
+        <p:nvSpPr>
+          <p:cNvPr id="3" name="Content Placeholder 2">
+            <a:extLst>
+              <a:ext uri="{FF2B5EF4-FFF2-40B4-BE49-F238E27FC236}">
+                <a16:creationId xmlns:a16="http://schemas.microsoft.com/office/drawing/2014/main" id="{AF8D3678-114A-4DF5-8D81-1D3A1BA02B55}"/>
+              </a:ext>
+            </a:extLst>
+          </p:cNvPr>
+          <p:cNvSpPr>
+            <a:spLocks noGrp="1"/>
+          </p:cNvSpPr>
+          <p:nvPr>
+            <p:ph idx="1"/>
+          </p:nvPr>
+        </p:nvSpPr>
+        <p:spPr>
+          <a:xfrm>
+            <a:off x="2431742" y="-31481"/>
+            <a:ext cx="6711654" cy="6827373"/>
+          </a:xfrm>
+        </p:spPr>
+        <p:txBody>
+          <a:bodyPr vert="horz" lIns="91440" tIns="45720" rIns="91440" bIns="45720" rtlCol="0" anchor="t">
+            <a:noAutofit/>
+          </a:bodyPr>
+          <a:lstStyle/>
+          <a:p>
+            <a:pPr marL="0" indent="0">
+              <a:buNone/>
+            </a:pPr>
+            <a:r>
+              <a:rPr lang="en-US" sz="2800" dirty="0">
+                <a:ea typeface="+mj-lt"/>
+                <a:cs typeface="+mj-lt"/>
+              </a:rPr>
+              <a:t>Cover the following on w3schools before moving to the 'MORE </a:t>
+            </a:r>
+            <a:r>
+              <a:rPr lang="en-US" sz="2800">
+                <a:ea typeface="+mj-lt"/>
+                <a:cs typeface="+mj-lt"/>
+              </a:rPr>
+              <a:t>BASICS' slide that follows!</a:t>
+            </a:r>
+            <a:endParaRPr lang="en-US">
+              <a:effectLst>
+                <a:glow rad="38100">
+                  <a:prstClr val="black">
+                    <a:lumMod val="50000"/>
+                    <a:lumOff val="50000"/>
+                    <a:alpha val="20000"/>
+                  </a:prstClr>
+                </a:glow>
+                <a:outerShdw blurRad="44450" dist="12700" dir="13860000" algn="tl" rotWithShape="0">
+                  <a:srgbClr val="000000">
+                    <a:alpha val="20000"/>
+                  </a:srgbClr>
+                </a:outerShdw>
+              </a:effectLst>
+              <a:ea typeface="+mj-lt"/>
+              <a:cs typeface="+mj-lt"/>
+            </a:endParaRPr>
+          </a:p>
+          <a:p>
+            <a:pPr>
+              <a:buNone/>
+            </a:pPr>
+            <a:r>
+              <a:rPr lang="en-US" sz="900">
+                <a:effectLst>
+                  <a:glow rad="38100">
+                    <a:prstClr val="black">
+                      <a:lumMod val="50000"/>
+                      <a:lumOff val="50000"/>
+                      <a:alpha val="20000"/>
+                    </a:prstClr>
+                  </a:glow>
+                  <a:outerShdw blurRad="44450" dist="12700" dir="13860000" algn="tl" rotWithShape="0">
+                    <a:srgbClr val="000000">
+                      <a:alpha val="20000"/>
+                    </a:srgbClr>
+                  </a:outerShdw>
+                </a:effectLst>
+                <a:ea typeface="+mn-lt"/>
+                <a:cs typeface="+mn-lt"/>
+              </a:rPr>
+              <a:t>//JS String Methods</a:t>
+            </a:r>
+            <a:endParaRPr lang="en-US" sz="1100">
+              <a:effectLst>
+                <a:glow rad="38100">
+                  <a:prstClr val="black">
+                    <a:lumMod val="50000"/>
+                    <a:lumOff val="50000"/>
+                    <a:alpha val="20000"/>
+                  </a:prstClr>
+                </a:glow>
+                <a:outerShdw blurRad="44450" dist="12700" dir="13860000" algn="tl" rotWithShape="0">
+                  <a:srgbClr val="000000">
+                    <a:alpha val="20000"/>
+                  </a:srgbClr>
+                </a:outerShdw>
+              </a:effectLst>
+            </a:endParaRPr>
+          </a:p>
+          <a:p>
+            <a:pPr>
+              <a:buNone/>
+            </a:pPr>
+            <a:r>
+              <a:rPr lang="en-US" sz="900">
+                <a:effectLst>
+                  <a:glow rad="38100">
+                    <a:prstClr val="black">
+                      <a:lumMod val="50000"/>
+                      <a:lumOff val="50000"/>
+                      <a:alpha val="20000"/>
+                    </a:prstClr>
+                  </a:glow>
+                  <a:outerShdw blurRad="44450" dist="12700" dir="13860000" algn="tl" rotWithShape="0">
+                    <a:srgbClr val="000000">
+                      <a:alpha val="20000"/>
+                    </a:srgbClr>
+                  </a:outerShdw>
+                </a:effectLst>
+                <a:ea typeface="+mn-lt"/>
+                <a:cs typeface="+mn-lt"/>
+              </a:rPr>
+              <a:t>//JS Numbers</a:t>
+            </a:r>
+            <a:endParaRPr lang="en-US" sz="1100">
+              <a:effectLst>
+                <a:glow rad="38100">
+                  <a:prstClr val="black">
+                    <a:lumMod val="50000"/>
+                    <a:lumOff val="50000"/>
+                    <a:alpha val="20000"/>
+                  </a:prstClr>
+                </a:glow>
+                <a:outerShdw blurRad="44450" dist="12700" dir="13860000" algn="tl" rotWithShape="0">
+                  <a:srgbClr val="000000">
+                    <a:alpha val="20000"/>
+                  </a:srgbClr>
+                </a:outerShdw>
+              </a:effectLst>
+            </a:endParaRPr>
+          </a:p>
+          <a:p>
+            <a:pPr>
+              <a:buNone/>
+            </a:pPr>
+            <a:r>
+              <a:rPr lang="en-US" sz="900">
+                <a:effectLst>
+                  <a:glow rad="38100">
+                    <a:prstClr val="black">
+                      <a:lumMod val="50000"/>
+                      <a:lumOff val="50000"/>
+                      <a:alpha val="20000"/>
+                    </a:prstClr>
+                  </a:glow>
+                  <a:outerShdw blurRad="44450" dist="12700" dir="13860000" algn="tl" rotWithShape="0">
+                    <a:srgbClr val="000000">
+                      <a:alpha val="20000"/>
+                    </a:srgbClr>
+                  </a:outerShdw>
+                </a:effectLst>
+                <a:ea typeface="+mn-lt"/>
+                <a:cs typeface="+mn-lt"/>
+              </a:rPr>
+              <a:t>//JS Number Methods</a:t>
+            </a:r>
+            <a:endParaRPr lang="en-US" sz="1100">
+              <a:effectLst>
+                <a:glow rad="38100">
+                  <a:prstClr val="black">
+                    <a:lumMod val="50000"/>
+                    <a:lumOff val="50000"/>
+                    <a:alpha val="20000"/>
+                  </a:prstClr>
+                </a:glow>
+                <a:outerShdw blurRad="44450" dist="12700" dir="13860000" algn="tl" rotWithShape="0">
+                  <a:srgbClr val="000000">
+                    <a:alpha val="20000"/>
+                  </a:srgbClr>
+                </a:outerShdw>
+              </a:effectLst>
+            </a:endParaRPr>
+          </a:p>
+          <a:p>
+            <a:pPr>
+              <a:buNone/>
+            </a:pPr>
+            <a:r>
+              <a:rPr lang="en-US" sz="900">
+                <a:effectLst>
+                  <a:glow rad="38100">
+                    <a:prstClr val="black">
+                      <a:lumMod val="50000"/>
+                      <a:lumOff val="50000"/>
+                      <a:alpha val="20000"/>
+                    </a:prstClr>
+                  </a:glow>
+                  <a:outerShdw blurRad="44450" dist="12700" dir="13860000" algn="tl" rotWithShape="0">
+                    <a:srgbClr val="000000">
+                      <a:alpha val="20000"/>
+                    </a:srgbClr>
+                  </a:outerShdw>
+                </a:effectLst>
+                <a:ea typeface="+mn-lt"/>
+                <a:cs typeface="+mn-lt"/>
+              </a:rPr>
+              <a:t>//JS Arrays</a:t>
+            </a:r>
+            <a:endParaRPr lang="en-US" sz="1100">
+              <a:effectLst>
+                <a:glow rad="38100">
+                  <a:prstClr val="black">
+                    <a:lumMod val="50000"/>
+                    <a:lumOff val="50000"/>
+                    <a:alpha val="20000"/>
+                  </a:prstClr>
+                </a:glow>
+                <a:outerShdw blurRad="44450" dist="12700" dir="13860000" algn="tl" rotWithShape="0">
+                  <a:srgbClr val="000000">
+                    <a:alpha val="20000"/>
+                  </a:srgbClr>
+                </a:outerShdw>
+              </a:effectLst>
+            </a:endParaRPr>
+          </a:p>
+          <a:p>
+            <a:pPr>
+              <a:buNone/>
+            </a:pPr>
+            <a:r>
+              <a:rPr lang="en-US" sz="900">
+                <a:effectLst>
+                  <a:glow rad="38100">
+                    <a:prstClr val="black">
+                      <a:lumMod val="50000"/>
+                      <a:lumOff val="50000"/>
+                      <a:alpha val="20000"/>
+                    </a:prstClr>
+                  </a:glow>
+                  <a:outerShdw blurRad="44450" dist="12700" dir="13860000" algn="tl" rotWithShape="0">
+                    <a:srgbClr val="000000">
+                      <a:alpha val="20000"/>
+                    </a:srgbClr>
+                  </a:outerShdw>
+                </a:effectLst>
+                <a:ea typeface="+mn-lt"/>
+                <a:cs typeface="+mn-lt"/>
+              </a:rPr>
+              <a:t>//JS Array Methods</a:t>
+            </a:r>
+            <a:endParaRPr lang="en-US" sz="1100">
+              <a:effectLst>
+                <a:glow rad="38100">
+                  <a:prstClr val="black">
+                    <a:lumMod val="50000"/>
+                    <a:lumOff val="50000"/>
+                    <a:alpha val="20000"/>
+                  </a:prstClr>
+                </a:glow>
+                <a:outerShdw blurRad="44450" dist="12700" dir="13860000" algn="tl" rotWithShape="0">
+                  <a:srgbClr val="000000">
+                    <a:alpha val="20000"/>
+                  </a:srgbClr>
+                </a:outerShdw>
+              </a:effectLst>
+            </a:endParaRPr>
+          </a:p>
+          <a:p>
+            <a:pPr>
+              <a:buNone/>
+            </a:pPr>
+            <a:r>
+              <a:rPr lang="en-US" sz="900">
+                <a:effectLst>
+                  <a:glow rad="38100">
+                    <a:prstClr val="black">
+                      <a:lumMod val="50000"/>
+                      <a:lumOff val="50000"/>
+                      <a:alpha val="20000"/>
+                    </a:prstClr>
+                  </a:glow>
+                  <a:outerShdw blurRad="44450" dist="12700" dir="13860000" algn="tl" rotWithShape="0">
+                    <a:srgbClr val="000000">
+                      <a:alpha val="20000"/>
+                    </a:srgbClr>
+                  </a:outerShdw>
+                </a:effectLst>
+                <a:ea typeface="+mn-lt"/>
+                <a:cs typeface="+mn-lt"/>
+              </a:rPr>
+              <a:t>//JS Array Sort</a:t>
+            </a:r>
+            <a:endParaRPr lang="en-US" sz="1100">
+              <a:effectLst>
+                <a:glow rad="38100">
+                  <a:prstClr val="black">
+                    <a:lumMod val="50000"/>
+                    <a:lumOff val="50000"/>
+                    <a:alpha val="20000"/>
+                  </a:prstClr>
+                </a:glow>
+                <a:outerShdw blurRad="44450" dist="12700" dir="13860000" algn="tl" rotWithShape="0">
+                  <a:srgbClr val="000000">
+                    <a:alpha val="20000"/>
+                  </a:srgbClr>
+                </a:outerShdw>
+              </a:effectLst>
+            </a:endParaRPr>
+          </a:p>
+          <a:p>
+            <a:pPr>
+              <a:buNone/>
+            </a:pPr>
+            <a:r>
+              <a:rPr lang="en-US" sz="900">
+                <a:effectLst>
+                  <a:glow rad="38100">
+                    <a:prstClr val="black">
+                      <a:lumMod val="50000"/>
+                      <a:lumOff val="50000"/>
+                      <a:alpha val="20000"/>
+                    </a:prstClr>
+                  </a:glow>
+                  <a:outerShdw blurRad="44450" dist="12700" dir="13860000" algn="tl" rotWithShape="0">
+                    <a:srgbClr val="000000">
+                      <a:alpha val="20000"/>
+                    </a:srgbClr>
+                  </a:outerShdw>
+                </a:effectLst>
+                <a:ea typeface="+mn-lt"/>
+                <a:cs typeface="+mn-lt"/>
+              </a:rPr>
+              <a:t>//JS Dates</a:t>
+            </a:r>
+            <a:endParaRPr lang="en-US" sz="1100">
+              <a:effectLst>
+                <a:glow rad="38100">
+                  <a:prstClr val="black">
+                    <a:lumMod val="50000"/>
+                    <a:lumOff val="50000"/>
+                    <a:alpha val="20000"/>
+                  </a:prstClr>
+                </a:glow>
+                <a:outerShdw blurRad="44450" dist="12700" dir="13860000" algn="tl" rotWithShape="0">
+                  <a:srgbClr val="000000">
+                    <a:alpha val="20000"/>
+                  </a:srgbClr>
+                </a:outerShdw>
+              </a:effectLst>
+            </a:endParaRPr>
+          </a:p>
+          <a:p>
+            <a:pPr>
+              <a:buNone/>
+            </a:pPr>
+            <a:r>
+              <a:rPr lang="en-US" sz="900">
+                <a:effectLst>
+                  <a:glow rad="38100">
+                    <a:prstClr val="black">
+                      <a:lumMod val="50000"/>
+                      <a:lumOff val="50000"/>
+                      <a:alpha val="20000"/>
+                    </a:prstClr>
+                  </a:glow>
+                  <a:outerShdw blurRad="44450" dist="12700" dir="13860000" algn="tl" rotWithShape="0">
+                    <a:srgbClr val="000000">
+                      <a:alpha val="20000"/>
+                    </a:srgbClr>
+                  </a:outerShdw>
+                </a:effectLst>
+                <a:ea typeface="+mn-lt"/>
+                <a:cs typeface="+mn-lt"/>
+              </a:rPr>
+              <a:t>//JS Date Formats</a:t>
+            </a:r>
+            <a:endParaRPr lang="en-US" sz="1100">
+              <a:effectLst>
+                <a:glow rad="38100">
+                  <a:prstClr val="black">
+                    <a:lumMod val="50000"/>
+                    <a:lumOff val="50000"/>
+                    <a:alpha val="20000"/>
+                  </a:prstClr>
+                </a:glow>
+                <a:outerShdw blurRad="44450" dist="12700" dir="13860000" algn="tl" rotWithShape="0">
+                  <a:srgbClr val="000000">
+                    <a:alpha val="20000"/>
+                  </a:srgbClr>
+                </a:outerShdw>
+              </a:effectLst>
+            </a:endParaRPr>
+          </a:p>
+          <a:p>
+            <a:pPr>
+              <a:buNone/>
+            </a:pPr>
+            <a:r>
+              <a:rPr lang="en-US" sz="900">
+                <a:effectLst>
+                  <a:glow rad="38100">
+                    <a:prstClr val="black">
+                      <a:lumMod val="50000"/>
+                      <a:lumOff val="50000"/>
+                      <a:alpha val="20000"/>
+                    </a:prstClr>
+                  </a:glow>
+                  <a:outerShdw blurRad="44450" dist="12700" dir="13860000" algn="tl" rotWithShape="0">
+                    <a:srgbClr val="000000">
+                      <a:alpha val="20000"/>
+                    </a:srgbClr>
+                  </a:outerShdw>
+                </a:effectLst>
+                <a:ea typeface="+mn-lt"/>
+                <a:cs typeface="+mn-lt"/>
+              </a:rPr>
+              <a:t>//JS Date Get Methods</a:t>
+            </a:r>
+            <a:endParaRPr lang="en-US" sz="1100">
+              <a:effectLst>
+                <a:glow rad="38100">
+                  <a:prstClr val="black">
+                    <a:lumMod val="50000"/>
+                    <a:lumOff val="50000"/>
+                    <a:alpha val="20000"/>
+                  </a:prstClr>
+                </a:glow>
+                <a:outerShdw blurRad="44450" dist="12700" dir="13860000" algn="tl" rotWithShape="0">
+                  <a:srgbClr val="000000">
+                    <a:alpha val="20000"/>
+                  </a:srgbClr>
+                </a:outerShdw>
+              </a:effectLst>
+            </a:endParaRPr>
+          </a:p>
+          <a:p>
+            <a:pPr>
+              <a:buNone/>
+            </a:pPr>
+            <a:r>
+              <a:rPr lang="en-US" sz="900">
+                <a:effectLst>
+                  <a:glow rad="38100">
+                    <a:prstClr val="black">
+                      <a:lumMod val="50000"/>
+                      <a:lumOff val="50000"/>
+                      <a:alpha val="20000"/>
+                    </a:prstClr>
+                  </a:glow>
+                  <a:outerShdw blurRad="44450" dist="12700" dir="13860000" algn="tl" rotWithShape="0">
+                    <a:srgbClr val="000000">
+                      <a:alpha val="20000"/>
+                    </a:srgbClr>
+                  </a:outerShdw>
+                </a:effectLst>
+                <a:ea typeface="+mn-lt"/>
+                <a:cs typeface="+mn-lt"/>
+              </a:rPr>
+              <a:t>//JS Date Set Methods</a:t>
+            </a:r>
+            <a:endParaRPr lang="en-US" sz="1100">
+              <a:effectLst>
+                <a:glow rad="38100">
+                  <a:prstClr val="black">
+                    <a:lumMod val="50000"/>
+                    <a:lumOff val="50000"/>
+                    <a:alpha val="20000"/>
+                  </a:prstClr>
+                </a:glow>
+                <a:outerShdw blurRad="44450" dist="12700" dir="13860000" algn="tl" rotWithShape="0">
+                  <a:srgbClr val="000000">
+                    <a:alpha val="20000"/>
+                  </a:srgbClr>
+                </a:outerShdw>
+              </a:effectLst>
+            </a:endParaRPr>
+          </a:p>
+          <a:p>
+            <a:pPr>
+              <a:buNone/>
+            </a:pPr>
+            <a:r>
+              <a:rPr lang="en-US" sz="900">
+                <a:effectLst>
+                  <a:glow rad="38100">
+                    <a:prstClr val="black">
+                      <a:lumMod val="50000"/>
+                      <a:lumOff val="50000"/>
+                      <a:alpha val="20000"/>
+                    </a:prstClr>
+                  </a:glow>
+                  <a:outerShdw blurRad="44450" dist="12700" dir="13860000" algn="tl" rotWithShape="0">
+                    <a:srgbClr val="000000">
+                      <a:alpha val="20000"/>
+                    </a:srgbClr>
+                  </a:outerShdw>
+                </a:effectLst>
+                <a:ea typeface="+mn-lt"/>
+                <a:cs typeface="+mn-lt"/>
+              </a:rPr>
+              <a:t>//JS Math</a:t>
+            </a:r>
+            <a:endParaRPr lang="en-US" sz="1100">
+              <a:effectLst>
+                <a:glow rad="38100">
+                  <a:prstClr val="black">
+                    <a:lumMod val="50000"/>
+                    <a:lumOff val="50000"/>
+                    <a:alpha val="20000"/>
+                  </a:prstClr>
+                </a:glow>
+                <a:outerShdw blurRad="44450" dist="12700" dir="13860000" algn="tl" rotWithShape="0">
+                  <a:srgbClr val="000000">
+                    <a:alpha val="20000"/>
+                  </a:srgbClr>
+                </a:outerShdw>
+              </a:effectLst>
+            </a:endParaRPr>
+          </a:p>
+          <a:p>
+            <a:pPr>
+              <a:buNone/>
+            </a:pPr>
+            <a:r>
+              <a:rPr lang="en-US" sz="900">
+                <a:effectLst>
+                  <a:glow rad="38100">
+                    <a:prstClr val="black">
+                      <a:lumMod val="50000"/>
+                      <a:lumOff val="50000"/>
+                      <a:alpha val="20000"/>
+                    </a:prstClr>
+                  </a:glow>
+                  <a:outerShdw blurRad="44450" dist="12700" dir="13860000" algn="tl" rotWithShape="0">
+                    <a:srgbClr val="000000">
+                      <a:alpha val="20000"/>
+                    </a:srgbClr>
+                  </a:outerShdw>
+                </a:effectLst>
+                <a:ea typeface="+mn-lt"/>
+                <a:cs typeface="+mn-lt"/>
+              </a:rPr>
+              <a:t>//JS Random</a:t>
+            </a:r>
+            <a:endParaRPr lang="en-US" sz="1100">
+              <a:effectLst>
+                <a:glow rad="38100">
+                  <a:prstClr val="black">
+                    <a:lumMod val="50000"/>
+                    <a:lumOff val="50000"/>
+                    <a:alpha val="20000"/>
+                  </a:prstClr>
+                </a:glow>
+                <a:outerShdw blurRad="44450" dist="12700" dir="13860000" algn="tl" rotWithShape="0">
+                  <a:srgbClr val="000000">
+                    <a:alpha val="20000"/>
+                  </a:srgbClr>
+                </a:outerShdw>
+              </a:effectLst>
+            </a:endParaRPr>
+          </a:p>
+          <a:p>
+            <a:pPr>
+              <a:buNone/>
+            </a:pPr>
+            <a:r>
+              <a:rPr lang="en-US" sz="900">
+                <a:effectLst>
+                  <a:glow rad="38100">
+                    <a:prstClr val="black">
+                      <a:lumMod val="50000"/>
+                      <a:lumOff val="50000"/>
+                      <a:alpha val="20000"/>
+                    </a:prstClr>
+                  </a:glow>
+                  <a:outerShdw blurRad="44450" dist="12700" dir="13860000" algn="tl" rotWithShape="0">
+                    <a:srgbClr val="000000">
+                      <a:alpha val="20000"/>
+                    </a:srgbClr>
+                  </a:outerShdw>
+                </a:effectLst>
+                <a:ea typeface="+mn-lt"/>
+                <a:cs typeface="+mn-lt"/>
+              </a:rPr>
+              <a:t>//JS Booleans</a:t>
+            </a:r>
+            <a:endParaRPr lang="en-US" sz="1100">
+              <a:effectLst>
+                <a:glow rad="38100">
+                  <a:prstClr val="black">
+                    <a:lumMod val="50000"/>
+                    <a:lumOff val="50000"/>
+                    <a:alpha val="20000"/>
+                  </a:prstClr>
+                </a:glow>
+                <a:outerShdw blurRad="44450" dist="12700" dir="13860000" algn="tl" rotWithShape="0">
+                  <a:srgbClr val="000000">
+                    <a:alpha val="20000"/>
+                  </a:srgbClr>
+                </a:outerShdw>
+              </a:effectLst>
+            </a:endParaRPr>
+          </a:p>
+          <a:p>
+            <a:pPr>
+              <a:buNone/>
+            </a:pPr>
+            <a:r>
+              <a:rPr lang="en-US" sz="900">
+                <a:effectLst>
+                  <a:glow rad="38100">
+                    <a:prstClr val="black">
+                      <a:lumMod val="50000"/>
+                      <a:lumOff val="50000"/>
+                      <a:alpha val="20000"/>
+                    </a:prstClr>
+                  </a:glow>
+                  <a:outerShdw blurRad="44450" dist="12700" dir="13860000" algn="tl" rotWithShape="0">
+                    <a:srgbClr val="000000">
+                      <a:alpha val="20000"/>
+                    </a:srgbClr>
+                  </a:outerShdw>
+                </a:effectLst>
+                <a:ea typeface="+mn-lt"/>
+                <a:cs typeface="+mn-lt"/>
+              </a:rPr>
+              <a:t>//JS Comparisons</a:t>
+            </a:r>
+            <a:endParaRPr lang="en-US" sz="1100">
+              <a:effectLst>
+                <a:glow rad="38100">
+                  <a:prstClr val="black">
+                    <a:lumMod val="50000"/>
+                    <a:lumOff val="50000"/>
+                    <a:alpha val="20000"/>
+                  </a:prstClr>
+                </a:glow>
+                <a:outerShdw blurRad="44450" dist="12700" dir="13860000" algn="tl" rotWithShape="0">
+                  <a:srgbClr val="000000">
+                    <a:alpha val="20000"/>
+                  </a:srgbClr>
+                </a:outerShdw>
+              </a:effectLst>
+            </a:endParaRPr>
+          </a:p>
+          <a:p>
+            <a:pPr>
+              <a:buNone/>
+            </a:pPr>
+            <a:r>
+              <a:rPr lang="en-US" sz="900">
+                <a:effectLst>
+                  <a:glow rad="38100">
+                    <a:prstClr val="black">
+                      <a:lumMod val="50000"/>
+                      <a:lumOff val="50000"/>
+                      <a:alpha val="20000"/>
+                    </a:prstClr>
+                  </a:glow>
+                  <a:outerShdw blurRad="44450" dist="12700" dir="13860000" algn="tl" rotWithShape="0">
+                    <a:srgbClr val="000000">
+                      <a:alpha val="20000"/>
+                    </a:srgbClr>
+                  </a:outerShdw>
+                </a:effectLst>
+                <a:ea typeface="+mn-lt"/>
+                <a:cs typeface="+mn-lt"/>
+              </a:rPr>
+              <a:t>//JS Conditions</a:t>
+            </a:r>
+            <a:endParaRPr lang="en-US" sz="1100">
+              <a:effectLst>
+                <a:glow rad="38100">
+                  <a:prstClr val="black">
+                    <a:lumMod val="50000"/>
+                    <a:lumOff val="50000"/>
+                    <a:alpha val="20000"/>
+                  </a:prstClr>
+                </a:glow>
+                <a:outerShdw blurRad="44450" dist="12700" dir="13860000" algn="tl" rotWithShape="0">
+                  <a:srgbClr val="000000">
+                    <a:alpha val="20000"/>
+                  </a:srgbClr>
+                </a:outerShdw>
+              </a:effectLst>
+            </a:endParaRPr>
+          </a:p>
+          <a:p>
+            <a:pPr>
+              <a:buNone/>
+            </a:pPr>
+            <a:r>
+              <a:rPr lang="en-US" sz="900">
+                <a:effectLst>
+                  <a:glow rad="38100">
+                    <a:prstClr val="black">
+                      <a:lumMod val="50000"/>
+                      <a:lumOff val="50000"/>
+                      <a:alpha val="20000"/>
+                    </a:prstClr>
+                  </a:glow>
+                  <a:outerShdw blurRad="44450" dist="12700" dir="13860000" algn="tl" rotWithShape="0">
+                    <a:srgbClr val="000000">
+                      <a:alpha val="20000"/>
+                    </a:srgbClr>
+                  </a:outerShdw>
+                </a:effectLst>
+                <a:ea typeface="+mn-lt"/>
+                <a:cs typeface="+mn-lt"/>
+              </a:rPr>
+              <a:t>//JS Switch</a:t>
+            </a:r>
+            <a:endParaRPr lang="en-US" sz="1100">
+              <a:effectLst>
+                <a:glow rad="38100">
+                  <a:prstClr val="black">
+                    <a:lumMod val="50000"/>
+                    <a:lumOff val="50000"/>
+                    <a:alpha val="20000"/>
+                  </a:prstClr>
+                </a:glow>
+                <a:outerShdw blurRad="44450" dist="12700" dir="13860000" algn="tl" rotWithShape="0">
+                  <a:srgbClr val="000000">
+                    <a:alpha val="20000"/>
+                  </a:srgbClr>
+                </a:outerShdw>
+              </a:effectLst>
+            </a:endParaRPr>
+          </a:p>
+          <a:p>
+            <a:pPr>
+              <a:buNone/>
+            </a:pPr>
+            <a:r>
+              <a:rPr lang="en-US" sz="900">
+                <a:effectLst>
+                  <a:glow rad="38100">
+                    <a:prstClr val="black">
+                      <a:lumMod val="50000"/>
+                      <a:lumOff val="50000"/>
+                      <a:alpha val="20000"/>
+                    </a:prstClr>
+                  </a:glow>
+                  <a:outerShdw blurRad="44450" dist="12700" dir="13860000" algn="tl" rotWithShape="0">
+                    <a:srgbClr val="000000">
+                      <a:alpha val="20000"/>
+                    </a:srgbClr>
+                  </a:outerShdw>
+                </a:effectLst>
+                <a:ea typeface="+mn-lt"/>
+                <a:cs typeface="+mn-lt"/>
+              </a:rPr>
+              <a:t>//JS Loop For</a:t>
+            </a:r>
+            <a:endParaRPr lang="en-US" sz="1100">
+              <a:effectLst>
+                <a:glow rad="38100">
+                  <a:prstClr val="black">
+                    <a:lumMod val="50000"/>
+                    <a:lumOff val="50000"/>
+                    <a:alpha val="20000"/>
+                  </a:prstClr>
+                </a:glow>
+                <a:outerShdw blurRad="44450" dist="12700" dir="13860000" algn="tl" rotWithShape="0">
+                  <a:srgbClr val="000000">
+                    <a:alpha val="20000"/>
+                  </a:srgbClr>
+                </a:outerShdw>
+              </a:effectLst>
+            </a:endParaRPr>
+          </a:p>
+          <a:p>
+            <a:pPr>
+              <a:buNone/>
+            </a:pPr>
+            <a:r>
+              <a:rPr lang="en-US" sz="900">
+                <a:effectLst>
+                  <a:glow rad="38100">
+                    <a:prstClr val="black">
+                      <a:lumMod val="50000"/>
+                      <a:lumOff val="50000"/>
+                      <a:alpha val="20000"/>
+                    </a:prstClr>
+                  </a:glow>
+                  <a:outerShdw blurRad="44450" dist="12700" dir="13860000" algn="tl" rotWithShape="0">
+                    <a:srgbClr val="000000">
+                      <a:alpha val="20000"/>
+                    </a:srgbClr>
+                  </a:outerShdw>
+                </a:effectLst>
+                <a:ea typeface="+mn-lt"/>
+                <a:cs typeface="+mn-lt"/>
+              </a:rPr>
+              <a:t>//JS Loop While</a:t>
+            </a:r>
+            <a:endParaRPr lang="en-US" sz="1100">
+              <a:effectLst>
+                <a:glow rad="38100">
+                  <a:prstClr val="black">
+                    <a:lumMod val="50000"/>
+                    <a:lumOff val="50000"/>
+                    <a:alpha val="20000"/>
+                  </a:prstClr>
+                </a:glow>
+                <a:outerShdw blurRad="44450" dist="12700" dir="13860000" algn="tl" rotWithShape="0">
+                  <a:srgbClr val="000000">
+                    <a:alpha val="20000"/>
+                  </a:srgbClr>
+                </a:outerShdw>
+              </a:effectLst>
+            </a:endParaRPr>
+          </a:p>
+          <a:p>
+            <a:pPr>
+              <a:buNone/>
+            </a:pPr>
+            <a:r>
+              <a:rPr lang="en-US" sz="900">
+                <a:effectLst>
+                  <a:glow rad="38100">
+                    <a:prstClr val="black">
+                      <a:lumMod val="50000"/>
+                      <a:lumOff val="50000"/>
+                      <a:alpha val="20000"/>
+                    </a:prstClr>
+                  </a:glow>
+                  <a:outerShdw blurRad="44450" dist="12700" dir="13860000" algn="tl" rotWithShape="0">
+                    <a:srgbClr val="000000">
+                      <a:alpha val="20000"/>
+                    </a:srgbClr>
+                  </a:outerShdw>
+                </a:effectLst>
+                <a:ea typeface="+mn-lt"/>
+                <a:cs typeface="+mn-lt"/>
+              </a:rPr>
+              <a:t>//JS Break</a:t>
+            </a:r>
+            <a:endParaRPr lang="en-US" sz="1100">
+              <a:effectLst>
+                <a:glow rad="38100">
+                  <a:prstClr val="black">
+                    <a:lumMod val="50000"/>
+                    <a:lumOff val="50000"/>
+                    <a:alpha val="20000"/>
+                  </a:prstClr>
+                </a:glow>
+                <a:outerShdw blurRad="44450" dist="12700" dir="13860000" algn="tl" rotWithShape="0">
+                  <a:srgbClr val="000000">
+                    <a:alpha val="20000"/>
+                  </a:srgbClr>
+                </a:outerShdw>
+              </a:effectLst>
+            </a:endParaRPr>
+          </a:p>
+          <a:p>
+            <a:pPr>
+              <a:buNone/>
+            </a:pPr>
+            <a:r>
+              <a:rPr lang="en-US" sz="900">
+                <a:effectLst>
+                  <a:glow rad="38100">
+                    <a:prstClr val="black">
+                      <a:lumMod val="50000"/>
+                      <a:lumOff val="50000"/>
+                      <a:alpha val="20000"/>
+                    </a:prstClr>
+                  </a:glow>
+                  <a:outerShdw blurRad="44450" dist="12700" dir="13860000" algn="tl" rotWithShape="0">
+                    <a:srgbClr val="000000">
+                      <a:alpha val="20000"/>
+                    </a:srgbClr>
+                  </a:outerShdw>
+                </a:effectLst>
+                <a:ea typeface="+mn-lt"/>
+                <a:cs typeface="+mn-lt"/>
+              </a:rPr>
+              <a:t>//JS Type Conversion</a:t>
+            </a:r>
+            <a:endParaRPr lang="en-US" sz="1100">
+              <a:effectLst>
+                <a:glow rad="38100">
+                  <a:prstClr val="black">
+                    <a:lumMod val="50000"/>
+                    <a:lumOff val="50000"/>
+                    <a:alpha val="20000"/>
+                  </a:prstClr>
+                </a:glow>
+                <a:outerShdw blurRad="44450" dist="12700" dir="13860000" algn="tl" rotWithShape="0">
+                  <a:srgbClr val="000000">
+                    <a:alpha val="20000"/>
+                  </a:srgbClr>
+                </a:outerShdw>
+              </a:effectLst>
+            </a:endParaRPr>
+          </a:p>
+          <a:p>
+            <a:pPr>
+              <a:buNone/>
+            </a:pPr>
+            <a:r>
+              <a:rPr lang="en-US" sz="900">
+                <a:effectLst>
+                  <a:glow rad="38100">
+                    <a:prstClr val="black">
+                      <a:lumMod val="50000"/>
+                      <a:lumOff val="50000"/>
+                      <a:alpha val="20000"/>
+                    </a:prstClr>
+                  </a:glow>
+                  <a:outerShdw blurRad="44450" dist="12700" dir="13860000" algn="tl" rotWithShape="0">
+                    <a:srgbClr val="000000">
+                      <a:alpha val="20000"/>
+                    </a:srgbClr>
+                  </a:outerShdw>
+                </a:effectLst>
+                <a:ea typeface="+mn-lt"/>
+                <a:cs typeface="+mn-lt"/>
+              </a:rPr>
+              <a:t>//JS Bitwise</a:t>
+            </a:r>
+            <a:endParaRPr lang="en-US" sz="1100">
+              <a:effectLst>
+                <a:glow rad="38100">
+                  <a:prstClr val="black">
+                    <a:lumMod val="50000"/>
+                    <a:lumOff val="50000"/>
+                    <a:alpha val="20000"/>
+                  </a:prstClr>
+                </a:glow>
+                <a:outerShdw blurRad="44450" dist="12700" dir="13860000" algn="tl" rotWithShape="0">
+                  <a:srgbClr val="000000">
+                    <a:alpha val="20000"/>
+                  </a:srgbClr>
+                </a:outerShdw>
+              </a:effectLst>
+            </a:endParaRPr>
+          </a:p>
+          <a:p>
+            <a:pPr>
+              <a:buNone/>
+            </a:pPr>
+            <a:r>
+              <a:rPr lang="en-US" sz="900">
+                <a:effectLst>
+                  <a:glow rad="38100">
+                    <a:prstClr val="black">
+                      <a:lumMod val="50000"/>
+                      <a:lumOff val="50000"/>
+                      <a:alpha val="20000"/>
+                    </a:prstClr>
+                  </a:glow>
+                  <a:outerShdw blurRad="44450" dist="12700" dir="13860000" algn="tl" rotWithShape="0">
+                    <a:srgbClr val="000000">
+                      <a:alpha val="20000"/>
+                    </a:srgbClr>
+                  </a:outerShdw>
+                </a:effectLst>
+                <a:ea typeface="+mn-lt"/>
+                <a:cs typeface="+mn-lt"/>
+              </a:rPr>
+              <a:t>//JS RegExp</a:t>
+            </a:r>
+            <a:endParaRPr lang="en-US" sz="700">
+              <a:effectLst>
+                <a:glow rad="38100">
+                  <a:prstClr val="black">
+                    <a:lumMod val="50000"/>
+                    <a:lumOff val="50000"/>
+                    <a:alpha val="20000"/>
+                  </a:prstClr>
+                </a:glow>
+                <a:outerShdw blurRad="44450" dist="12700" dir="13860000" algn="tl" rotWithShape="0">
+                  <a:srgbClr val="000000">
+                    <a:alpha val="20000"/>
+                  </a:srgbClr>
+                </a:outerShdw>
+              </a:effectLst>
+            </a:endParaRPr>
+          </a:p>
+        </p:txBody>
+      </p:sp>
+    </p:spTree>
+    <p:extLst>
+      <p:ext uri="{BB962C8B-B14F-4D97-AF65-F5344CB8AC3E}">
+        <p14:creationId xmlns:p14="http://schemas.microsoft.com/office/powerpoint/2010/main" val="905404397"/>
+      </p:ext>
+    </p:extLst>
+  </p:cSld>
+  <p:clrMapOvr>
+    <a:masterClrMapping/>
+  </p:clrMapOvr>
+</p:sld>
+</file>
+
+<file path=ppt/slides/slide42.xml><?xml version="1.0" encoding="utf-8"?>
+<p:sld xmlns:a="http://schemas.openxmlformats.org/drawingml/2006/main" xmlns:r="http://schemas.openxmlformats.org/officeDocument/2006/relationships" xmlns:p="http://schemas.openxmlformats.org/presentationml/2006/main">
+  <p:cSld>
+    <p:spTree>
+      <p:nvGrpSpPr>
+        <p:cNvPr id="1" name=""/>
+        <p:cNvGrpSpPr/>
+        <p:nvPr/>
+      </p:nvGrpSpPr>
+      <p:grpSpPr>
+        <a:xfrm>
+          <a:off x="0" y="0"/>
+          <a:ext cx="0" cy="0"/>
+          <a:chOff x="0" y="0"/>
+          <a:chExt cx="0" cy="0"/>
+        </a:xfrm>
+      </p:grpSpPr>
+      <p:sp>
+        <p:nvSpPr>
+          <p:cNvPr id="2" name="Title 1">
+            <a:extLst>
+              <a:ext uri="{FF2B5EF4-FFF2-40B4-BE49-F238E27FC236}">
+                <a16:creationId xmlns:a16="http://schemas.microsoft.com/office/drawing/2014/main" id="{ECCF6F8C-2E13-4296-BD55-0D837BF148FE}"/>
+              </a:ext>
+            </a:extLst>
+          </p:cNvPr>
+          <p:cNvSpPr>
+            <a:spLocks noGrp="1"/>
+          </p:cNvSpPr>
+          <p:nvPr>
+            <p:ph type="title"/>
+          </p:nvPr>
+        </p:nvSpPr>
+        <p:spPr>
+          <a:xfrm>
             <a:off x="1039857" y="160759"/>
             <a:ext cx="7055380" cy="710249"/>
           </a:xfrm>
@@ -15739,7 +17271,478 @@
 </p:sld>
 </file>
 
-<file path=ppt/slides/slide41.xml><?xml version="1.0" encoding="utf-8"?>
+<file path=ppt/slides/slide43.xml><?xml version="1.0" encoding="utf-8"?>
+<p:sld xmlns:a="http://schemas.openxmlformats.org/drawingml/2006/main" xmlns:r="http://schemas.openxmlformats.org/officeDocument/2006/relationships" xmlns:p="http://schemas.openxmlformats.org/presentationml/2006/main">
+  <p:cSld>
+    <p:spTree>
+      <p:nvGrpSpPr>
+        <p:cNvPr id="1" name=""/>
+        <p:cNvGrpSpPr/>
+        <p:nvPr/>
+      </p:nvGrpSpPr>
+      <p:grpSpPr>
+        <a:xfrm>
+          <a:off x="0" y="0"/>
+          <a:ext cx="0" cy="0"/>
+          <a:chOff x="0" y="0"/>
+          <a:chExt cx="0" cy="0"/>
+        </a:xfrm>
+      </p:grpSpPr>
+      <p:sp>
+        <p:nvSpPr>
+          <p:cNvPr id="2" name="Title 1">
+            <a:extLst>
+              <a:ext uri="{FF2B5EF4-FFF2-40B4-BE49-F238E27FC236}">
+                <a16:creationId xmlns:a16="http://schemas.microsoft.com/office/drawing/2014/main" id="{E79991AE-7CE8-4405-AD5B-B465CD58A633}"/>
+              </a:ext>
+            </a:extLst>
+          </p:cNvPr>
+          <p:cNvSpPr>
+            <a:spLocks noGrp="1"/>
+          </p:cNvSpPr>
+          <p:nvPr>
+            <p:ph type="title"/>
+          </p:nvPr>
+        </p:nvSpPr>
+        <p:spPr>
+          <a:xfrm>
+            <a:off x="-2635694" y="-373001"/>
+            <a:ext cx="7511473" cy="1312480"/>
+          </a:xfrm>
+        </p:spPr>
+        <p:txBody>
+          <a:bodyPr>
+            <a:normAutofit/>
+          </a:bodyPr>
+          <a:lstStyle/>
+          <a:p>
+            <a:pPr algn="ctr"/>
+            <a:r>
+              <a:rPr lang="en-US" sz="3200"/>
+              <a:t>NOTE TO US</a:t>
+            </a:r>
+            <a:endParaRPr lang="en-US"/>
+          </a:p>
+        </p:txBody>
+      </p:sp>
+      <p:sp>
+        <p:nvSpPr>
+          <p:cNvPr id="3" name="Content Placeholder 2">
+            <a:extLst>
+              <a:ext uri="{FF2B5EF4-FFF2-40B4-BE49-F238E27FC236}">
+                <a16:creationId xmlns:a16="http://schemas.microsoft.com/office/drawing/2014/main" id="{AF8D3678-114A-4DF5-8D81-1D3A1BA02B55}"/>
+              </a:ext>
+            </a:extLst>
+          </p:cNvPr>
+          <p:cNvSpPr>
+            <a:spLocks noGrp="1"/>
+          </p:cNvSpPr>
+          <p:nvPr>
+            <p:ph idx="1"/>
+          </p:nvPr>
+        </p:nvSpPr>
+        <p:spPr>
+          <a:xfrm>
+            <a:off x="2431742" y="-31481"/>
+            <a:ext cx="6711654" cy="6827373"/>
+          </a:xfrm>
+        </p:spPr>
+        <p:txBody>
+          <a:bodyPr vert="horz" lIns="91440" tIns="45720" rIns="91440" bIns="45720" rtlCol="0" anchor="t">
+            <a:noAutofit/>
+          </a:bodyPr>
+          <a:lstStyle/>
+          <a:p>
+            <a:pPr marL="0" indent="0">
+              <a:buNone/>
+            </a:pPr>
+            <a:r>
+              <a:rPr lang="en-US" sz="2800" dirty="0">
+                <a:ea typeface="+mj-lt"/>
+                <a:cs typeface="+mj-lt"/>
+              </a:rPr>
+              <a:t>Cover the following on w3schools </a:t>
+            </a:r>
+            <a:r>
+              <a:rPr lang="en-US" sz="2800">
+                <a:ea typeface="+mj-lt"/>
+                <a:cs typeface="+mj-lt"/>
+              </a:rPr>
+              <a:t>before moving to the 'THE COLORS' slide that follows!</a:t>
+            </a:r>
+            <a:endParaRPr lang="en-US">
+              <a:effectLst>
+                <a:glow rad="38100">
+                  <a:prstClr val="black">
+                    <a:lumMod val="50000"/>
+                    <a:lumOff val="50000"/>
+                    <a:alpha val="20000"/>
+                  </a:prstClr>
+                </a:glow>
+                <a:outerShdw blurRad="44450" dist="12700" dir="13860000" algn="tl" rotWithShape="0">
+                  <a:srgbClr val="000000">
+                    <a:alpha val="20000"/>
+                  </a:srgbClr>
+                </a:outerShdw>
+              </a:effectLst>
+              <a:ea typeface="+mj-lt"/>
+              <a:cs typeface="+mj-lt"/>
+            </a:endParaRPr>
+          </a:p>
+          <a:p>
+            <a:r>
+              <a:rPr lang="en-US" sz="1400">
+                <a:effectLst>
+                  <a:glow rad="38100">
+                    <a:prstClr val="black">
+                      <a:lumMod val="50000"/>
+                      <a:lumOff val="50000"/>
+                      <a:alpha val="20000"/>
+                    </a:prstClr>
+                  </a:glow>
+                  <a:outerShdw blurRad="44450" dist="12700" dir="13860000" algn="tl" rotWithShape="0">
+                    <a:srgbClr val="000000">
+                      <a:alpha val="20000"/>
+                    </a:srgbClr>
+                  </a:outerShdw>
+                </a:effectLst>
+                <a:ea typeface="+mn-lt"/>
+                <a:cs typeface="+mn-lt"/>
+              </a:rPr>
+              <a:t>Object Methods</a:t>
+            </a:r>
+            <a:endParaRPr lang="en-US" sz="3600">
+              <a:effectLst>
+                <a:glow rad="38100">
+                  <a:prstClr val="black">
+                    <a:lumMod val="50000"/>
+                    <a:lumOff val="50000"/>
+                    <a:alpha val="20000"/>
+                  </a:prstClr>
+                </a:glow>
+                <a:outerShdw blurRad="44450" dist="12700" dir="13860000" algn="tl" rotWithShape="0">
+                  <a:srgbClr val="000000">
+                    <a:alpha val="20000"/>
+                  </a:srgbClr>
+                </a:outerShdw>
+              </a:effectLst>
+              <a:ea typeface="+mn-lt"/>
+              <a:cs typeface="+mn-lt"/>
+            </a:endParaRPr>
+          </a:p>
+          <a:p>
+            <a:r>
+              <a:rPr lang="en-US" sz="1400">
+                <a:effectLst>
+                  <a:glow rad="38100">
+                    <a:prstClr val="black">
+                      <a:lumMod val="50000"/>
+                      <a:lumOff val="50000"/>
+                      <a:alpha val="20000"/>
+                    </a:prstClr>
+                  </a:glow>
+                  <a:outerShdw blurRad="44450" dist="12700" dir="13860000" algn="tl" rotWithShape="0">
+                    <a:srgbClr val="000000">
+                      <a:alpha val="20000"/>
+                    </a:srgbClr>
+                  </a:outerShdw>
+                </a:effectLst>
+                <a:ea typeface="+mn-lt"/>
+                <a:cs typeface="+mn-lt"/>
+              </a:rPr>
+              <a:t>Object Constructors</a:t>
+            </a:r>
+            <a:endParaRPr lang="en-US" sz="3600">
+              <a:effectLst>
+                <a:glow rad="38100">
+                  <a:prstClr val="black">
+                    <a:lumMod val="50000"/>
+                    <a:lumOff val="50000"/>
+                    <a:alpha val="20000"/>
+                  </a:prstClr>
+                </a:glow>
+                <a:outerShdw blurRad="44450" dist="12700" dir="13860000" algn="tl" rotWithShape="0">
+                  <a:srgbClr val="000000">
+                    <a:alpha val="20000"/>
+                  </a:srgbClr>
+                </a:outerShdw>
+              </a:effectLst>
+            </a:endParaRPr>
+          </a:p>
+          <a:p>
+            <a:r>
+              <a:rPr lang="en-US" sz="1400">
+                <a:effectLst>
+                  <a:glow rad="38100">
+                    <a:prstClr val="black">
+                      <a:lumMod val="50000"/>
+                      <a:lumOff val="50000"/>
+                      <a:alpha val="20000"/>
+                    </a:prstClr>
+                  </a:glow>
+                  <a:outerShdw blurRad="44450" dist="12700" dir="13860000" algn="tl" rotWithShape="0">
+                    <a:srgbClr val="000000">
+                      <a:alpha val="20000"/>
+                    </a:srgbClr>
+                  </a:outerShdw>
+                </a:effectLst>
+                <a:ea typeface="+mn-lt"/>
+                <a:cs typeface="+mn-lt"/>
+              </a:rPr>
+              <a:t>Object Prototypes</a:t>
+            </a:r>
+            <a:endParaRPr lang="en-US" sz="3600">
+              <a:effectLst>
+                <a:glow rad="38100">
+                  <a:prstClr val="black">
+                    <a:lumMod val="50000"/>
+                    <a:lumOff val="50000"/>
+                    <a:alpha val="20000"/>
+                  </a:prstClr>
+                </a:glow>
+                <a:outerShdw blurRad="44450" dist="12700" dir="13860000" algn="tl" rotWithShape="0">
+                  <a:srgbClr val="000000">
+                    <a:alpha val="20000"/>
+                  </a:srgbClr>
+                </a:outerShdw>
+              </a:effectLst>
+            </a:endParaRPr>
+          </a:p>
+          <a:p>
+            <a:pPr indent="0">
+              <a:buNone/>
+            </a:pPr>
+            <a:r>
+              <a:rPr lang="en-US" sz="1400">
+                <a:effectLst>
+                  <a:glow rad="38100">
+                    <a:prstClr val="black">
+                      <a:lumMod val="50000"/>
+                      <a:lumOff val="50000"/>
+                      <a:alpha val="20000"/>
+                    </a:prstClr>
+                  </a:glow>
+                  <a:outerShdw blurRad="44450" dist="12700" dir="13860000" algn="tl" rotWithShape="0">
+                    <a:srgbClr val="000000">
+                      <a:alpha val="20000"/>
+                    </a:srgbClr>
+                  </a:outerShdw>
+                </a:effectLst>
+                <a:ea typeface="+mn-lt"/>
+                <a:cs typeface="+mn-lt"/>
+              </a:rPr>
+              <a:t>JS Functions go through these using the site, try this:</a:t>
+            </a:r>
+            <a:endParaRPr lang="en-US" sz="3600">
+              <a:effectLst>
+                <a:glow rad="38100">
+                  <a:prstClr val="black">
+                    <a:lumMod val="50000"/>
+                    <a:lumOff val="50000"/>
+                    <a:alpha val="20000"/>
+                  </a:prstClr>
+                </a:glow>
+                <a:outerShdw blurRad="44450" dist="12700" dir="13860000" algn="tl" rotWithShape="0">
+                  <a:srgbClr val="000000">
+                    <a:alpha val="20000"/>
+                  </a:srgbClr>
+                </a:outerShdw>
+              </a:effectLst>
+            </a:endParaRPr>
+          </a:p>
+          <a:p>
+            <a:r>
+              <a:rPr lang="en-US" sz="1400">
+                <a:effectLst>
+                  <a:glow rad="38100">
+                    <a:prstClr val="black">
+                      <a:lumMod val="50000"/>
+                      <a:lumOff val="50000"/>
+                      <a:alpha val="20000"/>
+                    </a:prstClr>
+                  </a:glow>
+                  <a:outerShdw blurRad="44450" dist="12700" dir="13860000" algn="tl" rotWithShape="0">
+                    <a:srgbClr val="000000">
+                      <a:alpha val="20000"/>
+                    </a:srgbClr>
+                  </a:outerShdw>
+                </a:effectLst>
+                <a:ea typeface="+mn-lt"/>
+                <a:cs typeface="+mn-lt"/>
+              </a:rPr>
+              <a:t>Function Definitions</a:t>
+            </a:r>
+            <a:endParaRPr lang="en-US" sz="3600">
+              <a:effectLst>
+                <a:glow rad="38100">
+                  <a:prstClr val="black">
+                    <a:lumMod val="50000"/>
+                    <a:lumOff val="50000"/>
+                    <a:alpha val="20000"/>
+                  </a:prstClr>
+                </a:glow>
+                <a:outerShdw blurRad="44450" dist="12700" dir="13860000" algn="tl" rotWithShape="0">
+                  <a:srgbClr val="000000">
+                    <a:alpha val="20000"/>
+                  </a:srgbClr>
+                </a:outerShdw>
+              </a:effectLst>
+            </a:endParaRPr>
+          </a:p>
+          <a:p>
+            <a:r>
+              <a:rPr lang="en-US" sz="1400">
+                <a:effectLst>
+                  <a:glow rad="38100">
+                    <a:prstClr val="black">
+                      <a:lumMod val="50000"/>
+                      <a:lumOff val="50000"/>
+                      <a:alpha val="20000"/>
+                    </a:prstClr>
+                  </a:glow>
+                  <a:outerShdw blurRad="44450" dist="12700" dir="13860000" algn="tl" rotWithShape="0">
+                    <a:srgbClr val="000000">
+                      <a:alpha val="20000"/>
+                    </a:srgbClr>
+                  </a:outerShdw>
+                </a:effectLst>
+                <a:ea typeface="+mn-lt"/>
+                <a:cs typeface="+mn-lt"/>
+              </a:rPr>
+              <a:t>Function Parameters</a:t>
+            </a:r>
+            <a:endParaRPr lang="en-US" sz="3600">
+              <a:effectLst>
+                <a:glow rad="38100">
+                  <a:prstClr val="black">
+                    <a:lumMod val="50000"/>
+                    <a:lumOff val="50000"/>
+                    <a:alpha val="20000"/>
+                  </a:prstClr>
+                </a:glow>
+                <a:outerShdw blurRad="44450" dist="12700" dir="13860000" algn="tl" rotWithShape="0">
+                  <a:srgbClr val="000000">
+                    <a:alpha val="20000"/>
+                  </a:srgbClr>
+                </a:outerShdw>
+              </a:effectLst>
+            </a:endParaRPr>
+          </a:p>
+          <a:p>
+            <a:r>
+              <a:rPr lang="en-US" sz="1400">
+                <a:effectLst>
+                  <a:glow rad="38100">
+                    <a:prstClr val="black">
+                      <a:lumMod val="50000"/>
+                      <a:lumOff val="50000"/>
+                      <a:alpha val="20000"/>
+                    </a:prstClr>
+                  </a:glow>
+                  <a:outerShdw blurRad="44450" dist="12700" dir="13860000" algn="tl" rotWithShape="0">
+                    <a:srgbClr val="000000">
+                      <a:alpha val="20000"/>
+                    </a:srgbClr>
+                  </a:outerShdw>
+                </a:effectLst>
+                <a:ea typeface="+mn-lt"/>
+                <a:cs typeface="+mn-lt"/>
+              </a:rPr>
+              <a:t>Function Invocation</a:t>
+            </a:r>
+            <a:endParaRPr lang="en-US" sz="3600">
+              <a:effectLst>
+                <a:glow rad="38100">
+                  <a:prstClr val="black">
+                    <a:lumMod val="50000"/>
+                    <a:lumOff val="50000"/>
+                    <a:alpha val="20000"/>
+                  </a:prstClr>
+                </a:glow>
+                <a:outerShdw blurRad="44450" dist="12700" dir="13860000" algn="tl" rotWithShape="0">
+                  <a:srgbClr val="000000">
+                    <a:alpha val="20000"/>
+                  </a:srgbClr>
+                </a:outerShdw>
+              </a:effectLst>
+            </a:endParaRPr>
+          </a:p>
+          <a:p>
+            <a:r>
+              <a:rPr lang="en-US" sz="1400">
+                <a:effectLst>
+                  <a:glow rad="38100">
+                    <a:prstClr val="black">
+                      <a:lumMod val="50000"/>
+                      <a:lumOff val="50000"/>
+                      <a:alpha val="20000"/>
+                    </a:prstClr>
+                  </a:glow>
+                  <a:outerShdw blurRad="44450" dist="12700" dir="13860000" algn="tl" rotWithShape="0">
+                    <a:srgbClr val="000000">
+                      <a:alpha val="20000"/>
+                    </a:srgbClr>
+                  </a:outerShdw>
+                </a:effectLst>
+                <a:ea typeface="+mn-lt"/>
+                <a:cs typeface="+mn-lt"/>
+              </a:rPr>
+              <a:t>Function Call</a:t>
+            </a:r>
+            <a:endParaRPr lang="en-US" sz="3600">
+              <a:effectLst>
+                <a:glow rad="38100">
+                  <a:prstClr val="black">
+                    <a:lumMod val="50000"/>
+                    <a:lumOff val="50000"/>
+                    <a:alpha val="20000"/>
+                  </a:prstClr>
+                </a:glow>
+                <a:outerShdw blurRad="44450" dist="12700" dir="13860000" algn="tl" rotWithShape="0">
+                  <a:srgbClr val="000000">
+                    <a:alpha val="20000"/>
+                  </a:srgbClr>
+                </a:outerShdw>
+              </a:effectLst>
+            </a:endParaRPr>
+          </a:p>
+          <a:p>
+            <a:pPr>
+              <a:buNone/>
+            </a:pPr>
+            <a:endParaRPr lang="en-US" sz="900" dirty="0">
+              <a:effectLst>
+                <a:glow rad="38100">
+                  <a:prstClr val="black">
+                    <a:lumMod val="50000"/>
+                    <a:lumOff val="50000"/>
+                    <a:alpha val="20000"/>
+                  </a:prstClr>
+                </a:glow>
+                <a:outerShdw blurRad="44450" dist="12700" dir="13860000" algn="tl" rotWithShape="0">
+                  <a:srgbClr val="000000">
+                    <a:alpha val="20000"/>
+                  </a:srgbClr>
+                </a:outerShdw>
+              </a:effectLst>
+            </a:endParaRPr>
+          </a:p>
+        </p:txBody>
+      </p:sp>
+    </p:spTree>
+    <p:extLst>
+      <p:ext uri="{BB962C8B-B14F-4D97-AF65-F5344CB8AC3E}">
+        <p14:creationId xmlns:p14="http://schemas.microsoft.com/office/powerpoint/2010/main" val="2347717039"/>
+      </p:ext>
+    </p:extLst>
+  </p:cSld>
+  <p:clrMapOvr>
+    <a:masterClrMapping/>
+  </p:clrMapOvr>
+</p:sld>
+</file>
+
+<file path=ppt/slides/slide44.xml><?xml version="1.0" encoding="utf-8"?>
 <p:sld xmlns:a="http://schemas.openxmlformats.org/drawingml/2006/main" xmlns:r="http://schemas.openxmlformats.org/officeDocument/2006/relationships" xmlns:p="http://schemas.openxmlformats.org/presentationml/2006/main">
   <p:cSld>
     <p:spTree>
@@ -15948,7 +17951,242 @@
 </p:sld>
 </file>
 
-<file path=ppt/slides/slide42.xml><?xml version="1.0" encoding="utf-8"?>
+<file path=ppt/slides/slide45.xml><?xml version="1.0" encoding="utf-8"?>
+<p:sld xmlns:a="http://schemas.openxmlformats.org/drawingml/2006/main" xmlns:r="http://schemas.openxmlformats.org/officeDocument/2006/relationships" xmlns:p="http://schemas.openxmlformats.org/presentationml/2006/main">
+  <p:cSld>
+    <p:spTree>
+      <p:nvGrpSpPr>
+        <p:cNvPr id="1" name=""/>
+        <p:cNvGrpSpPr/>
+        <p:nvPr/>
+      </p:nvGrpSpPr>
+      <p:grpSpPr>
+        <a:xfrm>
+          <a:off x="0" y="0"/>
+          <a:ext cx="0" cy="0"/>
+          <a:chOff x="0" y="0"/>
+          <a:chExt cx="0" cy="0"/>
+        </a:xfrm>
+      </p:grpSpPr>
+      <p:sp>
+        <p:nvSpPr>
+          <p:cNvPr id="2" name="Title 1">
+            <a:extLst>
+              <a:ext uri="{FF2B5EF4-FFF2-40B4-BE49-F238E27FC236}">
+                <a16:creationId xmlns:a16="http://schemas.microsoft.com/office/drawing/2014/main" id="{E79991AE-7CE8-4405-AD5B-B465CD58A633}"/>
+              </a:ext>
+            </a:extLst>
+          </p:cNvPr>
+          <p:cNvSpPr>
+            <a:spLocks noGrp="1"/>
+          </p:cNvSpPr>
+          <p:nvPr>
+            <p:ph type="title"/>
+          </p:nvPr>
+        </p:nvSpPr>
+        <p:spPr>
+          <a:xfrm>
+            <a:off x="-2635694" y="-373001"/>
+            <a:ext cx="7511473" cy="1312480"/>
+          </a:xfrm>
+        </p:spPr>
+        <p:txBody>
+          <a:bodyPr>
+            <a:normAutofit/>
+          </a:bodyPr>
+          <a:lstStyle/>
+          <a:p>
+            <a:pPr algn="ctr"/>
+            <a:r>
+              <a:rPr lang="en-US" sz="3200"/>
+              <a:t>NOTE TO US</a:t>
+            </a:r>
+            <a:endParaRPr lang="en-US"/>
+          </a:p>
+        </p:txBody>
+      </p:sp>
+      <p:sp>
+        <p:nvSpPr>
+          <p:cNvPr id="3" name="Content Placeholder 2">
+            <a:extLst>
+              <a:ext uri="{FF2B5EF4-FFF2-40B4-BE49-F238E27FC236}">
+                <a16:creationId xmlns:a16="http://schemas.microsoft.com/office/drawing/2014/main" id="{AF8D3678-114A-4DF5-8D81-1D3A1BA02B55}"/>
+              </a:ext>
+            </a:extLst>
+          </p:cNvPr>
+          <p:cNvSpPr>
+            <a:spLocks noGrp="1"/>
+          </p:cNvSpPr>
+          <p:nvPr>
+            <p:ph idx="1"/>
+          </p:nvPr>
+        </p:nvSpPr>
+        <p:spPr>
+          <a:xfrm>
+            <a:off x="2431742" y="-31481"/>
+            <a:ext cx="6711654" cy="6827373"/>
+          </a:xfrm>
+        </p:spPr>
+        <p:txBody>
+          <a:bodyPr vert="horz" lIns="91440" tIns="45720" rIns="91440" bIns="45720" rtlCol="0" anchor="t">
+            <a:noAutofit/>
+          </a:bodyPr>
+          <a:lstStyle/>
+          <a:p>
+            <a:pPr marL="0" indent="0">
+              <a:buNone/>
+            </a:pPr>
+            <a:r>
+              <a:rPr lang="en-US" sz="2800" dirty="0">
+                <a:ea typeface="+mj-lt"/>
+                <a:cs typeface="+mj-lt"/>
+              </a:rPr>
+              <a:t>Cover the following on w3schools </a:t>
+            </a:r>
+            <a:r>
+              <a:rPr lang="en-US" sz="2800">
+                <a:ea typeface="+mj-lt"/>
+                <a:cs typeface="+mj-lt"/>
+              </a:rPr>
+              <a:t>before moving to the 'FORMS' slide that follows!</a:t>
+            </a:r>
+            <a:endParaRPr lang="en-US">
+              <a:effectLst>
+                <a:glow rad="38100">
+                  <a:prstClr val="black">
+                    <a:lumMod val="50000"/>
+                    <a:lumOff val="50000"/>
+                    <a:alpha val="20000"/>
+                  </a:prstClr>
+                </a:glow>
+                <a:outerShdw blurRad="44450" dist="12700" dir="13860000" algn="tl" rotWithShape="0">
+                  <a:srgbClr val="000000">
+                    <a:alpha val="20000"/>
+                  </a:srgbClr>
+                </a:outerShdw>
+              </a:effectLst>
+              <a:ea typeface="+mj-lt"/>
+              <a:cs typeface="+mj-lt"/>
+            </a:endParaRPr>
+          </a:p>
+          <a:p>
+            <a:r>
+              <a:rPr lang="en-US" sz="1400">
+                <a:effectLst>
+                  <a:glow rad="38100">
+                    <a:prstClr val="black">
+                      <a:lumMod val="50000"/>
+                      <a:lumOff val="50000"/>
+                      <a:alpha val="20000"/>
+                    </a:prstClr>
+                  </a:glow>
+                  <a:outerShdw blurRad="44450" dist="12700" dir="13860000" algn="tl" rotWithShape="0">
+                    <a:srgbClr val="000000">
+                      <a:alpha val="20000"/>
+                    </a:srgbClr>
+                  </a:outerShdw>
+                </a:effectLst>
+                <a:ea typeface="+mn-lt"/>
+                <a:cs typeface="+mn-lt"/>
+              </a:rPr>
+              <a:t>JS Forms</a:t>
+            </a:r>
+            <a:endParaRPr lang="en-US" sz="3600">
+              <a:effectLst>
+                <a:glow rad="38100">
+                  <a:prstClr val="black">
+                    <a:lumMod val="50000"/>
+                    <a:lumOff val="50000"/>
+                    <a:alpha val="20000"/>
+                  </a:prstClr>
+                </a:glow>
+                <a:outerShdw blurRad="44450" dist="12700" dir="13860000" algn="tl" rotWithShape="0">
+                  <a:srgbClr val="000000">
+                    <a:alpha val="20000"/>
+                  </a:srgbClr>
+                </a:outerShdw>
+              </a:effectLst>
+            </a:endParaRPr>
+          </a:p>
+          <a:p>
+            <a:r>
+              <a:rPr lang="en-US" sz="1400">
+                <a:effectLst>
+                  <a:glow rad="38100">
+                    <a:prstClr val="black">
+                      <a:lumMod val="50000"/>
+                      <a:lumOff val="50000"/>
+                      <a:alpha val="20000"/>
+                    </a:prstClr>
+                  </a:glow>
+                  <a:outerShdw blurRad="44450" dist="12700" dir="13860000" algn="tl" rotWithShape="0">
+                    <a:srgbClr val="000000">
+                      <a:alpha val="20000"/>
+                    </a:srgbClr>
+                  </a:outerShdw>
+                </a:effectLst>
+                <a:ea typeface="+mn-lt"/>
+                <a:cs typeface="+mn-lt"/>
+              </a:rPr>
+              <a:t>Forms API</a:t>
+            </a:r>
+            <a:endParaRPr lang="en-US"/>
+          </a:p>
+          <a:p>
+            <a:endParaRPr lang="en-US" sz="1400" dirty="0">
+              <a:effectLst>
+                <a:glow rad="38100">
+                  <a:prstClr val="black">
+                    <a:lumMod val="50000"/>
+                    <a:lumOff val="50000"/>
+                    <a:alpha val="20000"/>
+                  </a:prstClr>
+                </a:glow>
+                <a:outerShdw blurRad="44450" dist="12700" dir="13860000" algn="tl" rotWithShape="0">
+                  <a:srgbClr val="000000">
+                    <a:alpha val="20000"/>
+                  </a:srgbClr>
+                </a:outerShdw>
+              </a:effectLst>
+            </a:endParaRPr>
+          </a:p>
+          <a:p>
+            <a:pPr>
+              <a:buNone/>
+            </a:pPr>
+            <a:endParaRPr lang="en-US" sz="900" dirty="0">
+              <a:effectLst>
+                <a:glow rad="38100">
+                  <a:prstClr val="black">
+                    <a:lumMod val="50000"/>
+                    <a:lumOff val="50000"/>
+                    <a:alpha val="20000"/>
+                  </a:prstClr>
+                </a:glow>
+                <a:outerShdw blurRad="44450" dist="12700" dir="13860000" algn="tl" rotWithShape="0">
+                  <a:srgbClr val="000000">
+                    <a:alpha val="20000"/>
+                  </a:srgbClr>
+                </a:outerShdw>
+              </a:effectLst>
+            </a:endParaRPr>
+          </a:p>
+        </p:txBody>
+      </p:sp>
+    </p:spTree>
+    <p:extLst>
+      <p:ext uri="{BB962C8B-B14F-4D97-AF65-F5344CB8AC3E}">
+        <p14:creationId xmlns:p14="http://schemas.microsoft.com/office/powerpoint/2010/main" val="3899673719"/>
+      </p:ext>
+    </p:extLst>
+  </p:cSld>
+  <p:clrMapOvr>
+    <a:masterClrMapping/>
+  </p:clrMapOvr>
+</p:sld>
+</file>
+
+<file path=ppt/slides/slide46.xml><?xml version="1.0" encoding="utf-8"?>
 <p:sld xmlns:a="http://schemas.openxmlformats.org/drawingml/2006/main" xmlns:r="http://schemas.openxmlformats.org/officeDocument/2006/relationships" xmlns:p="http://schemas.openxmlformats.org/presentationml/2006/main">
   <p:cSld>
     <p:spTree>

</xml_diff>